<commit_message>
Updated style guide (in progress)
</commit_message>
<xml_diff>
--- a/Style Guide/CST8117 Cross Platform Web Design(style guide).pptx
+++ b/Style Guide/CST8117 Cross Platform Web Design(style guide).pptx
@@ -139,977 +139,6 @@
 <file path=ppt/changesInfos/changesInfo1.xml><?xml version="1.0" encoding="utf-8"?>
 <pc:chgInfo xmlns:a="http://schemas.openxmlformats.org/drawingml/2006/main" xmlns:r="http://schemas.openxmlformats.org/officeDocument/2006/relationships" xmlns:ac="http://schemas.microsoft.com/office/drawing/2013/main/command" xmlns:pc="http://schemas.microsoft.com/office/powerpoint/2013/main/command">
   <pc:docChgLst>
-    <pc:chgData name="Jacky Cheung" userId="222a41775e9e4c49" providerId="LiveId" clId="{05800059-C45E-4025-97B2-F59A9646E5B3}"/>
-    <pc:docChg chg="custSel delSld modSld">
-      <pc:chgData name="Jacky Cheung" userId="222a41775e9e4c49" providerId="LiveId" clId="{05800059-C45E-4025-97B2-F59A9646E5B3}" dt="2023-10-09T05:08:13.902" v="117" actId="20577"/>
-      <pc:docMkLst>
-        <pc:docMk/>
-      </pc:docMkLst>
-      <pc:sldChg chg="modSp mod">
-        <pc:chgData name="Jacky Cheung" userId="222a41775e9e4c49" providerId="LiveId" clId="{05800059-C45E-4025-97B2-F59A9646E5B3}" dt="2023-10-09T05:05:27.274" v="30" actId="20577"/>
-        <pc:sldMkLst>
-          <pc:docMk/>
-          <pc:sldMk cId="2829691241" sldId="256"/>
-        </pc:sldMkLst>
-        <pc:spChg chg="mod">
-          <ac:chgData name="Jacky Cheung" userId="222a41775e9e4c49" providerId="LiveId" clId="{05800059-C45E-4025-97B2-F59A9646E5B3}" dt="2023-10-09T05:04:42.197" v="11"/>
-          <ac:spMkLst>
-            <pc:docMk/>
-            <pc:sldMk cId="2829691241" sldId="256"/>
-            <ac:spMk id="2" creationId="{28469AF5-FDFC-9AB1-280F-AAC97129A11B}"/>
-          </ac:spMkLst>
-        </pc:spChg>
-        <pc:spChg chg="mod">
-          <ac:chgData name="Jacky Cheung" userId="222a41775e9e4c49" providerId="LiveId" clId="{05800059-C45E-4025-97B2-F59A9646E5B3}" dt="2023-10-09T05:05:27.274" v="30" actId="20577"/>
-          <ac:spMkLst>
-            <pc:docMk/>
-            <pc:sldMk cId="2829691241" sldId="256"/>
-            <ac:spMk id="3" creationId="{EB3EE9A3-FD3F-B66C-46A0-B5131A22C72B}"/>
-          </ac:spMkLst>
-        </pc:spChg>
-      </pc:sldChg>
-      <pc:sldChg chg="modSp del">
-        <pc:chgData name="Jacky Cheung" userId="222a41775e9e4c49" providerId="LiveId" clId="{05800059-C45E-4025-97B2-F59A9646E5B3}" dt="2023-10-09T05:05:12.370" v="14" actId="47"/>
-        <pc:sldMkLst>
-          <pc:docMk/>
-          <pc:sldMk cId="307226430" sldId="257"/>
-        </pc:sldMkLst>
-        <pc:spChg chg="mod">
-          <ac:chgData name="Jacky Cheung" userId="222a41775e9e4c49" providerId="LiveId" clId="{05800059-C45E-4025-97B2-F59A9646E5B3}" dt="2023-10-09T05:04:42.197" v="11"/>
-          <ac:spMkLst>
-            <pc:docMk/>
-            <pc:sldMk cId="307226430" sldId="257"/>
-            <ac:spMk id="2" creationId="{838E4D56-0D2F-8D10-D26A-4B5E9F190C3F}"/>
-          </ac:spMkLst>
-        </pc:spChg>
-        <pc:spChg chg="mod">
-          <ac:chgData name="Jacky Cheung" userId="222a41775e9e4c49" providerId="LiveId" clId="{05800059-C45E-4025-97B2-F59A9646E5B3}" dt="2023-10-09T05:04:42.197" v="11"/>
-          <ac:spMkLst>
-            <pc:docMk/>
-            <pc:sldMk cId="307226430" sldId="257"/>
-            <ac:spMk id="3" creationId="{2659C664-FDC9-3F5A-6191-B831733CE3E6}"/>
-          </ac:spMkLst>
-        </pc:spChg>
-      </pc:sldChg>
-      <pc:sldChg chg="modSp del">
-        <pc:chgData name="Jacky Cheung" userId="222a41775e9e4c49" providerId="LiveId" clId="{05800059-C45E-4025-97B2-F59A9646E5B3}" dt="2023-10-09T05:05:12.370" v="14" actId="47"/>
-        <pc:sldMkLst>
-          <pc:docMk/>
-          <pc:sldMk cId="2493029288" sldId="258"/>
-        </pc:sldMkLst>
-        <pc:spChg chg="mod">
-          <ac:chgData name="Jacky Cheung" userId="222a41775e9e4c49" providerId="LiveId" clId="{05800059-C45E-4025-97B2-F59A9646E5B3}" dt="2023-10-09T05:04:42.197" v="11"/>
-          <ac:spMkLst>
-            <pc:docMk/>
-            <pc:sldMk cId="2493029288" sldId="258"/>
-            <ac:spMk id="2" creationId="{0AAD1A42-7AB4-E88D-5BD0-F657B343605A}"/>
-          </ac:spMkLst>
-        </pc:spChg>
-        <pc:spChg chg="mod">
-          <ac:chgData name="Jacky Cheung" userId="222a41775e9e4c49" providerId="LiveId" clId="{05800059-C45E-4025-97B2-F59A9646E5B3}" dt="2023-10-09T05:04:42.197" v="11"/>
-          <ac:spMkLst>
-            <pc:docMk/>
-            <pc:sldMk cId="2493029288" sldId="258"/>
-            <ac:spMk id="3" creationId="{B6D5F28D-2EE9-F539-EDDA-552B6F30581A}"/>
-          </ac:spMkLst>
-        </pc:spChg>
-      </pc:sldChg>
-      <pc:sldChg chg="addSp delSp modSp del mod">
-        <pc:chgData name="Jacky Cheung" userId="222a41775e9e4c49" providerId="LiveId" clId="{05800059-C45E-4025-97B2-F59A9646E5B3}" dt="2023-10-09T05:05:12.370" v="14" actId="47"/>
-        <pc:sldMkLst>
-          <pc:docMk/>
-          <pc:sldMk cId="2871054885" sldId="259"/>
-        </pc:sldMkLst>
-        <pc:spChg chg="mod">
-          <ac:chgData name="Jacky Cheung" userId="222a41775e9e4c49" providerId="LiveId" clId="{05800059-C45E-4025-97B2-F59A9646E5B3}" dt="2023-10-09T05:04:42.197" v="11"/>
-          <ac:spMkLst>
-            <pc:docMk/>
-            <pc:sldMk cId="2871054885" sldId="259"/>
-            <ac:spMk id="2" creationId="{0AAD1A42-7AB4-E88D-5BD0-F657B343605A}"/>
-          </ac:spMkLst>
-        </pc:spChg>
-        <pc:spChg chg="mod">
-          <ac:chgData name="Jacky Cheung" userId="222a41775e9e4c49" providerId="LiveId" clId="{05800059-C45E-4025-97B2-F59A9646E5B3}" dt="2023-10-09T05:04:42.197" v="11"/>
-          <ac:spMkLst>
-            <pc:docMk/>
-            <pc:sldMk cId="2871054885" sldId="259"/>
-            <ac:spMk id="3" creationId="{B6D5F28D-2EE9-F539-EDDA-552B6F30581A}"/>
-          </ac:spMkLst>
-        </pc:spChg>
-        <pc:picChg chg="add del mod">
-          <ac:chgData name="Jacky Cheung" userId="222a41775e9e4c49" providerId="LiveId" clId="{05800059-C45E-4025-97B2-F59A9646E5B3}" dt="2023-10-09T05:04:48.021" v="12" actId="21"/>
-          <ac:picMkLst>
-            <pc:docMk/>
-            <pc:sldMk cId="2871054885" sldId="259"/>
-            <ac:picMk id="4" creationId="{13DA4735-0AF1-09D6-1E74-2BD742A90731}"/>
-          </ac:picMkLst>
-        </pc:picChg>
-      </pc:sldChg>
-      <pc:sldChg chg="addSp delSp modSp del mod">
-        <pc:chgData name="Jacky Cheung" userId="222a41775e9e4c49" providerId="LiveId" clId="{05800059-C45E-4025-97B2-F59A9646E5B3}" dt="2023-10-09T05:05:12.370" v="14" actId="47"/>
-        <pc:sldMkLst>
-          <pc:docMk/>
-          <pc:sldMk cId="3461325239" sldId="260"/>
-        </pc:sldMkLst>
-        <pc:spChg chg="mod">
-          <ac:chgData name="Jacky Cheung" userId="222a41775e9e4c49" providerId="LiveId" clId="{05800059-C45E-4025-97B2-F59A9646E5B3}" dt="2023-10-09T05:04:42.197" v="11"/>
-          <ac:spMkLst>
-            <pc:docMk/>
-            <pc:sldMk cId="3461325239" sldId="260"/>
-            <ac:spMk id="2" creationId="{D1CD71C8-3FA0-DEB4-50C6-B38B61F3A3D4}"/>
-          </ac:spMkLst>
-        </pc:spChg>
-        <pc:spChg chg="mod">
-          <ac:chgData name="Jacky Cheung" userId="222a41775e9e4c49" providerId="LiveId" clId="{05800059-C45E-4025-97B2-F59A9646E5B3}" dt="2023-10-09T05:04:42.197" v="11"/>
-          <ac:spMkLst>
-            <pc:docMk/>
-            <pc:sldMk cId="3461325239" sldId="260"/>
-            <ac:spMk id="3" creationId="{E9D0BD69-A689-647F-D70F-081CDB681E8A}"/>
-          </ac:spMkLst>
-        </pc:spChg>
-        <pc:picChg chg="add del mod">
-          <ac:chgData name="Jacky Cheung" userId="222a41775e9e4c49" providerId="LiveId" clId="{05800059-C45E-4025-97B2-F59A9646E5B3}" dt="2023-10-08T05:11:11.514" v="5" actId="21"/>
-          <ac:picMkLst>
-            <pc:docMk/>
-            <pc:sldMk cId="3461325239" sldId="260"/>
-            <ac:picMk id="5" creationId="{7E693D4B-B965-F77F-7311-725F46087A9C}"/>
-          </ac:picMkLst>
-        </pc:picChg>
-      </pc:sldChg>
-      <pc:sldChg chg="modSp del">
-        <pc:chgData name="Jacky Cheung" userId="222a41775e9e4c49" providerId="LiveId" clId="{05800059-C45E-4025-97B2-F59A9646E5B3}" dt="2023-10-09T05:05:12.370" v="14" actId="47"/>
-        <pc:sldMkLst>
-          <pc:docMk/>
-          <pc:sldMk cId="369788960" sldId="261"/>
-        </pc:sldMkLst>
-        <pc:spChg chg="mod">
-          <ac:chgData name="Jacky Cheung" userId="222a41775e9e4c49" providerId="LiveId" clId="{05800059-C45E-4025-97B2-F59A9646E5B3}" dt="2023-10-09T05:04:42.197" v="11"/>
-          <ac:spMkLst>
-            <pc:docMk/>
-            <pc:sldMk cId="369788960" sldId="261"/>
-            <ac:spMk id="2" creationId="{4B6331CB-5796-209A-EFBB-072BBAA5E7BD}"/>
-          </ac:spMkLst>
-        </pc:spChg>
-        <pc:spChg chg="mod">
-          <ac:chgData name="Jacky Cheung" userId="222a41775e9e4c49" providerId="LiveId" clId="{05800059-C45E-4025-97B2-F59A9646E5B3}" dt="2023-10-09T05:04:42.197" v="11"/>
-          <ac:spMkLst>
-            <pc:docMk/>
-            <pc:sldMk cId="369788960" sldId="261"/>
-            <ac:spMk id="3" creationId="{A7A31F80-6395-8A6F-EC5B-C1D083585223}"/>
-          </ac:spMkLst>
-        </pc:spChg>
-      </pc:sldChg>
-      <pc:sldChg chg="addSp modSp">
-        <pc:chgData name="Jacky Cheung" userId="222a41775e9e4c49" providerId="LiveId" clId="{05800059-C45E-4025-97B2-F59A9646E5B3}" dt="2023-10-09T05:05:50.047" v="31"/>
-        <pc:sldMkLst>
-          <pc:docMk/>
-          <pc:sldMk cId="1131925519" sldId="262"/>
-        </pc:sldMkLst>
-        <pc:spChg chg="mod">
-          <ac:chgData name="Jacky Cheung" userId="222a41775e9e4c49" providerId="LiveId" clId="{05800059-C45E-4025-97B2-F59A9646E5B3}" dt="2023-10-09T05:04:42.197" v="11"/>
-          <ac:spMkLst>
-            <pc:docMk/>
-            <pc:sldMk cId="1131925519" sldId="262"/>
-            <ac:spMk id="2" creationId="{BD4A6A34-70BE-8484-4B9F-F64F0A0570F8}"/>
-          </ac:spMkLst>
-        </pc:spChg>
-        <pc:spChg chg="mod">
-          <ac:chgData name="Jacky Cheung" userId="222a41775e9e4c49" providerId="LiveId" clId="{05800059-C45E-4025-97B2-F59A9646E5B3}" dt="2023-10-09T05:04:42.197" v="11"/>
-          <ac:spMkLst>
-            <pc:docMk/>
-            <pc:sldMk cId="1131925519" sldId="262"/>
-            <ac:spMk id="3" creationId="{C838D6D8-D51E-97DB-CFEB-1AF0F9A44891}"/>
-          </ac:spMkLst>
-        </pc:spChg>
-        <pc:picChg chg="add mod">
-          <ac:chgData name="Jacky Cheung" userId="222a41775e9e4c49" providerId="LiveId" clId="{05800059-C45E-4025-97B2-F59A9646E5B3}" dt="2023-10-09T05:05:50.047" v="31"/>
-          <ac:picMkLst>
-            <pc:docMk/>
-            <pc:sldMk cId="1131925519" sldId="262"/>
-            <ac:picMk id="4" creationId="{D3F1FF81-892D-D5A5-A043-7FEBD0658096}"/>
-          </ac:picMkLst>
-        </pc:picChg>
-      </pc:sldChg>
-      <pc:sldChg chg="modSp">
-        <pc:chgData name="Jacky Cheung" userId="222a41775e9e4c49" providerId="LiveId" clId="{05800059-C45E-4025-97B2-F59A9646E5B3}" dt="2023-10-09T05:04:42.197" v="11"/>
-        <pc:sldMkLst>
-          <pc:docMk/>
-          <pc:sldMk cId="1315235822" sldId="263"/>
-        </pc:sldMkLst>
-        <pc:spChg chg="mod">
-          <ac:chgData name="Jacky Cheung" userId="222a41775e9e4c49" providerId="LiveId" clId="{05800059-C45E-4025-97B2-F59A9646E5B3}" dt="2023-10-09T05:04:42.197" v="11"/>
-          <ac:spMkLst>
-            <pc:docMk/>
-            <pc:sldMk cId="1315235822" sldId="263"/>
-            <ac:spMk id="2" creationId="{BD4A6A34-70BE-8484-4B9F-F64F0A0570F8}"/>
-          </ac:spMkLst>
-        </pc:spChg>
-        <pc:spChg chg="mod">
-          <ac:chgData name="Jacky Cheung" userId="222a41775e9e4c49" providerId="LiveId" clId="{05800059-C45E-4025-97B2-F59A9646E5B3}" dt="2023-10-09T05:04:42.197" v="11"/>
-          <ac:spMkLst>
-            <pc:docMk/>
-            <pc:sldMk cId="1315235822" sldId="263"/>
-            <ac:spMk id="3" creationId="{C838D6D8-D51E-97DB-CFEB-1AF0F9A44891}"/>
-          </ac:spMkLst>
-        </pc:spChg>
-      </pc:sldChg>
-      <pc:sldChg chg="modSp">
-        <pc:chgData name="Jacky Cheung" userId="222a41775e9e4c49" providerId="LiveId" clId="{05800059-C45E-4025-97B2-F59A9646E5B3}" dt="2023-10-09T05:04:42.197" v="11"/>
-        <pc:sldMkLst>
-          <pc:docMk/>
-          <pc:sldMk cId="1518886697" sldId="264"/>
-        </pc:sldMkLst>
-        <pc:spChg chg="mod">
-          <ac:chgData name="Jacky Cheung" userId="222a41775e9e4c49" providerId="LiveId" clId="{05800059-C45E-4025-97B2-F59A9646E5B3}" dt="2023-10-09T05:04:42.197" v="11"/>
-          <ac:spMkLst>
-            <pc:docMk/>
-            <pc:sldMk cId="1518886697" sldId="264"/>
-            <ac:spMk id="2" creationId="{A45EF47A-5B59-4177-6F37-D7526D2F4A8D}"/>
-          </ac:spMkLst>
-        </pc:spChg>
-        <pc:spChg chg="mod">
-          <ac:chgData name="Jacky Cheung" userId="222a41775e9e4c49" providerId="LiveId" clId="{05800059-C45E-4025-97B2-F59A9646E5B3}" dt="2023-10-09T05:04:42.197" v="11"/>
-          <ac:spMkLst>
-            <pc:docMk/>
-            <pc:sldMk cId="1518886697" sldId="264"/>
-            <ac:spMk id="3" creationId="{4F243655-9DB8-B885-5AF1-E693F989D927}"/>
-          </ac:spMkLst>
-        </pc:spChg>
-      </pc:sldChg>
-      <pc:sldChg chg="modSp del">
-        <pc:chgData name="Jacky Cheung" userId="222a41775e9e4c49" providerId="LiveId" clId="{05800059-C45E-4025-97B2-F59A9646E5B3}" dt="2023-10-09T05:05:12.370" v="14" actId="47"/>
-        <pc:sldMkLst>
-          <pc:docMk/>
-          <pc:sldMk cId="151917472" sldId="265"/>
-        </pc:sldMkLst>
-        <pc:spChg chg="mod">
-          <ac:chgData name="Jacky Cheung" userId="222a41775e9e4c49" providerId="LiveId" clId="{05800059-C45E-4025-97B2-F59A9646E5B3}" dt="2023-10-09T05:04:42.197" v="11"/>
-          <ac:spMkLst>
-            <pc:docMk/>
-            <pc:sldMk cId="151917472" sldId="265"/>
-            <ac:spMk id="4" creationId="{5B044F74-8B01-599B-5739-47DB3B2A0989}"/>
-          </ac:spMkLst>
-        </pc:spChg>
-        <pc:spChg chg="mod">
-          <ac:chgData name="Jacky Cheung" userId="222a41775e9e4c49" providerId="LiveId" clId="{05800059-C45E-4025-97B2-F59A9646E5B3}" dt="2023-10-09T05:04:42.197" v="11"/>
-          <ac:spMkLst>
-            <pc:docMk/>
-            <pc:sldMk cId="151917472" sldId="265"/>
-            <ac:spMk id="5" creationId="{06E88A76-C556-0CC2-D519-01C16D395BE8}"/>
-          </ac:spMkLst>
-        </pc:spChg>
-      </pc:sldChg>
-      <pc:sldChg chg="modSp">
-        <pc:chgData name="Jacky Cheung" userId="222a41775e9e4c49" providerId="LiveId" clId="{05800059-C45E-4025-97B2-F59A9646E5B3}" dt="2023-10-09T05:04:42.197" v="11"/>
-        <pc:sldMkLst>
-          <pc:docMk/>
-          <pc:sldMk cId="1528687700" sldId="266"/>
-        </pc:sldMkLst>
-        <pc:spChg chg="mod">
-          <ac:chgData name="Jacky Cheung" userId="222a41775e9e4c49" providerId="LiveId" clId="{05800059-C45E-4025-97B2-F59A9646E5B3}" dt="2023-10-09T05:04:42.197" v="11"/>
-          <ac:spMkLst>
-            <pc:docMk/>
-            <pc:sldMk cId="1528687700" sldId="266"/>
-            <ac:spMk id="4" creationId="{3CF152EC-4936-EA3A-2D08-223EC7DDDEDC}"/>
-          </ac:spMkLst>
-        </pc:spChg>
-        <pc:spChg chg="mod">
-          <ac:chgData name="Jacky Cheung" userId="222a41775e9e4c49" providerId="LiveId" clId="{05800059-C45E-4025-97B2-F59A9646E5B3}" dt="2023-10-09T05:04:42.197" v="11"/>
-          <ac:spMkLst>
-            <pc:docMk/>
-            <pc:sldMk cId="1528687700" sldId="266"/>
-            <ac:spMk id="5" creationId="{B5C096C4-6160-6D7A-ED56-4C22B83A66C8}"/>
-          </ac:spMkLst>
-        </pc:spChg>
-      </pc:sldChg>
-      <pc:sldChg chg="addSp modSp">
-        <pc:chgData name="Jacky Cheung" userId="222a41775e9e4c49" providerId="LiveId" clId="{05800059-C45E-4025-97B2-F59A9646E5B3}" dt="2023-10-09T05:05:00.549" v="13"/>
-        <pc:sldMkLst>
-          <pc:docMk/>
-          <pc:sldMk cId="3386539458" sldId="267"/>
-        </pc:sldMkLst>
-        <pc:spChg chg="mod">
-          <ac:chgData name="Jacky Cheung" userId="222a41775e9e4c49" providerId="LiveId" clId="{05800059-C45E-4025-97B2-F59A9646E5B3}" dt="2023-10-09T05:04:42.197" v="11"/>
-          <ac:spMkLst>
-            <pc:docMk/>
-            <pc:sldMk cId="3386539458" sldId="267"/>
-            <ac:spMk id="2" creationId="{2C35D016-AD14-9F34-7361-0B40138F2329}"/>
-          </ac:spMkLst>
-        </pc:spChg>
-        <pc:spChg chg="mod">
-          <ac:chgData name="Jacky Cheung" userId="222a41775e9e4c49" providerId="LiveId" clId="{05800059-C45E-4025-97B2-F59A9646E5B3}" dt="2023-10-09T05:04:42.197" v="11"/>
-          <ac:spMkLst>
-            <pc:docMk/>
-            <pc:sldMk cId="3386539458" sldId="267"/>
-            <ac:spMk id="3" creationId="{71D3AB14-1CF3-34C6-8B6C-58173C6A8818}"/>
-          </ac:spMkLst>
-        </pc:spChg>
-        <pc:picChg chg="add mod">
-          <ac:chgData name="Jacky Cheung" userId="222a41775e9e4c49" providerId="LiveId" clId="{05800059-C45E-4025-97B2-F59A9646E5B3}" dt="2023-10-09T05:05:00.549" v="13"/>
-          <ac:picMkLst>
-            <pc:docMk/>
-            <pc:sldMk cId="3386539458" sldId="267"/>
-            <ac:picMk id="4" creationId="{5B98141D-0A1F-7764-47C8-9A3212391DDD}"/>
-          </ac:picMkLst>
-        </pc:picChg>
-      </pc:sldChg>
-      <pc:sldChg chg="modSp">
-        <pc:chgData name="Jacky Cheung" userId="222a41775e9e4c49" providerId="LiveId" clId="{05800059-C45E-4025-97B2-F59A9646E5B3}" dt="2023-10-09T05:04:42.197" v="11"/>
-        <pc:sldMkLst>
-          <pc:docMk/>
-          <pc:sldMk cId="1741544213" sldId="268"/>
-        </pc:sldMkLst>
-        <pc:spChg chg="mod">
-          <ac:chgData name="Jacky Cheung" userId="222a41775e9e4c49" providerId="LiveId" clId="{05800059-C45E-4025-97B2-F59A9646E5B3}" dt="2023-10-09T05:04:42.197" v="11"/>
-          <ac:spMkLst>
-            <pc:docMk/>
-            <pc:sldMk cId="1741544213" sldId="268"/>
-            <ac:spMk id="2" creationId="{6651759B-C18F-314F-2798-B97253EC2B35}"/>
-          </ac:spMkLst>
-        </pc:spChg>
-        <pc:spChg chg="mod">
-          <ac:chgData name="Jacky Cheung" userId="222a41775e9e4c49" providerId="LiveId" clId="{05800059-C45E-4025-97B2-F59A9646E5B3}" dt="2023-10-09T05:04:42.197" v="11"/>
-          <ac:spMkLst>
-            <pc:docMk/>
-            <pc:sldMk cId="1741544213" sldId="268"/>
-            <ac:spMk id="3" creationId="{04C50C1A-09C6-2C7A-D685-6DB0396A548F}"/>
-          </ac:spMkLst>
-        </pc:spChg>
-      </pc:sldChg>
-      <pc:sldChg chg="modSp mod">
-        <pc:chgData name="Jacky Cheung" userId="222a41775e9e4c49" providerId="LiveId" clId="{05800059-C45E-4025-97B2-F59A9646E5B3}" dt="2023-10-09T05:04:42.197" v="11"/>
-        <pc:sldMkLst>
-          <pc:docMk/>
-          <pc:sldMk cId="1423961563" sldId="269"/>
-        </pc:sldMkLst>
-        <pc:spChg chg="mod">
-          <ac:chgData name="Jacky Cheung" userId="222a41775e9e4c49" providerId="LiveId" clId="{05800059-C45E-4025-97B2-F59A9646E5B3}" dt="2023-10-09T05:04:42.197" v="11"/>
-          <ac:spMkLst>
-            <pc:docMk/>
-            <pc:sldMk cId="1423961563" sldId="269"/>
-            <ac:spMk id="2" creationId="{4B7DD928-1D95-1EF3-C7A8-5656DEE92712}"/>
-          </ac:spMkLst>
-        </pc:spChg>
-        <pc:spChg chg="mod">
-          <ac:chgData name="Jacky Cheung" userId="222a41775e9e4c49" providerId="LiveId" clId="{05800059-C45E-4025-97B2-F59A9646E5B3}" dt="2023-10-09T05:04:42.197" v="11"/>
-          <ac:spMkLst>
-            <pc:docMk/>
-            <pc:sldMk cId="1423961563" sldId="269"/>
-            <ac:spMk id="3" creationId="{18C12FCC-003E-78C3-D896-D852100C28F8}"/>
-          </ac:spMkLst>
-        </pc:spChg>
-      </pc:sldChg>
-      <pc:sldChg chg="modSp">
-        <pc:chgData name="Jacky Cheung" userId="222a41775e9e4c49" providerId="LiveId" clId="{05800059-C45E-4025-97B2-F59A9646E5B3}" dt="2023-10-09T05:08:13.902" v="117" actId="20577"/>
-        <pc:sldMkLst>
-          <pc:docMk/>
-          <pc:sldMk cId="3781643426" sldId="270"/>
-        </pc:sldMkLst>
-        <pc:spChg chg="mod">
-          <ac:chgData name="Jacky Cheung" userId="222a41775e9e4c49" providerId="LiveId" clId="{05800059-C45E-4025-97B2-F59A9646E5B3}" dt="2023-10-09T05:04:42.197" v="11"/>
-          <ac:spMkLst>
-            <pc:docMk/>
-            <pc:sldMk cId="3781643426" sldId="270"/>
-            <ac:spMk id="2" creationId="{3F8D282D-C6C1-E111-2FEA-12008EB15A91}"/>
-          </ac:spMkLst>
-        </pc:spChg>
-        <pc:graphicFrameChg chg="mod">
-          <ac:chgData name="Jacky Cheung" userId="222a41775e9e4c49" providerId="LiveId" clId="{05800059-C45E-4025-97B2-F59A9646E5B3}" dt="2023-10-09T05:08:13.902" v="117" actId="20577"/>
-          <ac:graphicFrameMkLst>
-            <pc:docMk/>
-            <pc:sldMk cId="3781643426" sldId="270"/>
-            <ac:graphicFrameMk id="4" creationId="{5BEE7704-C4A3-CD9C-F159-10F737E56286}"/>
-          </ac:graphicFrameMkLst>
-        </pc:graphicFrameChg>
-      </pc:sldChg>
-    </pc:docChg>
-  </pc:docChgLst>
-  <pc:docChgLst>
-    <pc:chgData name="Jacky Cheung" userId="222a41775e9e4c49" providerId="LiveId" clId="{DC5E1C58-07B7-43CF-A154-390D4E638E6A}"/>
-    <pc:docChg chg="undo custSel addSld delSld modSld">
-      <pc:chgData name="Jacky Cheung" userId="222a41775e9e4c49" providerId="LiveId" clId="{DC5E1C58-07B7-43CF-A154-390D4E638E6A}" dt="2023-12-05T15:46:47.406" v="741" actId="20577"/>
-      <pc:docMkLst>
-        <pc:docMk/>
-      </pc:docMkLst>
-      <pc:sldChg chg="modSp mod">
-        <pc:chgData name="Jacky Cheung" userId="222a41775e9e4c49" providerId="LiveId" clId="{DC5E1C58-07B7-43CF-A154-390D4E638E6A}" dt="2023-12-05T15:13:06.391" v="35" actId="20577"/>
-        <pc:sldMkLst>
-          <pc:docMk/>
-          <pc:sldMk cId="2829691241" sldId="256"/>
-        </pc:sldMkLst>
-        <pc:spChg chg="mod">
-          <ac:chgData name="Jacky Cheung" userId="222a41775e9e4c49" providerId="LiveId" clId="{DC5E1C58-07B7-43CF-A154-390D4E638E6A}" dt="2023-12-05T15:12:47.189" v="0" actId="20577"/>
-          <ac:spMkLst>
-            <pc:docMk/>
-            <pc:sldMk cId="2829691241" sldId="256"/>
-            <ac:spMk id="3" creationId="{EB3EE9A3-FD3F-B66C-46A0-B5131A22C72B}"/>
-          </ac:spMkLst>
-        </pc:spChg>
-        <pc:spChg chg="mod">
-          <ac:chgData name="Jacky Cheung" userId="222a41775e9e4c49" providerId="LiveId" clId="{DC5E1C58-07B7-43CF-A154-390D4E638E6A}" dt="2023-12-05T15:13:06.391" v="35" actId="20577"/>
-          <ac:spMkLst>
-            <pc:docMk/>
-            <pc:sldMk cId="2829691241" sldId="256"/>
-            <ac:spMk id="5" creationId="{54AA2C18-9ED4-FF50-FE28-A520333E4CDB}"/>
-          </ac:spMkLst>
-        </pc:spChg>
-      </pc:sldChg>
-      <pc:sldChg chg="modSp mod">
-        <pc:chgData name="Jacky Cheung" userId="222a41775e9e4c49" providerId="LiveId" clId="{DC5E1C58-07B7-43CF-A154-390D4E638E6A}" dt="2023-12-05T15:17:21.797" v="112" actId="20577"/>
-        <pc:sldMkLst>
-          <pc:docMk/>
-          <pc:sldMk cId="2493029288" sldId="258"/>
-        </pc:sldMkLst>
-        <pc:spChg chg="mod">
-          <ac:chgData name="Jacky Cheung" userId="222a41775e9e4c49" providerId="LiveId" clId="{DC5E1C58-07B7-43CF-A154-390D4E638E6A}" dt="2023-12-05T15:17:21.797" v="112" actId="20577"/>
-          <ac:spMkLst>
-            <pc:docMk/>
-            <pc:sldMk cId="2493029288" sldId="258"/>
-            <ac:spMk id="3" creationId="{B6D5F28D-2EE9-F539-EDDA-552B6F30581A}"/>
-          </ac:spMkLst>
-        </pc:spChg>
-      </pc:sldChg>
-      <pc:sldChg chg="addSp delSp modSp mod">
-        <pc:chgData name="Jacky Cheung" userId="222a41775e9e4c49" providerId="LiveId" clId="{DC5E1C58-07B7-43CF-A154-390D4E638E6A}" dt="2023-12-05T15:29:58.911" v="248" actId="14100"/>
-        <pc:sldMkLst>
-          <pc:docMk/>
-          <pc:sldMk cId="1131925519" sldId="262"/>
-        </pc:sldMkLst>
-        <pc:picChg chg="del">
-          <ac:chgData name="Jacky Cheung" userId="222a41775e9e4c49" providerId="LiveId" clId="{DC5E1C58-07B7-43CF-A154-390D4E638E6A}" dt="2023-12-05T15:29:42.767" v="245" actId="478"/>
-          <ac:picMkLst>
-            <pc:docMk/>
-            <pc:sldMk cId="1131925519" sldId="262"/>
-            <ac:picMk id="4" creationId="{D3F1FF81-892D-D5A5-A043-7FEBD0658096}"/>
-          </ac:picMkLst>
-        </pc:picChg>
-        <pc:picChg chg="add mod">
-          <ac:chgData name="Jacky Cheung" userId="222a41775e9e4c49" providerId="LiveId" clId="{DC5E1C58-07B7-43CF-A154-390D4E638E6A}" dt="2023-12-05T15:29:58.911" v="248" actId="14100"/>
-          <ac:picMkLst>
-            <pc:docMk/>
-            <pc:sldMk cId="1131925519" sldId="262"/>
-            <ac:picMk id="5" creationId="{7B3C0593-0040-7914-CD4B-E67E0CA3D267}"/>
-          </ac:picMkLst>
-        </pc:picChg>
-      </pc:sldChg>
-      <pc:sldChg chg="addSp modSp mod">
-        <pc:chgData name="Jacky Cheung" userId="222a41775e9e4c49" providerId="LiveId" clId="{DC5E1C58-07B7-43CF-A154-390D4E638E6A}" dt="2023-12-05T15:17:49.020" v="117" actId="20577"/>
-        <pc:sldMkLst>
-          <pc:docMk/>
-          <pc:sldMk cId="1528687700" sldId="266"/>
-        </pc:sldMkLst>
-        <pc:spChg chg="mod">
-          <ac:chgData name="Jacky Cheung" userId="222a41775e9e4c49" providerId="LiveId" clId="{DC5E1C58-07B7-43CF-A154-390D4E638E6A}" dt="2023-12-05T15:14:05.720" v="47" actId="20577"/>
-          <ac:spMkLst>
-            <pc:docMk/>
-            <pc:sldMk cId="1528687700" sldId="266"/>
-            <ac:spMk id="5" creationId="{B5C096C4-6160-6D7A-ED56-4C22B83A66C8}"/>
-          </ac:spMkLst>
-        </pc:spChg>
-        <pc:spChg chg="add mod">
-          <ac:chgData name="Jacky Cheung" userId="222a41775e9e4c49" providerId="LiveId" clId="{DC5E1C58-07B7-43CF-A154-390D4E638E6A}" dt="2023-12-05T15:17:49.020" v="117" actId="20577"/>
-          <ac:spMkLst>
-            <pc:docMk/>
-            <pc:sldMk cId="1528687700" sldId="266"/>
-            <ac:spMk id="7" creationId="{C4E41A94-22D6-F086-CE70-93D67A83EB96}"/>
-          </ac:spMkLst>
-        </pc:spChg>
-      </pc:sldChg>
-      <pc:sldChg chg="addSp delSp modSp mod">
-        <pc:chgData name="Jacky Cheung" userId="222a41775e9e4c49" providerId="LiveId" clId="{DC5E1C58-07B7-43CF-A154-390D4E638E6A}" dt="2023-12-05T15:35:13.808" v="314" actId="14100"/>
-        <pc:sldMkLst>
-          <pc:docMk/>
-          <pc:sldMk cId="1741544213" sldId="268"/>
-        </pc:sldMkLst>
-        <pc:spChg chg="mod">
-          <ac:chgData name="Jacky Cheung" userId="222a41775e9e4c49" providerId="LiveId" clId="{DC5E1C58-07B7-43CF-A154-390D4E638E6A}" dt="2023-12-05T15:35:13.808" v="314" actId="14100"/>
-          <ac:spMkLst>
-            <pc:docMk/>
-            <pc:sldMk cId="1741544213" sldId="268"/>
-            <ac:spMk id="9" creationId="{3689FC0D-3B70-6E90-6415-AC8FFD1E0019}"/>
-          </ac:spMkLst>
-        </pc:spChg>
-        <pc:spChg chg="del">
-          <ac:chgData name="Jacky Cheung" userId="222a41775e9e4c49" providerId="LiveId" clId="{DC5E1C58-07B7-43CF-A154-390D4E638E6A}" dt="2023-12-05T15:34:34.161" v="301" actId="478"/>
-          <ac:spMkLst>
-            <pc:docMk/>
-            <pc:sldMk cId="1741544213" sldId="268"/>
-            <ac:spMk id="11" creationId="{2A7C30E3-E945-2A7D-5300-5113B39189F7}"/>
-          </ac:spMkLst>
-        </pc:spChg>
-        <pc:picChg chg="add mod">
-          <ac:chgData name="Jacky Cheung" userId="222a41775e9e4c49" providerId="LiveId" clId="{DC5E1C58-07B7-43CF-A154-390D4E638E6A}" dt="2023-12-05T15:35:01.235" v="305" actId="1076"/>
-          <ac:picMkLst>
-            <pc:docMk/>
-            <pc:sldMk cId="1741544213" sldId="268"/>
-            <ac:picMk id="5" creationId="{0DC971C4-3A94-20F6-38A9-12797D66A0B6}"/>
-          </ac:picMkLst>
-        </pc:picChg>
-        <pc:picChg chg="del">
-          <ac:chgData name="Jacky Cheung" userId="222a41775e9e4c49" providerId="LiveId" clId="{DC5E1C58-07B7-43CF-A154-390D4E638E6A}" dt="2023-12-05T15:34:00.153" v="299" actId="478"/>
-          <ac:picMkLst>
-            <pc:docMk/>
-            <pc:sldMk cId="1741544213" sldId="268"/>
-            <ac:picMk id="13" creationId="{033DB794-3705-36C2-00E6-992AA121DE08}"/>
-          </ac:picMkLst>
-        </pc:picChg>
-        <pc:picChg chg="del">
-          <ac:chgData name="Jacky Cheung" userId="222a41775e9e4c49" providerId="LiveId" clId="{DC5E1C58-07B7-43CF-A154-390D4E638E6A}" dt="2023-12-05T15:34:28.754" v="300" actId="478"/>
-          <ac:picMkLst>
-            <pc:docMk/>
-            <pc:sldMk cId="1741544213" sldId="268"/>
-            <ac:picMk id="15" creationId="{6928AE08-0877-527F-9195-BCDEB98CA86C}"/>
-          </ac:picMkLst>
-        </pc:picChg>
-      </pc:sldChg>
-      <pc:sldChg chg="modSp">
-        <pc:chgData name="Jacky Cheung" userId="222a41775e9e4c49" providerId="LiveId" clId="{DC5E1C58-07B7-43CF-A154-390D4E638E6A}" dt="2023-12-05T15:46:47.406" v="741" actId="20577"/>
-        <pc:sldMkLst>
-          <pc:docMk/>
-          <pc:sldMk cId="3781643426" sldId="270"/>
-        </pc:sldMkLst>
-        <pc:graphicFrameChg chg="mod">
-          <ac:chgData name="Jacky Cheung" userId="222a41775e9e4c49" providerId="LiveId" clId="{DC5E1C58-07B7-43CF-A154-390D4E638E6A}" dt="2023-12-05T15:46:47.406" v="741" actId="20577"/>
-          <ac:graphicFrameMkLst>
-            <pc:docMk/>
-            <pc:sldMk cId="3781643426" sldId="270"/>
-            <ac:graphicFrameMk id="4" creationId="{5BEE7704-C4A3-CD9C-F159-10F737E56286}"/>
-          </ac:graphicFrameMkLst>
-        </pc:graphicFrameChg>
-      </pc:sldChg>
-      <pc:sldChg chg="modSp mod">
-        <pc:chgData name="Jacky Cheung" userId="222a41775e9e4c49" providerId="LiveId" clId="{DC5E1C58-07B7-43CF-A154-390D4E638E6A}" dt="2023-12-05T15:22:18.571" v="232" actId="20577"/>
-        <pc:sldMkLst>
-          <pc:docMk/>
-          <pc:sldMk cId="3202623808" sldId="271"/>
-        </pc:sldMkLst>
-        <pc:spChg chg="mod">
-          <ac:chgData name="Jacky Cheung" userId="222a41775e9e4c49" providerId="LiveId" clId="{DC5E1C58-07B7-43CF-A154-390D4E638E6A}" dt="2023-12-05T15:18:33.827" v="127" actId="2711"/>
-          <ac:spMkLst>
-            <pc:docMk/>
-            <pc:sldMk cId="3202623808" sldId="271"/>
-            <ac:spMk id="2" creationId="{6D7DE610-94CD-21B2-096A-04255AC75CFF}"/>
-          </ac:spMkLst>
-        </pc:spChg>
-        <pc:spChg chg="mod">
-          <ac:chgData name="Jacky Cheung" userId="222a41775e9e4c49" providerId="LiveId" clId="{DC5E1C58-07B7-43CF-A154-390D4E638E6A}" dt="2023-12-05T15:22:18.571" v="232" actId="20577"/>
-          <ac:spMkLst>
-            <pc:docMk/>
-            <pc:sldMk cId="3202623808" sldId="271"/>
-            <ac:spMk id="4" creationId="{F9A02599-C567-4094-87C3-49FAF32AC0AC}"/>
-          </ac:spMkLst>
-        </pc:spChg>
-        <pc:spChg chg="mod">
-          <ac:chgData name="Jacky Cheung" userId="222a41775e9e4c49" providerId="LiveId" clId="{DC5E1C58-07B7-43CF-A154-390D4E638E6A}" dt="2023-12-05T15:21:09.894" v="168" actId="20577"/>
-          <ac:spMkLst>
-            <pc:docMk/>
-            <pc:sldMk cId="3202623808" sldId="271"/>
-            <ac:spMk id="9" creationId="{519B31CE-64BA-A346-E53B-C81B53AC9773}"/>
-          </ac:spMkLst>
-        </pc:spChg>
-      </pc:sldChg>
-      <pc:sldChg chg="delSp modSp mod">
-        <pc:chgData name="Jacky Cheung" userId="222a41775e9e4c49" providerId="LiveId" clId="{DC5E1C58-07B7-43CF-A154-390D4E638E6A}" dt="2023-12-05T15:23:10.104" v="244" actId="20577"/>
-        <pc:sldMkLst>
-          <pc:docMk/>
-          <pc:sldMk cId="2796892709" sldId="272"/>
-        </pc:sldMkLst>
-        <pc:spChg chg="mod">
-          <ac:chgData name="Jacky Cheung" userId="222a41775e9e4c49" providerId="LiveId" clId="{DC5E1C58-07B7-43CF-A154-390D4E638E6A}" dt="2023-12-05T15:23:10.104" v="244" actId="20577"/>
-          <ac:spMkLst>
-            <pc:docMk/>
-            <pc:sldMk cId="2796892709" sldId="272"/>
-            <ac:spMk id="9" creationId="{519B31CE-64BA-A346-E53B-C81B53AC9773}"/>
-          </ac:spMkLst>
-        </pc:spChg>
-        <pc:picChg chg="del">
-          <ac:chgData name="Jacky Cheung" userId="222a41775e9e4c49" providerId="LiveId" clId="{DC5E1C58-07B7-43CF-A154-390D4E638E6A}" dt="2023-12-05T15:23:02.133" v="234" actId="478"/>
-          <ac:picMkLst>
-            <pc:docMk/>
-            <pc:sldMk cId="2796892709" sldId="272"/>
-            <ac:picMk id="10" creationId="{2912BEF6-889E-E436-1CC7-31E42F5104E0}"/>
-          </ac:picMkLst>
-        </pc:picChg>
-      </pc:sldChg>
-      <pc:sldChg chg="addSp delSp modSp mod">
-        <pc:chgData name="Jacky Cheung" userId="222a41775e9e4c49" providerId="LiveId" clId="{DC5E1C58-07B7-43CF-A154-390D4E638E6A}" dt="2023-12-05T15:38:40.651" v="474" actId="207"/>
-        <pc:sldMkLst>
-          <pc:docMk/>
-          <pc:sldMk cId="2806245624" sldId="273"/>
-        </pc:sldMkLst>
-        <pc:spChg chg="mod">
-          <ac:chgData name="Jacky Cheung" userId="222a41775e9e4c49" providerId="LiveId" clId="{DC5E1C58-07B7-43CF-A154-390D4E638E6A}" dt="2023-12-05T15:31:22.189" v="256" actId="255"/>
-          <ac:spMkLst>
-            <pc:docMk/>
-            <pc:sldMk cId="2806245624" sldId="273"/>
-            <ac:spMk id="3" creationId="{4BDC3303-1CCF-2776-575D-61DCD2BABC91}"/>
-          </ac:spMkLst>
-        </pc:spChg>
-        <pc:spChg chg="add mod">
-          <ac:chgData name="Jacky Cheung" userId="222a41775e9e4c49" providerId="LiveId" clId="{DC5E1C58-07B7-43CF-A154-390D4E638E6A}" dt="2023-12-05T15:33:09.001" v="292" actId="571"/>
-          <ac:spMkLst>
-            <pc:docMk/>
-            <pc:sldMk cId="2806245624" sldId="273"/>
-            <ac:spMk id="4" creationId="{EB432C75-338F-ECB5-10FA-19ACF232F2A8}"/>
-          </ac:spMkLst>
-        </pc:spChg>
-        <pc:spChg chg="mod">
-          <ac:chgData name="Jacky Cheung" userId="222a41775e9e4c49" providerId="LiveId" clId="{DC5E1C58-07B7-43CF-A154-390D4E638E6A}" dt="2023-12-05T15:31:45.117" v="263" actId="207"/>
-          <ac:spMkLst>
-            <pc:docMk/>
-            <pc:sldMk cId="2806245624" sldId="273"/>
-            <ac:spMk id="5" creationId="{1C7518E9-1DFE-797F-BD54-2C5944C50AFE}"/>
-          </ac:spMkLst>
-        </pc:spChg>
-        <pc:spChg chg="mod">
-          <ac:chgData name="Jacky Cheung" userId="222a41775e9e4c49" providerId="LiveId" clId="{DC5E1C58-07B7-43CF-A154-390D4E638E6A}" dt="2023-12-05T15:32:38.431" v="282" actId="207"/>
-          <ac:spMkLst>
-            <pc:docMk/>
-            <pc:sldMk cId="2806245624" sldId="273"/>
-            <ac:spMk id="6" creationId="{35B028BA-6886-522D-4EB1-3B695F17CA12}"/>
-          </ac:spMkLst>
-        </pc:spChg>
-        <pc:spChg chg="mod">
-          <ac:chgData name="Jacky Cheung" userId="222a41775e9e4c49" providerId="LiveId" clId="{DC5E1C58-07B7-43CF-A154-390D4E638E6A}" dt="2023-12-05T15:33:18.503" v="295" actId="207"/>
-          <ac:spMkLst>
-            <pc:docMk/>
-            <pc:sldMk cId="2806245624" sldId="273"/>
-            <ac:spMk id="7" creationId="{0EC6A924-17DE-EF0A-9341-8B56501F4131}"/>
-          </ac:spMkLst>
-        </pc:spChg>
-        <pc:spChg chg="del">
-          <ac:chgData name="Jacky Cheung" userId="222a41775e9e4c49" providerId="LiveId" clId="{DC5E1C58-07B7-43CF-A154-390D4E638E6A}" dt="2023-12-05T15:33:03.547" v="290" actId="478"/>
-          <ac:spMkLst>
-            <pc:docMk/>
-            <pc:sldMk cId="2806245624" sldId="273"/>
-            <ac:spMk id="8" creationId="{1A44B5C2-C4C2-7985-694B-2470BE1EC9A8}"/>
-          </ac:spMkLst>
-        </pc:spChg>
-        <pc:spChg chg="mod">
-          <ac:chgData name="Jacky Cheung" userId="222a41775e9e4c49" providerId="LiveId" clId="{DC5E1C58-07B7-43CF-A154-390D4E638E6A}" dt="2023-12-05T15:38:40.651" v="474" actId="207"/>
-          <ac:spMkLst>
-            <pc:docMk/>
-            <pc:sldMk cId="2806245624" sldId="273"/>
-            <ac:spMk id="9" creationId="{D8FA1828-E03E-509E-65D8-3AF98EC43069}"/>
-          </ac:spMkLst>
-        </pc:spChg>
-      </pc:sldChg>
-      <pc:sldChg chg="addSp delSp modSp mod">
-        <pc:chgData name="Jacky Cheung" userId="222a41775e9e4c49" providerId="LiveId" clId="{DC5E1C58-07B7-43CF-A154-390D4E638E6A}" dt="2023-12-05T15:38:56.933" v="477" actId="1076"/>
-        <pc:sldMkLst>
-          <pc:docMk/>
-          <pc:sldMk cId="1974522495" sldId="275"/>
-        </pc:sldMkLst>
-        <pc:spChg chg="del">
-          <ac:chgData name="Jacky Cheung" userId="222a41775e9e4c49" providerId="LiveId" clId="{DC5E1C58-07B7-43CF-A154-390D4E638E6A}" dt="2023-12-05T15:33:37.742" v="296" actId="478"/>
-          <ac:spMkLst>
-            <pc:docMk/>
-            <pc:sldMk cId="1974522495" sldId="275"/>
-            <ac:spMk id="3" creationId="{4BDC3303-1CCF-2776-575D-61DCD2BABC91}"/>
-          </ac:spMkLst>
-        </pc:spChg>
-        <pc:spChg chg="del">
-          <ac:chgData name="Jacky Cheung" userId="222a41775e9e4c49" providerId="LiveId" clId="{DC5E1C58-07B7-43CF-A154-390D4E638E6A}" dt="2023-12-05T15:33:37.742" v="296" actId="478"/>
-          <ac:spMkLst>
-            <pc:docMk/>
-            <pc:sldMk cId="1974522495" sldId="275"/>
-            <ac:spMk id="5" creationId="{1C7518E9-1DFE-797F-BD54-2C5944C50AFE}"/>
-          </ac:spMkLst>
-        </pc:spChg>
-        <pc:spChg chg="del">
-          <ac:chgData name="Jacky Cheung" userId="222a41775e9e4c49" providerId="LiveId" clId="{DC5E1C58-07B7-43CF-A154-390D4E638E6A}" dt="2023-12-05T15:33:37.742" v="296" actId="478"/>
-          <ac:spMkLst>
-            <pc:docMk/>
-            <pc:sldMk cId="1974522495" sldId="275"/>
-            <ac:spMk id="6" creationId="{35B028BA-6886-522D-4EB1-3B695F17CA12}"/>
-          </ac:spMkLst>
-        </pc:spChg>
-        <pc:spChg chg="del">
-          <ac:chgData name="Jacky Cheung" userId="222a41775e9e4c49" providerId="LiveId" clId="{DC5E1C58-07B7-43CF-A154-390D4E638E6A}" dt="2023-12-05T15:33:37.742" v="296" actId="478"/>
-          <ac:spMkLst>
-            <pc:docMk/>
-            <pc:sldMk cId="1974522495" sldId="275"/>
-            <ac:spMk id="7" creationId="{0EC6A924-17DE-EF0A-9341-8B56501F4131}"/>
-          </ac:spMkLst>
-        </pc:spChg>
-        <pc:spChg chg="del">
-          <ac:chgData name="Jacky Cheung" userId="222a41775e9e4c49" providerId="LiveId" clId="{DC5E1C58-07B7-43CF-A154-390D4E638E6A}" dt="2023-12-05T15:33:37.742" v="296" actId="478"/>
-          <ac:spMkLst>
-            <pc:docMk/>
-            <pc:sldMk cId="1974522495" sldId="275"/>
-            <ac:spMk id="8" creationId="{1A44B5C2-C4C2-7985-694B-2470BE1EC9A8}"/>
-          </ac:spMkLst>
-        </pc:spChg>
-        <pc:spChg chg="add mod">
-          <ac:chgData name="Jacky Cheung" userId="222a41775e9e4c49" providerId="LiveId" clId="{DC5E1C58-07B7-43CF-A154-390D4E638E6A}" dt="2023-12-05T15:33:42.978" v="298" actId="1076"/>
-          <ac:spMkLst>
-            <pc:docMk/>
-            <pc:sldMk cId="1974522495" sldId="275"/>
-            <ac:spMk id="10" creationId="{B3746BA1-28AB-50C0-58FC-16CC9048540A}"/>
-          </ac:spMkLst>
-        </pc:spChg>
-        <pc:spChg chg="del">
-          <ac:chgData name="Jacky Cheung" userId="222a41775e9e4c49" providerId="LiveId" clId="{DC5E1C58-07B7-43CF-A154-390D4E638E6A}" dt="2023-12-05T15:33:37.742" v="296" actId="478"/>
-          <ac:spMkLst>
-            <pc:docMk/>
-            <pc:sldMk cId="1974522495" sldId="275"/>
-            <ac:spMk id="11" creationId="{00EB287F-DFF4-6F47-E416-4CE17F44EE8B}"/>
-          </ac:spMkLst>
-        </pc:spChg>
-        <pc:spChg chg="add mod">
-          <ac:chgData name="Jacky Cheung" userId="222a41775e9e4c49" providerId="LiveId" clId="{DC5E1C58-07B7-43CF-A154-390D4E638E6A}" dt="2023-12-05T15:33:42.978" v="298" actId="1076"/>
-          <ac:spMkLst>
-            <pc:docMk/>
-            <pc:sldMk cId="1974522495" sldId="275"/>
-            <ac:spMk id="12" creationId="{F06DF1B2-77A8-CB05-CCF7-0C327E2CCEBC}"/>
-          </ac:spMkLst>
-        </pc:spChg>
-        <pc:spChg chg="add mod">
-          <ac:chgData name="Jacky Cheung" userId="222a41775e9e4c49" providerId="LiveId" clId="{DC5E1C58-07B7-43CF-A154-390D4E638E6A}" dt="2023-12-05T15:33:42.978" v="298" actId="1076"/>
-          <ac:spMkLst>
-            <pc:docMk/>
-            <pc:sldMk cId="1974522495" sldId="275"/>
-            <ac:spMk id="18" creationId="{6B17D8AC-299D-6382-180F-59A9555486AB}"/>
-          </ac:spMkLst>
-        </pc:spChg>
-        <pc:spChg chg="add mod">
-          <ac:chgData name="Jacky Cheung" userId="222a41775e9e4c49" providerId="LiveId" clId="{DC5E1C58-07B7-43CF-A154-390D4E638E6A}" dt="2023-12-05T15:33:42.978" v="298" actId="1076"/>
-          <ac:spMkLst>
-            <pc:docMk/>
-            <pc:sldMk cId="1974522495" sldId="275"/>
-            <ac:spMk id="19" creationId="{9575D71D-937D-E06F-47E0-44592BAB9EBA}"/>
-          </ac:spMkLst>
-        </pc:spChg>
-        <pc:spChg chg="add del mod">
-          <ac:chgData name="Jacky Cheung" userId="222a41775e9e4c49" providerId="LiveId" clId="{DC5E1C58-07B7-43CF-A154-390D4E638E6A}" dt="2023-12-05T15:38:51.394" v="475" actId="478"/>
-          <ac:spMkLst>
-            <pc:docMk/>
-            <pc:sldMk cId="1974522495" sldId="275"/>
-            <ac:spMk id="20" creationId="{579F2D8F-6D92-D82D-BD9A-B83356CACA74}"/>
-          </ac:spMkLst>
-        </pc:spChg>
-        <pc:spChg chg="add mod">
-          <ac:chgData name="Jacky Cheung" userId="222a41775e9e4c49" providerId="LiveId" clId="{DC5E1C58-07B7-43CF-A154-390D4E638E6A}" dt="2023-12-05T15:38:56.933" v="477" actId="1076"/>
-          <ac:spMkLst>
-            <pc:docMk/>
-            <pc:sldMk cId="1974522495" sldId="275"/>
-            <ac:spMk id="21" creationId="{55800920-3148-1C65-ACC6-D3EFFAED7E7C}"/>
-          </ac:spMkLst>
-        </pc:spChg>
-      </pc:sldChg>
-      <pc:sldChg chg="addSp delSp modSp mod">
-        <pc:chgData name="Jacky Cheung" userId="222a41775e9e4c49" providerId="LiveId" clId="{DC5E1C58-07B7-43CF-A154-390D4E638E6A}" dt="2023-12-05T15:43:10.737" v="572" actId="14100"/>
-        <pc:sldMkLst>
-          <pc:docMk/>
-          <pc:sldMk cId="3794753471" sldId="276"/>
-        </pc:sldMkLst>
-        <pc:spChg chg="mod">
-          <ac:chgData name="Jacky Cheung" userId="222a41775e9e4c49" providerId="LiveId" clId="{DC5E1C58-07B7-43CF-A154-390D4E638E6A}" dt="2023-12-05T15:42:34.188" v="533" actId="14100"/>
-          <ac:spMkLst>
-            <pc:docMk/>
-            <pc:sldMk cId="3794753471" sldId="276"/>
-            <ac:spMk id="9" creationId="{3689FC0D-3B70-6E90-6415-AC8FFD1E0019}"/>
-          </ac:spMkLst>
-        </pc:spChg>
-        <pc:spChg chg="mod">
-          <ac:chgData name="Jacky Cheung" userId="222a41775e9e4c49" providerId="LiveId" clId="{DC5E1C58-07B7-43CF-A154-390D4E638E6A}" dt="2023-12-05T15:43:06.108" v="570" actId="1076"/>
-          <ac:spMkLst>
-            <pc:docMk/>
-            <pc:sldMk cId="3794753471" sldId="276"/>
-            <ac:spMk id="11" creationId="{2A7C30E3-E945-2A7D-5300-5113B39189F7}"/>
-          </ac:spMkLst>
-        </pc:spChg>
-        <pc:picChg chg="del">
-          <ac:chgData name="Jacky Cheung" userId="222a41775e9e4c49" providerId="LiveId" clId="{DC5E1C58-07B7-43CF-A154-390D4E638E6A}" dt="2023-12-05T15:39:21.339" v="478" actId="478"/>
-          <ac:picMkLst>
-            <pc:docMk/>
-            <pc:sldMk cId="3794753471" sldId="276"/>
-            <ac:picMk id="5" creationId="{AEDFAC36-30EE-6F77-ACE5-176B437028BA}"/>
-          </ac:picMkLst>
-        </pc:picChg>
-        <pc:picChg chg="del">
-          <ac:chgData name="Jacky Cheung" userId="222a41775e9e4c49" providerId="LiveId" clId="{DC5E1C58-07B7-43CF-A154-390D4E638E6A}" dt="2023-12-05T15:39:22.217" v="479" actId="478"/>
-          <ac:picMkLst>
-            <pc:docMk/>
-            <pc:sldMk cId="3794753471" sldId="276"/>
-            <ac:picMk id="7" creationId="{512E7664-A6D7-22B3-8DAC-09A302ABE027}"/>
-          </ac:picMkLst>
-        </pc:picChg>
-        <pc:picChg chg="add mod">
-          <ac:chgData name="Jacky Cheung" userId="222a41775e9e4c49" providerId="LiveId" clId="{DC5E1C58-07B7-43CF-A154-390D4E638E6A}" dt="2023-12-05T15:42:05.874" v="491" actId="14100"/>
-          <ac:picMkLst>
-            <pc:docMk/>
-            <pc:sldMk cId="3794753471" sldId="276"/>
-            <ac:picMk id="10" creationId="{1309B04B-B60F-37F3-7B1C-5028D22C3640}"/>
-          </ac:picMkLst>
-        </pc:picChg>
-        <pc:picChg chg="add mod">
-          <ac:chgData name="Jacky Cheung" userId="222a41775e9e4c49" providerId="LiveId" clId="{DC5E1C58-07B7-43CF-A154-390D4E638E6A}" dt="2023-12-05T15:43:10.737" v="572" actId="14100"/>
-          <ac:picMkLst>
-            <pc:docMk/>
-            <pc:sldMk cId="3794753471" sldId="276"/>
-            <ac:picMk id="13" creationId="{D890722E-2405-F0A7-967C-47D42F68B0F0}"/>
-          </ac:picMkLst>
-        </pc:picChg>
-      </pc:sldChg>
-      <pc:sldChg chg="addSp delSp modSp mod">
-        <pc:chgData name="Jacky Cheung" userId="222a41775e9e4c49" providerId="LiveId" clId="{DC5E1C58-07B7-43CF-A154-390D4E638E6A}" dt="2023-12-05T15:37:53.294" v="435" actId="14100"/>
-        <pc:sldMkLst>
-          <pc:docMk/>
-          <pc:sldMk cId="249892692" sldId="277"/>
-        </pc:sldMkLst>
-        <pc:spChg chg="mod">
-          <ac:chgData name="Jacky Cheung" userId="222a41775e9e4c49" providerId="LiveId" clId="{DC5E1C58-07B7-43CF-A154-390D4E638E6A}" dt="2023-12-05T15:35:43.988" v="368" actId="20577"/>
-          <ac:spMkLst>
-            <pc:docMk/>
-            <pc:sldMk cId="249892692" sldId="277"/>
-            <ac:spMk id="9" creationId="{3689FC0D-3B70-6E90-6415-AC8FFD1E0019}"/>
-          </ac:spMkLst>
-        </pc:spChg>
-        <pc:spChg chg="mod">
-          <ac:chgData name="Jacky Cheung" userId="222a41775e9e4c49" providerId="LiveId" clId="{DC5E1C58-07B7-43CF-A154-390D4E638E6A}" dt="2023-12-05T15:36:10.119" v="428" actId="20577"/>
-          <ac:spMkLst>
-            <pc:docMk/>
-            <pc:sldMk cId="249892692" sldId="277"/>
-            <ac:spMk id="11" creationId="{2A7C30E3-E945-2A7D-5300-5113B39189F7}"/>
-          </ac:spMkLst>
-        </pc:spChg>
-        <pc:picChg chg="del">
-          <ac:chgData name="Jacky Cheung" userId="222a41775e9e4c49" providerId="LiveId" clId="{DC5E1C58-07B7-43CF-A154-390D4E638E6A}" dt="2023-12-05T15:35:22.274" v="315" actId="478"/>
-          <ac:picMkLst>
-            <pc:docMk/>
-            <pc:sldMk cId="249892692" sldId="277"/>
-            <ac:picMk id="5" creationId="{46CAE245-9C06-6AC8-0C8B-D4738E45B6C6}"/>
-          </ac:picMkLst>
-        </pc:picChg>
-        <pc:picChg chg="add mod">
-          <ac:chgData name="Jacky Cheung" userId="222a41775e9e4c49" providerId="LiveId" clId="{DC5E1C58-07B7-43CF-A154-390D4E638E6A}" dt="2023-12-05T15:37:26.746" v="432" actId="1037"/>
-          <ac:picMkLst>
-            <pc:docMk/>
-            <pc:sldMk cId="249892692" sldId="277"/>
-            <ac:picMk id="6" creationId="{D53F4F58-C796-91B9-73DC-4846E2FAB14F}"/>
-          </ac:picMkLst>
-        </pc:picChg>
-        <pc:picChg chg="del">
-          <ac:chgData name="Jacky Cheung" userId="222a41775e9e4c49" providerId="LiveId" clId="{DC5E1C58-07B7-43CF-A154-390D4E638E6A}" dt="2023-12-05T15:35:23.074" v="316" actId="478"/>
-          <ac:picMkLst>
-            <pc:docMk/>
-            <pc:sldMk cId="249892692" sldId="277"/>
-            <ac:picMk id="7" creationId="{D26E3FA5-8402-DECA-BAC3-C42D692725A6}"/>
-          </ac:picMkLst>
-        </pc:picChg>
-        <pc:picChg chg="add mod">
-          <ac:chgData name="Jacky Cheung" userId="222a41775e9e4c49" providerId="LiveId" clId="{DC5E1C58-07B7-43CF-A154-390D4E638E6A}" dt="2023-12-05T15:37:53.294" v="435" actId="14100"/>
-          <ac:picMkLst>
-            <pc:docMk/>
-            <pc:sldMk cId="249892692" sldId="277"/>
-            <ac:picMk id="13" creationId="{12FE90A1-15A0-B3F7-430F-54D1A69B43F3}"/>
-          </ac:picMkLst>
-        </pc:picChg>
-      </pc:sldChg>
-      <pc:sldChg chg="new del">
-        <pc:chgData name="Jacky Cheung" userId="222a41775e9e4c49" providerId="LiveId" clId="{DC5E1C58-07B7-43CF-A154-390D4E638E6A}" dt="2023-12-05T15:18:57.602" v="131" actId="47"/>
-        <pc:sldMkLst>
-          <pc:docMk/>
-          <pc:sldMk cId="3573162338" sldId="284"/>
-        </pc:sldMkLst>
-      </pc:sldChg>
-      <pc:sldChg chg="modSp add mod">
-        <pc:chgData name="Jacky Cheung" userId="222a41775e9e4c49" providerId="LiveId" clId="{DC5E1C58-07B7-43CF-A154-390D4E638E6A}" dt="2023-12-05T15:22:09.341" v="219" actId="20577"/>
-        <pc:sldMkLst>
-          <pc:docMk/>
-          <pc:sldMk cId="76039908" sldId="285"/>
-        </pc:sldMkLst>
-        <pc:spChg chg="mod">
-          <ac:chgData name="Jacky Cheung" userId="222a41775e9e4c49" providerId="LiveId" clId="{DC5E1C58-07B7-43CF-A154-390D4E638E6A}" dt="2023-12-05T15:21:57.590" v="205" actId="2711"/>
-          <ac:spMkLst>
-            <pc:docMk/>
-            <pc:sldMk cId="76039908" sldId="285"/>
-            <ac:spMk id="2" creationId="{6D7DE610-94CD-21B2-096A-04255AC75CFF}"/>
-          </ac:spMkLst>
-        </pc:spChg>
-        <pc:spChg chg="mod">
-          <ac:chgData name="Jacky Cheung" userId="222a41775e9e4c49" providerId="LiveId" clId="{DC5E1C58-07B7-43CF-A154-390D4E638E6A}" dt="2023-12-05T15:22:09.341" v="219" actId="20577"/>
-          <ac:spMkLst>
-            <pc:docMk/>
-            <pc:sldMk cId="76039908" sldId="285"/>
-            <ac:spMk id="4" creationId="{F9A02599-C567-4094-87C3-49FAF32AC0AC}"/>
-          </ac:spMkLst>
-        </pc:spChg>
-        <pc:spChg chg="mod">
-          <ac:chgData name="Jacky Cheung" userId="222a41775e9e4c49" providerId="LiveId" clId="{DC5E1C58-07B7-43CF-A154-390D4E638E6A}" dt="2023-12-05T15:21:42.609" v="204" actId="113"/>
-          <ac:spMkLst>
-            <pc:docMk/>
-            <pc:sldMk cId="76039908" sldId="285"/>
-            <ac:spMk id="9" creationId="{519B31CE-64BA-A346-E53B-C81B53AC9773}"/>
-          </ac:spMkLst>
-        </pc:spChg>
-      </pc:sldChg>
-      <pc:sldChg chg="add del">
-        <pc:chgData name="Jacky Cheung" userId="222a41775e9e4c49" providerId="LiveId" clId="{DC5E1C58-07B7-43CF-A154-390D4E638E6A}" dt="2023-12-05T15:22:56.722" v="233" actId="47"/>
-        <pc:sldMkLst>
-          <pc:docMk/>
-          <pc:sldMk cId="1254234961" sldId="286"/>
-        </pc:sldMkLst>
-      </pc:sldChg>
-      <pc:sldChg chg="addSp delSp modSp add mod">
-        <pc:chgData name="Jacky Cheung" userId="222a41775e9e4c49" providerId="LiveId" clId="{DC5E1C58-07B7-43CF-A154-390D4E638E6A}" dt="2023-12-05T15:44:50.274" v="659" actId="14100"/>
-        <pc:sldMkLst>
-          <pc:docMk/>
-          <pc:sldMk cId="2889971005" sldId="286"/>
-        </pc:sldMkLst>
-        <pc:spChg chg="mod">
-          <ac:chgData name="Jacky Cheung" userId="222a41775e9e4c49" providerId="LiveId" clId="{DC5E1C58-07B7-43CF-A154-390D4E638E6A}" dt="2023-12-05T15:44:24.839" v="648" actId="14100"/>
-          <ac:spMkLst>
-            <pc:docMk/>
-            <pc:sldMk cId="2889971005" sldId="286"/>
-            <ac:spMk id="9" creationId="{3689FC0D-3B70-6E90-6415-AC8FFD1E0019}"/>
-          </ac:spMkLst>
-        </pc:spChg>
-        <pc:spChg chg="mod">
-          <ac:chgData name="Jacky Cheung" userId="222a41775e9e4c49" providerId="LiveId" clId="{DC5E1C58-07B7-43CF-A154-390D4E638E6A}" dt="2023-12-05T15:44:45.928" v="657" actId="14100"/>
-          <ac:spMkLst>
-            <pc:docMk/>
-            <pc:sldMk cId="2889971005" sldId="286"/>
-            <ac:spMk id="11" creationId="{2A7C30E3-E945-2A7D-5300-5113B39189F7}"/>
-          </ac:spMkLst>
-        </pc:spChg>
-        <pc:picChg chg="add mod">
-          <ac:chgData name="Jacky Cheung" userId="222a41775e9e4c49" providerId="LiveId" clId="{DC5E1C58-07B7-43CF-A154-390D4E638E6A}" dt="2023-12-05T15:44:50.274" v="659" actId="14100"/>
-          <ac:picMkLst>
-            <pc:docMk/>
-            <pc:sldMk cId="2889971005" sldId="286"/>
-            <ac:picMk id="7" creationId="{41E15D5C-3F14-22D4-3039-32660DA37A05}"/>
-          </ac:picMkLst>
-        </pc:picChg>
-        <pc:picChg chg="del">
-          <ac:chgData name="Jacky Cheung" userId="222a41775e9e4c49" providerId="LiveId" clId="{DC5E1C58-07B7-43CF-A154-390D4E638E6A}" dt="2023-12-05T15:40:38.139" v="485" actId="478"/>
-          <ac:picMkLst>
-            <pc:docMk/>
-            <pc:sldMk cId="2889971005" sldId="286"/>
-            <ac:picMk id="10" creationId="{1309B04B-B60F-37F3-7B1C-5028D22C3640}"/>
-          </ac:picMkLst>
-        </pc:picChg>
-        <pc:picChg chg="add mod">
-          <ac:chgData name="Jacky Cheung" userId="222a41775e9e4c49" providerId="LiveId" clId="{DC5E1C58-07B7-43CF-A154-390D4E638E6A}" dt="2023-12-05T15:44:31.288" v="651" actId="1076"/>
-          <ac:picMkLst>
-            <pc:docMk/>
-            <pc:sldMk cId="2889971005" sldId="286"/>
-            <ac:picMk id="12" creationId="{0D237E0E-933B-29BA-E674-E45DA17EDFEB}"/>
-          </ac:picMkLst>
-        </pc:picChg>
-        <pc:picChg chg="del">
-          <ac:chgData name="Jacky Cheung" userId="222a41775e9e4c49" providerId="LiveId" clId="{DC5E1C58-07B7-43CF-A154-390D4E638E6A}" dt="2023-12-05T15:40:38.912" v="486" actId="478"/>
-          <ac:picMkLst>
-            <pc:docMk/>
-            <pc:sldMk cId="2889971005" sldId="286"/>
-            <ac:picMk id="13" creationId="{D890722E-2405-F0A7-967C-47D42F68B0F0}"/>
-          </ac:picMkLst>
-        </pc:picChg>
-      </pc:sldChg>
-    </pc:docChg>
-  </pc:docChgLst>
-  <pc:docChgLst>
     <pc:chgData name="Jacky Cheung" userId="222a41775e9e4c49" providerId="LiveId" clId="{CB90208F-4777-43E7-A57B-CE2C2E26BA3B}"/>
     <pc:docChg chg="undo redo custSel addSld delSld modSld sldOrd">
       <pc:chgData name="Jacky Cheung" userId="222a41775e9e4c49" providerId="LiveId" clId="{CB90208F-4777-43E7-A57B-CE2C2E26BA3B}" dt="2023-10-27T06:16:20.576" v="2387" actId="2711"/>
@@ -2408,6 +1437,977 @@
           <pc:docMk/>
           <pc:sldMk cId="3468584237" sldId="283"/>
         </pc:sldMkLst>
+      </pc:sldChg>
+    </pc:docChg>
+  </pc:docChgLst>
+  <pc:docChgLst>
+    <pc:chgData name="Jacky Cheung" userId="222a41775e9e4c49" providerId="LiveId" clId="{05800059-C45E-4025-97B2-F59A9646E5B3}"/>
+    <pc:docChg chg="custSel delSld modSld">
+      <pc:chgData name="Jacky Cheung" userId="222a41775e9e4c49" providerId="LiveId" clId="{05800059-C45E-4025-97B2-F59A9646E5B3}" dt="2023-10-09T05:08:13.902" v="117" actId="20577"/>
+      <pc:docMkLst>
+        <pc:docMk/>
+      </pc:docMkLst>
+      <pc:sldChg chg="modSp mod">
+        <pc:chgData name="Jacky Cheung" userId="222a41775e9e4c49" providerId="LiveId" clId="{05800059-C45E-4025-97B2-F59A9646E5B3}" dt="2023-10-09T05:05:27.274" v="30" actId="20577"/>
+        <pc:sldMkLst>
+          <pc:docMk/>
+          <pc:sldMk cId="2829691241" sldId="256"/>
+        </pc:sldMkLst>
+        <pc:spChg chg="mod">
+          <ac:chgData name="Jacky Cheung" userId="222a41775e9e4c49" providerId="LiveId" clId="{05800059-C45E-4025-97B2-F59A9646E5B3}" dt="2023-10-09T05:04:42.197" v="11"/>
+          <ac:spMkLst>
+            <pc:docMk/>
+            <pc:sldMk cId="2829691241" sldId="256"/>
+            <ac:spMk id="2" creationId="{28469AF5-FDFC-9AB1-280F-AAC97129A11B}"/>
+          </ac:spMkLst>
+        </pc:spChg>
+        <pc:spChg chg="mod">
+          <ac:chgData name="Jacky Cheung" userId="222a41775e9e4c49" providerId="LiveId" clId="{05800059-C45E-4025-97B2-F59A9646E5B3}" dt="2023-10-09T05:05:27.274" v="30" actId="20577"/>
+          <ac:spMkLst>
+            <pc:docMk/>
+            <pc:sldMk cId="2829691241" sldId="256"/>
+            <ac:spMk id="3" creationId="{EB3EE9A3-FD3F-B66C-46A0-B5131A22C72B}"/>
+          </ac:spMkLst>
+        </pc:spChg>
+      </pc:sldChg>
+      <pc:sldChg chg="modSp del">
+        <pc:chgData name="Jacky Cheung" userId="222a41775e9e4c49" providerId="LiveId" clId="{05800059-C45E-4025-97B2-F59A9646E5B3}" dt="2023-10-09T05:05:12.370" v="14" actId="47"/>
+        <pc:sldMkLst>
+          <pc:docMk/>
+          <pc:sldMk cId="307226430" sldId="257"/>
+        </pc:sldMkLst>
+        <pc:spChg chg="mod">
+          <ac:chgData name="Jacky Cheung" userId="222a41775e9e4c49" providerId="LiveId" clId="{05800059-C45E-4025-97B2-F59A9646E5B3}" dt="2023-10-09T05:04:42.197" v="11"/>
+          <ac:spMkLst>
+            <pc:docMk/>
+            <pc:sldMk cId="307226430" sldId="257"/>
+            <ac:spMk id="2" creationId="{838E4D56-0D2F-8D10-D26A-4B5E9F190C3F}"/>
+          </ac:spMkLst>
+        </pc:spChg>
+        <pc:spChg chg="mod">
+          <ac:chgData name="Jacky Cheung" userId="222a41775e9e4c49" providerId="LiveId" clId="{05800059-C45E-4025-97B2-F59A9646E5B3}" dt="2023-10-09T05:04:42.197" v="11"/>
+          <ac:spMkLst>
+            <pc:docMk/>
+            <pc:sldMk cId="307226430" sldId="257"/>
+            <ac:spMk id="3" creationId="{2659C664-FDC9-3F5A-6191-B831733CE3E6}"/>
+          </ac:spMkLst>
+        </pc:spChg>
+      </pc:sldChg>
+      <pc:sldChg chg="modSp del">
+        <pc:chgData name="Jacky Cheung" userId="222a41775e9e4c49" providerId="LiveId" clId="{05800059-C45E-4025-97B2-F59A9646E5B3}" dt="2023-10-09T05:05:12.370" v="14" actId="47"/>
+        <pc:sldMkLst>
+          <pc:docMk/>
+          <pc:sldMk cId="2493029288" sldId="258"/>
+        </pc:sldMkLst>
+        <pc:spChg chg="mod">
+          <ac:chgData name="Jacky Cheung" userId="222a41775e9e4c49" providerId="LiveId" clId="{05800059-C45E-4025-97B2-F59A9646E5B3}" dt="2023-10-09T05:04:42.197" v="11"/>
+          <ac:spMkLst>
+            <pc:docMk/>
+            <pc:sldMk cId="2493029288" sldId="258"/>
+            <ac:spMk id="2" creationId="{0AAD1A42-7AB4-E88D-5BD0-F657B343605A}"/>
+          </ac:spMkLst>
+        </pc:spChg>
+        <pc:spChg chg="mod">
+          <ac:chgData name="Jacky Cheung" userId="222a41775e9e4c49" providerId="LiveId" clId="{05800059-C45E-4025-97B2-F59A9646E5B3}" dt="2023-10-09T05:04:42.197" v="11"/>
+          <ac:spMkLst>
+            <pc:docMk/>
+            <pc:sldMk cId="2493029288" sldId="258"/>
+            <ac:spMk id="3" creationId="{B6D5F28D-2EE9-F539-EDDA-552B6F30581A}"/>
+          </ac:spMkLst>
+        </pc:spChg>
+      </pc:sldChg>
+      <pc:sldChg chg="addSp delSp modSp del mod">
+        <pc:chgData name="Jacky Cheung" userId="222a41775e9e4c49" providerId="LiveId" clId="{05800059-C45E-4025-97B2-F59A9646E5B3}" dt="2023-10-09T05:05:12.370" v="14" actId="47"/>
+        <pc:sldMkLst>
+          <pc:docMk/>
+          <pc:sldMk cId="2871054885" sldId="259"/>
+        </pc:sldMkLst>
+        <pc:spChg chg="mod">
+          <ac:chgData name="Jacky Cheung" userId="222a41775e9e4c49" providerId="LiveId" clId="{05800059-C45E-4025-97B2-F59A9646E5B3}" dt="2023-10-09T05:04:42.197" v="11"/>
+          <ac:spMkLst>
+            <pc:docMk/>
+            <pc:sldMk cId="2871054885" sldId="259"/>
+            <ac:spMk id="2" creationId="{0AAD1A42-7AB4-E88D-5BD0-F657B343605A}"/>
+          </ac:spMkLst>
+        </pc:spChg>
+        <pc:spChg chg="mod">
+          <ac:chgData name="Jacky Cheung" userId="222a41775e9e4c49" providerId="LiveId" clId="{05800059-C45E-4025-97B2-F59A9646E5B3}" dt="2023-10-09T05:04:42.197" v="11"/>
+          <ac:spMkLst>
+            <pc:docMk/>
+            <pc:sldMk cId="2871054885" sldId="259"/>
+            <ac:spMk id="3" creationId="{B6D5F28D-2EE9-F539-EDDA-552B6F30581A}"/>
+          </ac:spMkLst>
+        </pc:spChg>
+        <pc:picChg chg="add del mod">
+          <ac:chgData name="Jacky Cheung" userId="222a41775e9e4c49" providerId="LiveId" clId="{05800059-C45E-4025-97B2-F59A9646E5B3}" dt="2023-10-09T05:04:48.021" v="12" actId="21"/>
+          <ac:picMkLst>
+            <pc:docMk/>
+            <pc:sldMk cId="2871054885" sldId="259"/>
+            <ac:picMk id="4" creationId="{13DA4735-0AF1-09D6-1E74-2BD742A90731}"/>
+          </ac:picMkLst>
+        </pc:picChg>
+      </pc:sldChg>
+      <pc:sldChg chg="addSp delSp modSp del mod">
+        <pc:chgData name="Jacky Cheung" userId="222a41775e9e4c49" providerId="LiveId" clId="{05800059-C45E-4025-97B2-F59A9646E5B3}" dt="2023-10-09T05:05:12.370" v="14" actId="47"/>
+        <pc:sldMkLst>
+          <pc:docMk/>
+          <pc:sldMk cId="3461325239" sldId="260"/>
+        </pc:sldMkLst>
+        <pc:spChg chg="mod">
+          <ac:chgData name="Jacky Cheung" userId="222a41775e9e4c49" providerId="LiveId" clId="{05800059-C45E-4025-97B2-F59A9646E5B3}" dt="2023-10-09T05:04:42.197" v="11"/>
+          <ac:spMkLst>
+            <pc:docMk/>
+            <pc:sldMk cId="3461325239" sldId="260"/>
+            <ac:spMk id="2" creationId="{D1CD71C8-3FA0-DEB4-50C6-B38B61F3A3D4}"/>
+          </ac:spMkLst>
+        </pc:spChg>
+        <pc:spChg chg="mod">
+          <ac:chgData name="Jacky Cheung" userId="222a41775e9e4c49" providerId="LiveId" clId="{05800059-C45E-4025-97B2-F59A9646E5B3}" dt="2023-10-09T05:04:42.197" v="11"/>
+          <ac:spMkLst>
+            <pc:docMk/>
+            <pc:sldMk cId="3461325239" sldId="260"/>
+            <ac:spMk id="3" creationId="{E9D0BD69-A689-647F-D70F-081CDB681E8A}"/>
+          </ac:spMkLst>
+        </pc:spChg>
+        <pc:picChg chg="add del mod">
+          <ac:chgData name="Jacky Cheung" userId="222a41775e9e4c49" providerId="LiveId" clId="{05800059-C45E-4025-97B2-F59A9646E5B3}" dt="2023-10-08T05:11:11.514" v="5" actId="21"/>
+          <ac:picMkLst>
+            <pc:docMk/>
+            <pc:sldMk cId="3461325239" sldId="260"/>
+            <ac:picMk id="5" creationId="{7E693D4B-B965-F77F-7311-725F46087A9C}"/>
+          </ac:picMkLst>
+        </pc:picChg>
+      </pc:sldChg>
+      <pc:sldChg chg="modSp del">
+        <pc:chgData name="Jacky Cheung" userId="222a41775e9e4c49" providerId="LiveId" clId="{05800059-C45E-4025-97B2-F59A9646E5B3}" dt="2023-10-09T05:05:12.370" v="14" actId="47"/>
+        <pc:sldMkLst>
+          <pc:docMk/>
+          <pc:sldMk cId="369788960" sldId="261"/>
+        </pc:sldMkLst>
+        <pc:spChg chg="mod">
+          <ac:chgData name="Jacky Cheung" userId="222a41775e9e4c49" providerId="LiveId" clId="{05800059-C45E-4025-97B2-F59A9646E5B3}" dt="2023-10-09T05:04:42.197" v="11"/>
+          <ac:spMkLst>
+            <pc:docMk/>
+            <pc:sldMk cId="369788960" sldId="261"/>
+            <ac:spMk id="2" creationId="{4B6331CB-5796-209A-EFBB-072BBAA5E7BD}"/>
+          </ac:spMkLst>
+        </pc:spChg>
+        <pc:spChg chg="mod">
+          <ac:chgData name="Jacky Cheung" userId="222a41775e9e4c49" providerId="LiveId" clId="{05800059-C45E-4025-97B2-F59A9646E5B3}" dt="2023-10-09T05:04:42.197" v="11"/>
+          <ac:spMkLst>
+            <pc:docMk/>
+            <pc:sldMk cId="369788960" sldId="261"/>
+            <ac:spMk id="3" creationId="{A7A31F80-6395-8A6F-EC5B-C1D083585223}"/>
+          </ac:spMkLst>
+        </pc:spChg>
+      </pc:sldChg>
+      <pc:sldChg chg="addSp modSp">
+        <pc:chgData name="Jacky Cheung" userId="222a41775e9e4c49" providerId="LiveId" clId="{05800059-C45E-4025-97B2-F59A9646E5B3}" dt="2023-10-09T05:05:50.047" v="31"/>
+        <pc:sldMkLst>
+          <pc:docMk/>
+          <pc:sldMk cId="1131925519" sldId="262"/>
+        </pc:sldMkLst>
+        <pc:spChg chg="mod">
+          <ac:chgData name="Jacky Cheung" userId="222a41775e9e4c49" providerId="LiveId" clId="{05800059-C45E-4025-97B2-F59A9646E5B3}" dt="2023-10-09T05:04:42.197" v="11"/>
+          <ac:spMkLst>
+            <pc:docMk/>
+            <pc:sldMk cId="1131925519" sldId="262"/>
+            <ac:spMk id="2" creationId="{BD4A6A34-70BE-8484-4B9F-F64F0A0570F8}"/>
+          </ac:spMkLst>
+        </pc:spChg>
+        <pc:spChg chg="mod">
+          <ac:chgData name="Jacky Cheung" userId="222a41775e9e4c49" providerId="LiveId" clId="{05800059-C45E-4025-97B2-F59A9646E5B3}" dt="2023-10-09T05:04:42.197" v="11"/>
+          <ac:spMkLst>
+            <pc:docMk/>
+            <pc:sldMk cId="1131925519" sldId="262"/>
+            <ac:spMk id="3" creationId="{C838D6D8-D51E-97DB-CFEB-1AF0F9A44891}"/>
+          </ac:spMkLst>
+        </pc:spChg>
+        <pc:picChg chg="add mod">
+          <ac:chgData name="Jacky Cheung" userId="222a41775e9e4c49" providerId="LiveId" clId="{05800059-C45E-4025-97B2-F59A9646E5B3}" dt="2023-10-09T05:05:50.047" v="31"/>
+          <ac:picMkLst>
+            <pc:docMk/>
+            <pc:sldMk cId="1131925519" sldId="262"/>
+            <ac:picMk id="4" creationId="{D3F1FF81-892D-D5A5-A043-7FEBD0658096}"/>
+          </ac:picMkLst>
+        </pc:picChg>
+      </pc:sldChg>
+      <pc:sldChg chg="modSp">
+        <pc:chgData name="Jacky Cheung" userId="222a41775e9e4c49" providerId="LiveId" clId="{05800059-C45E-4025-97B2-F59A9646E5B3}" dt="2023-10-09T05:04:42.197" v="11"/>
+        <pc:sldMkLst>
+          <pc:docMk/>
+          <pc:sldMk cId="1315235822" sldId="263"/>
+        </pc:sldMkLst>
+        <pc:spChg chg="mod">
+          <ac:chgData name="Jacky Cheung" userId="222a41775e9e4c49" providerId="LiveId" clId="{05800059-C45E-4025-97B2-F59A9646E5B3}" dt="2023-10-09T05:04:42.197" v="11"/>
+          <ac:spMkLst>
+            <pc:docMk/>
+            <pc:sldMk cId="1315235822" sldId="263"/>
+            <ac:spMk id="2" creationId="{BD4A6A34-70BE-8484-4B9F-F64F0A0570F8}"/>
+          </ac:spMkLst>
+        </pc:spChg>
+        <pc:spChg chg="mod">
+          <ac:chgData name="Jacky Cheung" userId="222a41775e9e4c49" providerId="LiveId" clId="{05800059-C45E-4025-97B2-F59A9646E5B3}" dt="2023-10-09T05:04:42.197" v="11"/>
+          <ac:spMkLst>
+            <pc:docMk/>
+            <pc:sldMk cId="1315235822" sldId="263"/>
+            <ac:spMk id="3" creationId="{C838D6D8-D51E-97DB-CFEB-1AF0F9A44891}"/>
+          </ac:spMkLst>
+        </pc:spChg>
+      </pc:sldChg>
+      <pc:sldChg chg="modSp">
+        <pc:chgData name="Jacky Cheung" userId="222a41775e9e4c49" providerId="LiveId" clId="{05800059-C45E-4025-97B2-F59A9646E5B3}" dt="2023-10-09T05:04:42.197" v="11"/>
+        <pc:sldMkLst>
+          <pc:docMk/>
+          <pc:sldMk cId="1518886697" sldId="264"/>
+        </pc:sldMkLst>
+        <pc:spChg chg="mod">
+          <ac:chgData name="Jacky Cheung" userId="222a41775e9e4c49" providerId="LiveId" clId="{05800059-C45E-4025-97B2-F59A9646E5B3}" dt="2023-10-09T05:04:42.197" v="11"/>
+          <ac:spMkLst>
+            <pc:docMk/>
+            <pc:sldMk cId="1518886697" sldId="264"/>
+            <ac:spMk id="2" creationId="{A45EF47A-5B59-4177-6F37-D7526D2F4A8D}"/>
+          </ac:spMkLst>
+        </pc:spChg>
+        <pc:spChg chg="mod">
+          <ac:chgData name="Jacky Cheung" userId="222a41775e9e4c49" providerId="LiveId" clId="{05800059-C45E-4025-97B2-F59A9646E5B3}" dt="2023-10-09T05:04:42.197" v="11"/>
+          <ac:spMkLst>
+            <pc:docMk/>
+            <pc:sldMk cId="1518886697" sldId="264"/>
+            <ac:spMk id="3" creationId="{4F243655-9DB8-B885-5AF1-E693F989D927}"/>
+          </ac:spMkLst>
+        </pc:spChg>
+      </pc:sldChg>
+      <pc:sldChg chg="modSp del">
+        <pc:chgData name="Jacky Cheung" userId="222a41775e9e4c49" providerId="LiveId" clId="{05800059-C45E-4025-97B2-F59A9646E5B3}" dt="2023-10-09T05:05:12.370" v="14" actId="47"/>
+        <pc:sldMkLst>
+          <pc:docMk/>
+          <pc:sldMk cId="151917472" sldId="265"/>
+        </pc:sldMkLst>
+        <pc:spChg chg="mod">
+          <ac:chgData name="Jacky Cheung" userId="222a41775e9e4c49" providerId="LiveId" clId="{05800059-C45E-4025-97B2-F59A9646E5B3}" dt="2023-10-09T05:04:42.197" v="11"/>
+          <ac:spMkLst>
+            <pc:docMk/>
+            <pc:sldMk cId="151917472" sldId="265"/>
+            <ac:spMk id="4" creationId="{5B044F74-8B01-599B-5739-47DB3B2A0989}"/>
+          </ac:spMkLst>
+        </pc:spChg>
+        <pc:spChg chg="mod">
+          <ac:chgData name="Jacky Cheung" userId="222a41775e9e4c49" providerId="LiveId" clId="{05800059-C45E-4025-97B2-F59A9646E5B3}" dt="2023-10-09T05:04:42.197" v="11"/>
+          <ac:spMkLst>
+            <pc:docMk/>
+            <pc:sldMk cId="151917472" sldId="265"/>
+            <ac:spMk id="5" creationId="{06E88A76-C556-0CC2-D519-01C16D395BE8}"/>
+          </ac:spMkLst>
+        </pc:spChg>
+      </pc:sldChg>
+      <pc:sldChg chg="modSp">
+        <pc:chgData name="Jacky Cheung" userId="222a41775e9e4c49" providerId="LiveId" clId="{05800059-C45E-4025-97B2-F59A9646E5B3}" dt="2023-10-09T05:04:42.197" v="11"/>
+        <pc:sldMkLst>
+          <pc:docMk/>
+          <pc:sldMk cId="1528687700" sldId="266"/>
+        </pc:sldMkLst>
+        <pc:spChg chg="mod">
+          <ac:chgData name="Jacky Cheung" userId="222a41775e9e4c49" providerId="LiveId" clId="{05800059-C45E-4025-97B2-F59A9646E5B3}" dt="2023-10-09T05:04:42.197" v="11"/>
+          <ac:spMkLst>
+            <pc:docMk/>
+            <pc:sldMk cId="1528687700" sldId="266"/>
+            <ac:spMk id="4" creationId="{3CF152EC-4936-EA3A-2D08-223EC7DDDEDC}"/>
+          </ac:spMkLst>
+        </pc:spChg>
+        <pc:spChg chg="mod">
+          <ac:chgData name="Jacky Cheung" userId="222a41775e9e4c49" providerId="LiveId" clId="{05800059-C45E-4025-97B2-F59A9646E5B3}" dt="2023-10-09T05:04:42.197" v="11"/>
+          <ac:spMkLst>
+            <pc:docMk/>
+            <pc:sldMk cId="1528687700" sldId="266"/>
+            <ac:spMk id="5" creationId="{B5C096C4-6160-6D7A-ED56-4C22B83A66C8}"/>
+          </ac:spMkLst>
+        </pc:spChg>
+      </pc:sldChg>
+      <pc:sldChg chg="addSp modSp">
+        <pc:chgData name="Jacky Cheung" userId="222a41775e9e4c49" providerId="LiveId" clId="{05800059-C45E-4025-97B2-F59A9646E5B3}" dt="2023-10-09T05:05:00.549" v="13"/>
+        <pc:sldMkLst>
+          <pc:docMk/>
+          <pc:sldMk cId="3386539458" sldId="267"/>
+        </pc:sldMkLst>
+        <pc:spChg chg="mod">
+          <ac:chgData name="Jacky Cheung" userId="222a41775e9e4c49" providerId="LiveId" clId="{05800059-C45E-4025-97B2-F59A9646E5B3}" dt="2023-10-09T05:04:42.197" v="11"/>
+          <ac:spMkLst>
+            <pc:docMk/>
+            <pc:sldMk cId="3386539458" sldId="267"/>
+            <ac:spMk id="2" creationId="{2C35D016-AD14-9F34-7361-0B40138F2329}"/>
+          </ac:spMkLst>
+        </pc:spChg>
+        <pc:spChg chg="mod">
+          <ac:chgData name="Jacky Cheung" userId="222a41775e9e4c49" providerId="LiveId" clId="{05800059-C45E-4025-97B2-F59A9646E5B3}" dt="2023-10-09T05:04:42.197" v="11"/>
+          <ac:spMkLst>
+            <pc:docMk/>
+            <pc:sldMk cId="3386539458" sldId="267"/>
+            <ac:spMk id="3" creationId="{71D3AB14-1CF3-34C6-8B6C-58173C6A8818}"/>
+          </ac:spMkLst>
+        </pc:spChg>
+        <pc:picChg chg="add mod">
+          <ac:chgData name="Jacky Cheung" userId="222a41775e9e4c49" providerId="LiveId" clId="{05800059-C45E-4025-97B2-F59A9646E5B3}" dt="2023-10-09T05:05:00.549" v="13"/>
+          <ac:picMkLst>
+            <pc:docMk/>
+            <pc:sldMk cId="3386539458" sldId="267"/>
+            <ac:picMk id="4" creationId="{5B98141D-0A1F-7764-47C8-9A3212391DDD}"/>
+          </ac:picMkLst>
+        </pc:picChg>
+      </pc:sldChg>
+      <pc:sldChg chg="modSp">
+        <pc:chgData name="Jacky Cheung" userId="222a41775e9e4c49" providerId="LiveId" clId="{05800059-C45E-4025-97B2-F59A9646E5B3}" dt="2023-10-09T05:04:42.197" v="11"/>
+        <pc:sldMkLst>
+          <pc:docMk/>
+          <pc:sldMk cId="1741544213" sldId="268"/>
+        </pc:sldMkLst>
+        <pc:spChg chg="mod">
+          <ac:chgData name="Jacky Cheung" userId="222a41775e9e4c49" providerId="LiveId" clId="{05800059-C45E-4025-97B2-F59A9646E5B3}" dt="2023-10-09T05:04:42.197" v="11"/>
+          <ac:spMkLst>
+            <pc:docMk/>
+            <pc:sldMk cId="1741544213" sldId="268"/>
+            <ac:spMk id="2" creationId="{6651759B-C18F-314F-2798-B97253EC2B35}"/>
+          </ac:spMkLst>
+        </pc:spChg>
+        <pc:spChg chg="mod">
+          <ac:chgData name="Jacky Cheung" userId="222a41775e9e4c49" providerId="LiveId" clId="{05800059-C45E-4025-97B2-F59A9646E5B3}" dt="2023-10-09T05:04:42.197" v="11"/>
+          <ac:spMkLst>
+            <pc:docMk/>
+            <pc:sldMk cId="1741544213" sldId="268"/>
+            <ac:spMk id="3" creationId="{04C50C1A-09C6-2C7A-D685-6DB0396A548F}"/>
+          </ac:spMkLst>
+        </pc:spChg>
+      </pc:sldChg>
+      <pc:sldChg chg="modSp mod">
+        <pc:chgData name="Jacky Cheung" userId="222a41775e9e4c49" providerId="LiveId" clId="{05800059-C45E-4025-97B2-F59A9646E5B3}" dt="2023-10-09T05:04:42.197" v="11"/>
+        <pc:sldMkLst>
+          <pc:docMk/>
+          <pc:sldMk cId="1423961563" sldId="269"/>
+        </pc:sldMkLst>
+        <pc:spChg chg="mod">
+          <ac:chgData name="Jacky Cheung" userId="222a41775e9e4c49" providerId="LiveId" clId="{05800059-C45E-4025-97B2-F59A9646E5B3}" dt="2023-10-09T05:04:42.197" v="11"/>
+          <ac:spMkLst>
+            <pc:docMk/>
+            <pc:sldMk cId="1423961563" sldId="269"/>
+            <ac:spMk id="2" creationId="{4B7DD928-1D95-1EF3-C7A8-5656DEE92712}"/>
+          </ac:spMkLst>
+        </pc:spChg>
+        <pc:spChg chg="mod">
+          <ac:chgData name="Jacky Cheung" userId="222a41775e9e4c49" providerId="LiveId" clId="{05800059-C45E-4025-97B2-F59A9646E5B3}" dt="2023-10-09T05:04:42.197" v="11"/>
+          <ac:spMkLst>
+            <pc:docMk/>
+            <pc:sldMk cId="1423961563" sldId="269"/>
+            <ac:spMk id="3" creationId="{18C12FCC-003E-78C3-D896-D852100C28F8}"/>
+          </ac:spMkLst>
+        </pc:spChg>
+      </pc:sldChg>
+      <pc:sldChg chg="modSp">
+        <pc:chgData name="Jacky Cheung" userId="222a41775e9e4c49" providerId="LiveId" clId="{05800059-C45E-4025-97B2-F59A9646E5B3}" dt="2023-10-09T05:08:13.902" v="117" actId="20577"/>
+        <pc:sldMkLst>
+          <pc:docMk/>
+          <pc:sldMk cId="3781643426" sldId="270"/>
+        </pc:sldMkLst>
+        <pc:spChg chg="mod">
+          <ac:chgData name="Jacky Cheung" userId="222a41775e9e4c49" providerId="LiveId" clId="{05800059-C45E-4025-97B2-F59A9646E5B3}" dt="2023-10-09T05:04:42.197" v="11"/>
+          <ac:spMkLst>
+            <pc:docMk/>
+            <pc:sldMk cId="3781643426" sldId="270"/>
+            <ac:spMk id="2" creationId="{3F8D282D-C6C1-E111-2FEA-12008EB15A91}"/>
+          </ac:spMkLst>
+        </pc:spChg>
+        <pc:graphicFrameChg chg="mod">
+          <ac:chgData name="Jacky Cheung" userId="222a41775e9e4c49" providerId="LiveId" clId="{05800059-C45E-4025-97B2-F59A9646E5B3}" dt="2023-10-09T05:08:13.902" v="117" actId="20577"/>
+          <ac:graphicFrameMkLst>
+            <pc:docMk/>
+            <pc:sldMk cId="3781643426" sldId="270"/>
+            <ac:graphicFrameMk id="4" creationId="{5BEE7704-C4A3-CD9C-F159-10F737E56286}"/>
+          </ac:graphicFrameMkLst>
+        </pc:graphicFrameChg>
+      </pc:sldChg>
+    </pc:docChg>
+  </pc:docChgLst>
+  <pc:docChgLst>
+    <pc:chgData name="Jacky Cheung" userId="222a41775e9e4c49" providerId="LiveId" clId="{DC5E1C58-07B7-43CF-A154-390D4E638E6A}"/>
+    <pc:docChg chg="undo custSel addSld delSld modSld">
+      <pc:chgData name="Jacky Cheung" userId="222a41775e9e4c49" providerId="LiveId" clId="{DC5E1C58-07B7-43CF-A154-390D4E638E6A}" dt="2023-12-05T15:46:47.406" v="741" actId="20577"/>
+      <pc:docMkLst>
+        <pc:docMk/>
+      </pc:docMkLst>
+      <pc:sldChg chg="modSp mod">
+        <pc:chgData name="Jacky Cheung" userId="222a41775e9e4c49" providerId="LiveId" clId="{DC5E1C58-07B7-43CF-A154-390D4E638E6A}" dt="2023-12-05T15:13:06.391" v="35" actId="20577"/>
+        <pc:sldMkLst>
+          <pc:docMk/>
+          <pc:sldMk cId="2829691241" sldId="256"/>
+        </pc:sldMkLst>
+        <pc:spChg chg="mod">
+          <ac:chgData name="Jacky Cheung" userId="222a41775e9e4c49" providerId="LiveId" clId="{DC5E1C58-07B7-43CF-A154-390D4E638E6A}" dt="2023-12-05T15:12:47.189" v="0" actId="20577"/>
+          <ac:spMkLst>
+            <pc:docMk/>
+            <pc:sldMk cId="2829691241" sldId="256"/>
+            <ac:spMk id="3" creationId="{EB3EE9A3-FD3F-B66C-46A0-B5131A22C72B}"/>
+          </ac:spMkLst>
+        </pc:spChg>
+        <pc:spChg chg="mod">
+          <ac:chgData name="Jacky Cheung" userId="222a41775e9e4c49" providerId="LiveId" clId="{DC5E1C58-07B7-43CF-A154-390D4E638E6A}" dt="2023-12-05T15:13:06.391" v="35" actId="20577"/>
+          <ac:spMkLst>
+            <pc:docMk/>
+            <pc:sldMk cId="2829691241" sldId="256"/>
+            <ac:spMk id="5" creationId="{54AA2C18-9ED4-FF50-FE28-A520333E4CDB}"/>
+          </ac:spMkLst>
+        </pc:spChg>
+      </pc:sldChg>
+      <pc:sldChg chg="modSp mod">
+        <pc:chgData name="Jacky Cheung" userId="222a41775e9e4c49" providerId="LiveId" clId="{DC5E1C58-07B7-43CF-A154-390D4E638E6A}" dt="2023-12-05T15:17:21.797" v="112" actId="20577"/>
+        <pc:sldMkLst>
+          <pc:docMk/>
+          <pc:sldMk cId="2493029288" sldId="258"/>
+        </pc:sldMkLst>
+        <pc:spChg chg="mod">
+          <ac:chgData name="Jacky Cheung" userId="222a41775e9e4c49" providerId="LiveId" clId="{DC5E1C58-07B7-43CF-A154-390D4E638E6A}" dt="2023-12-05T15:17:21.797" v="112" actId="20577"/>
+          <ac:spMkLst>
+            <pc:docMk/>
+            <pc:sldMk cId="2493029288" sldId="258"/>
+            <ac:spMk id="3" creationId="{B6D5F28D-2EE9-F539-EDDA-552B6F30581A}"/>
+          </ac:spMkLst>
+        </pc:spChg>
+      </pc:sldChg>
+      <pc:sldChg chg="addSp delSp modSp mod">
+        <pc:chgData name="Jacky Cheung" userId="222a41775e9e4c49" providerId="LiveId" clId="{DC5E1C58-07B7-43CF-A154-390D4E638E6A}" dt="2023-12-05T15:29:58.911" v="248" actId="14100"/>
+        <pc:sldMkLst>
+          <pc:docMk/>
+          <pc:sldMk cId="1131925519" sldId="262"/>
+        </pc:sldMkLst>
+        <pc:picChg chg="del">
+          <ac:chgData name="Jacky Cheung" userId="222a41775e9e4c49" providerId="LiveId" clId="{DC5E1C58-07B7-43CF-A154-390D4E638E6A}" dt="2023-12-05T15:29:42.767" v="245" actId="478"/>
+          <ac:picMkLst>
+            <pc:docMk/>
+            <pc:sldMk cId="1131925519" sldId="262"/>
+            <ac:picMk id="4" creationId="{D3F1FF81-892D-D5A5-A043-7FEBD0658096}"/>
+          </ac:picMkLst>
+        </pc:picChg>
+        <pc:picChg chg="add mod">
+          <ac:chgData name="Jacky Cheung" userId="222a41775e9e4c49" providerId="LiveId" clId="{DC5E1C58-07B7-43CF-A154-390D4E638E6A}" dt="2023-12-05T15:29:58.911" v="248" actId="14100"/>
+          <ac:picMkLst>
+            <pc:docMk/>
+            <pc:sldMk cId="1131925519" sldId="262"/>
+            <ac:picMk id="5" creationId="{7B3C0593-0040-7914-CD4B-E67E0CA3D267}"/>
+          </ac:picMkLst>
+        </pc:picChg>
+      </pc:sldChg>
+      <pc:sldChg chg="addSp modSp mod">
+        <pc:chgData name="Jacky Cheung" userId="222a41775e9e4c49" providerId="LiveId" clId="{DC5E1C58-07B7-43CF-A154-390D4E638E6A}" dt="2023-12-05T15:17:49.020" v="117" actId="20577"/>
+        <pc:sldMkLst>
+          <pc:docMk/>
+          <pc:sldMk cId="1528687700" sldId="266"/>
+        </pc:sldMkLst>
+        <pc:spChg chg="mod">
+          <ac:chgData name="Jacky Cheung" userId="222a41775e9e4c49" providerId="LiveId" clId="{DC5E1C58-07B7-43CF-A154-390D4E638E6A}" dt="2023-12-05T15:14:05.720" v="47" actId="20577"/>
+          <ac:spMkLst>
+            <pc:docMk/>
+            <pc:sldMk cId="1528687700" sldId="266"/>
+            <ac:spMk id="5" creationId="{B5C096C4-6160-6D7A-ED56-4C22B83A66C8}"/>
+          </ac:spMkLst>
+        </pc:spChg>
+        <pc:spChg chg="add mod">
+          <ac:chgData name="Jacky Cheung" userId="222a41775e9e4c49" providerId="LiveId" clId="{DC5E1C58-07B7-43CF-A154-390D4E638E6A}" dt="2023-12-05T15:17:49.020" v="117" actId="20577"/>
+          <ac:spMkLst>
+            <pc:docMk/>
+            <pc:sldMk cId="1528687700" sldId="266"/>
+            <ac:spMk id="7" creationId="{C4E41A94-22D6-F086-CE70-93D67A83EB96}"/>
+          </ac:spMkLst>
+        </pc:spChg>
+      </pc:sldChg>
+      <pc:sldChg chg="addSp delSp modSp mod">
+        <pc:chgData name="Jacky Cheung" userId="222a41775e9e4c49" providerId="LiveId" clId="{DC5E1C58-07B7-43CF-A154-390D4E638E6A}" dt="2023-12-05T15:35:13.808" v="314" actId="14100"/>
+        <pc:sldMkLst>
+          <pc:docMk/>
+          <pc:sldMk cId="1741544213" sldId="268"/>
+        </pc:sldMkLst>
+        <pc:spChg chg="mod">
+          <ac:chgData name="Jacky Cheung" userId="222a41775e9e4c49" providerId="LiveId" clId="{DC5E1C58-07B7-43CF-A154-390D4E638E6A}" dt="2023-12-05T15:35:13.808" v="314" actId="14100"/>
+          <ac:spMkLst>
+            <pc:docMk/>
+            <pc:sldMk cId="1741544213" sldId="268"/>
+            <ac:spMk id="9" creationId="{3689FC0D-3B70-6E90-6415-AC8FFD1E0019}"/>
+          </ac:spMkLst>
+        </pc:spChg>
+        <pc:spChg chg="del">
+          <ac:chgData name="Jacky Cheung" userId="222a41775e9e4c49" providerId="LiveId" clId="{DC5E1C58-07B7-43CF-A154-390D4E638E6A}" dt="2023-12-05T15:34:34.161" v="301" actId="478"/>
+          <ac:spMkLst>
+            <pc:docMk/>
+            <pc:sldMk cId="1741544213" sldId="268"/>
+            <ac:spMk id="11" creationId="{2A7C30E3-E945-2A7D-5300-5113B39189F7}"/>
+          </ac:spMkLst>
+        </pc:spChg>
+        <pc:picChg chg="add mod">
+          <ac:chgData name="Jacky Cheung" userId="222a41775e9e4c49" providerId="LiveId" clId="{DC5E1C58-07B7-43CF-A154-390D4E638E6A}" dt="2023-12-05T15:35:01.235" v="305" actId="1076"/>
+          <ac:picMkLst>
+            <pc:docMk/>
+            <pc:sldMk cId="1741544213" sldId="268"/>
+            <ac:picMk id="5" creationId="{0DC971C4-3A94-20F6-38A9-12797D66A0B6}"/>
+          </ac:picMkLst>
+        </pc:picChg>
+        <pc:picChg chg="del">
+          <ac:chgData name="Jacky Cheung" userId="222a41775e9e4c49" providerId="LiveId" clId="{DC5E1C58-07B7-43CF-A154-390D4E638E6A}" dt="2023-12-05T15:34:00.153" v="299" actId="478"/>
+          <ac:picMkLst>
+            <pc:docMk/>
+            <pc:sldMk cId="1741544213" sldId="268"/>
+            <ac:picMk id="13" creationId="{033DB794-3705-36C2-00E6-992AA121DE08}"/>
+          </ac:picMkLst>
+        </pc:picChg>
+        <pc:picChg chg="del">
+          <ac:chgData name="Jacky Cheung" userId="222a41775e9e4c49" providerId="LiveId" clId="{DC5E1C58-07B7-43CF-A154-390D4E638E6A}" dt="2023-12-05T15:34:28.754" v="300" actId="478"/>
+          <ac:picMkLst>
+            <pc:docMk/>
+            <pc:sldMk cId="1741544213" sldId="268"/>
+            <ac:picMk id="15" creationId="{6928AE08-0877-527F-9195-BCDEB98CA86C}"/>
+          </ac:picMkLst>
+        </pc:picChg>
+      </pc:sldChg>
+      <pc:sldChg chg="modSp">
+        <pc:chgData name="Jacky Cheung" userId="222a41775e9e4c49" providerId="LiveId" clId="{DC5E1C58-07B7-43CF-A154-390D4E638E6A}" dt="2023-12-05T15:46:47.406" v="741" actId="20577"/>
+        <pc:sldMkLst>
+          <pc:docMk/>
+          <pc:sldMk cId="3781643426" sldId="270"/>
+        </pc:sldMkLst>
+        <pc:graphicFrameChg chg="mod">
+          <ac:chgData name="Jacky Cheung" userId="222a41775e9e4c49" providerId="LiveId" clId="{DC5E1C58-07B7-43CF-A154-390D4E638E6A}" dt="2023-12-05T15:46:47.406" v="741" actId="20577"/>
+          <ac:graphicFrameMkLst>
+            <pc:docMk/>
+            <pc:sldMk cId="3781643426" sldId="270"/>
+            <ac:graphicFrameMk id="4" creationId="{5BEE7704-C4A3-CD9C-F159-10F737E56286}"/>
+          </ac:graphicFrameMkLst>
+        </pc:graphicFrameChg>
+      </pc:sldChg>
+      <pc:sldChg chg="modSp mod">
+        <pc:chgData name="Jacky Cheung" userId="222a41775e9e4c49" providerId="LiveId" clId="{DC5E1C58-07B7-43CF-A154-390D4E638E6A}" dt="2023-12-05T15:22:18.571" v="232" actId="20577"/>
+        <pc:sldMkLst>
+          <pc:docMk/>
+          <pc:sldMk cId="3202623808" sldId="271"/>
+        </pc:sldMkLst>
+        <pc:spChg chg="mod">
+          <ac:chgData name="Jacky Cheung" userId="222a41775e9e4c49" providerId="LiveId" clId="{DC5E1C58-07B7-43CF-A154-390D4E638E6A}" dt="2023-12-05T15:18:33.827" v="127" actId="2711"/>
+          <ac:spMkLst>
+            <pc:docMk/>
+            <pc:sldMk cId="3202623808" sldId="271"/>
+            <ac:spMk id="2" creationId="{6D7DE610-94CD-21B2-096A-04255AC75CFF}"/>
+          </ac:spMkLst>
+        </pc:spChg>
+        <pc:spChg chg="mod">
+          <ac:chgData name="Jacky Cheung" userId="222a41775e9e4c49" providerId="LiveId" clId="{DC5E1C58-07B7-43CF-A154-390D4E638E6A}" dt="2023-12-05T15:22:18.571" v="232" actId="20577"/>
+          <ac:spMkLst>
+            <pc:docMk/>
+            <pc:sldMk cId="3202623808" sldId="271"/>
+            <ac:spMk id="4" creationId="{F9A02599-C567-4094-87C3-49FAF32AC0AC}"/>
+          </ac:spMkLst>
+        </pc:spChg>
+        <pc:spChg chg="mod">
+          <ac:chgData name="Jacky Cheung" userId="222a41775e9e4c49" providerId="LiveId" clId="{DC5E1C58-07B7-43CF-A154-390D4E638E6A}" dt="2023-12-05T15:21:09.894" v="168" actId="20577"/>
+          <ac:spMkLst>
+            <pc:docMk/>
+            <pc:sldMk cId="3202623808" sldId="271"/>
+            <ac:spMk id="9" creationId="{519B31CE-64BA-A346-E53B-C81B53AC9773}"/>
+          </ac:spMkLst>
+        </pc:spChg>
+      </pc:sldChg>
+      <pc:sldChg chg="delSp modSp mod">
+        <pc:chgData name="Jacky Cheung" userId="222a41775e9e4c49" providerId="LiveId" clId="{DC5E1C58-07B7-43CF-A154-390D4E638E6A}" dt="2023-12-05T15:23:10.104" v="244" actId="20577"/>
+        <pc:sldMkLst>
+          <pc:docMk/>
+          <pc:sldMk cId="2796892709" sldId="272"/>
+        </pc:sldMkLst>
+        <pc:spChg chg="mod">
+          <ac:chgData name="Jacky Cheung" userId="222a41775e9e4c49" providerId="LiveId" clId="{DC5E1C58-07B7-43CF-A154-390D4E638E6A}" dt="2023-12-05T15:23:10.104" v="244" actId="20577"/>
+          <ac:spMkLst>
+            <pc:docMk/>
+            <pc:sldMk cId="2796892709" sldId="272"/>
+            <ac:spMk id="9" creationId="{519B31CE-64BA-A346-E53B-C81B53AC9773}"/>
+          </ac:spMkLst>
+        </pc:spChg>
+        <pc:picChg chg="del">
+          <ac:chgData name="Jacky Cheung" userId="222a41775e9e4c49" providerId="LiveId" clId="{DC5E1C58-07B7-43CF-A154-390D4E638E6A}" dt="2023-12-05T15:23:02.133" v="234" actId="478"/>
+          <ac:picMkLst>
+            <pc:docMk/>
+            <pc:sldMk cId="2796892709" sldId="272"/>
+            <ac:picMk id="10" creationId="{2912BEF6-889E-E436-1CC7-31E42F5104E0}"/>
+          </ac:picMkLst>
+        </pc:picChg>
+      </pc:sldChg>
+      <pc:sldChg chg="addSp delSp modSp mod">
+        <pc:chgData name="Jacky Cheung" userId="222a41775e9e4c49" providerId="LiveId" clId="{DC5E1C58-07B7-43CF-A154-390D4E638E6A}" dt="2023-12-05T15:38:40.651" v="474" actId="207"/>
+        <pc:sldMkLst>
+          <pc:docMk/>
+          <pc:sldMk cId="2806245624" sldId="273"/>
+        </pc:sldMkLst>
+        <pc:spChg chg="mod">
+          <ac:chgData name="Jacky Cheung" userId="222a41775e9e4c49" providerId="LiveId" clId="{DC5E1C58-07B7-43CF-A154-390D4E638E6A}" dt="2023-12-05T15:31:22.189" v="256" actId="255"/>
+          <ac:spMkLst>
+            <pc:docMk/>
+            <pc:sldMk cId="2806245624" sldId="273"/>
+            <ac:spMk id="3" creationId="{4BDC3303-1CCF-2776-575D-61DCD2BABC91}"/>
+          </ac:spMkLst>
+        </pc:spChg>
+        <pc:spChg chg="add mod">
+          <ac:chgData name="Jacky Cheung" userId="222a41775e9e4c49" providerId="LiveId" clId="{DC5E1C58-07B7-43CF-A154-390D4E638E6A}" dt="2023-12-05T15:33:09.001" v="292" actId="571"/>
+          <ac:spMkLst>
+            <pc:docMk/>
+            <pc:sldMk cId="2806245624" sldId="273"/>
+            <ac:spMk id="4" creationId="{EB432C75-338F-ECB5-10FA-19ACF232F2A8}"/>
+          </ac:spMkLst>
+        </pc:spChg>
+        <pc:spChg chg="mod">
+          <ac:chgData name="Jacky Cheung" userId="222a41775e9e4c49" providerId="LiveId" clId="{DC5E1C58-07B7-43CF-A154-390D4E638E6A}" dt="2023-12-05T15:31:45.117" v="263" actId="207"/>
+          <ac:spMkLst>
+            <pc:docMk/>
+            <pc:sldMk cId="2806245624" sldId="273"/>
+            <ac:spMk id="5" creationId="{1C7518E9-1DFE-797F-BD54-2C5944C50AFE}"/>
+          </ac:spMkLst>
+        </pc:spChg>
+        <pc:spChg chg="mod">
+          <ac:chgData name="Jacky Cheung" userId="222a41775e9e4c49" providerId="LiveId" clId="{DC5E1C58-07B7-43CF-A154-390D4E638E6A}" dt="2023-12-05T15:32:38.431" v="282" actId="207"/>
+          <ac:spMkLst>
+            <pc:docMk/>
+            <pc:sldMk cId="2806245624" sldId="273"/>
+            <ac:spMk id="6" creationId="{35B028BA-6886-522D-4EB1-3B695F17CA12}"/>
+          </ac:spMkLst>
+        </pc:spChg>
+        <pc:spChg chg="mod">
+          <ac:chgData name="Jacky Cheung" userId="222a41775e9e4c49" providerId="LiveId" clId="{DC5E1C58-07B7-43CF-A154-390D4E638E6A}" dt="2023-12-05T15:33:18.503" v="295" actId="207"/>
+          <ac:spMkLst>
+            <pc:docMk/>
+            <pc:sldMk cId="2806245624" sldId="273"/>
+            <ac:spMk id="7" creationId="{0EC6A924-17DE-EF0A-9341-8B56501F4131}"/>
+          </ac:spMkLst>
+        </pc:spChg>
+        <pc:spChg chg="del">
+          <ac:chgData name="Jacky Cheung" userId="222a41775e9e4c49" providerId="LiveId" clId="{DC5E1C58-07B7-43CF-A154-390D4E638E6A}" dt="2023-12-05T15:33:03.547" v="290" actId="478"/>
+          <ac:spMkLst>
+            <pc:docMk/>
+            <pc:sldMk cId="2806245624" sldId="273"/>
+            <ac:spMk id="8" creationId="{1A44B5C2-C4C2-7985-694B-2470BE1EC9A8}"/>
+          </ac:spMkLst>
+        </pc:spChg>
+        <pc:spChg chg="mod">
+          <ac:chgData name="Jacky Cheung" userId="222a41775e9e4c49" providerId="LiveId" clId="{DC5E1C58-07B7-43CF-A154-390D4E638E6A}" dt="2023-12-05T15:38:40.651" v="474" actId="207"/>
+          <ac:spMkLst>
+            <pc:docMk/>
+            <pc:sldMk cId="2806245624" sldId="273"/>
+            <ac:spMk id="9" creationId="{D8FA1828-E03E-509E-65D8-3AF98EC43069}"/>
+          </ac:spMkLst>
+        </pc:spChg>
+      </pc:sldChg>
+      <pc:sldChg chg="addSp delSp modSp mod">
+        <pc:chgData name="Jacky Cheung" userId="222a41775e9e4c49" providerId="LiveId" clId="{DC5E1C58-07B7-43CF-A154-390D4E638E6A}" dt="2023-12-05T15:38:56.933" v="477" actId="1076"/>
+        <pc:sldMkLst>
+          <pc:docMk/>
+          <pc:sldMk cId="1974522495" sldId="275"/>
+        </pc:sldMkLst>
+        <pc:spChg chg="del">
+          <ac:chgData name="Jacky Cheung" userId="222a41775e9e4c49" providerId="LiveId" clId="{DC5E1C58-07B7-43CF-A154-390D4E638E6A}" dt="2023-12-05T15:33:37.742" v="296" actId="478"/>
+          <ac:spMkLst>
+            <pc:docMk/>
+            <pc:sldMk cId="1974522495" sldId="275"/>
+            <ac:spMk id="3" creationId="{4BDC3303-1CCF-2776-575D-61DCD2BABC91}"/>
+          </ac:spMkLst>
+        </pc:spChg>
+        <pc:spChg chg="del">
+          <ac:chgData name="Jacky Cheung" userId="222a41775e9e4c49" providerId="LiveId" clId="{DC5E1C58-07B7-43CF-A154-390D4E638E6A}" dt="2023-12-05T15:33:37.742" v="296" actId="478"/>
+          <ac:spMkLst>
+            <pc:docMk/>
+            <pc:sldMk cId="1974522495" sldId="275"/>
+            <ac:spMk id="5" creationId="{1C7518E9-1DFE-797F-BD54-2C5944C50AFE}"/>
+          </ac:spMkLst>
+        </pc:spChg>
+        <pc:spChg chg="del">
+          <ac:chgData name="Jacky Cheung" userId="222a41775e9e4c49" providerId="LiveId" clId="{DC5E1C58-07B7-43CF-A154-390D4E638E6A}" dt="2023-12-05T15:33:37.742" v="296" actId="478"/>
+          <ac:spMkLst>
+            <pc:docMk/>
+            <pc:sldMk cId="1974522495" sldId="275"/>
+            <ac:spMk id="6" creationId="{35B028BA-6886-522D-4EB1-3B695F17CA12}"/>
+          </ac:spMkLst>
+        </pc:spChg>
+        <pc:spChg chg="del">
+          <ac:chgData name="Jacky Cheung" userId="222a41775e9e4c49" providerId="LiveId" clId="{DC5E1C58-07B7-43CF-A154-390D4E638E6A}" dt="2023-12-05T15:33:37.742" v="296" actId="478"/>
+          <ac:spMkLst>
+            <pc:docMk/>
+            <pc:sldMk cId="1974522495" sldId="275"/>
+            <ac:spMk id="7" creationId="{0EC6A924-17DE-EF0A-9341-8B56501F4131}"/>
+          </ac:spMkLst>
+        </pc:spChg>
+        <pc:spChg chg="del">
+          <ac:chgData name="Jacky Cheung" userId="222a41775e9e4c49" providerId="LiveId" clId="{DC5E1C58-07B7-43CF-A154-390D4E638E6A}" dt="2023-12-05T15:33:37.742" v="296" actId="478"/>
+          <ac:spMkLst>
+            <pc:docMk/>
+            <pc:sldMk cId="1974522495" sldId="275"/>
+            <ac:spMk id="8" creationId="{1A44B5C2-C4C2-7985-694B-2470BE1EC9A8}"/>
+          </ac:spMkLst>
+        </pc:spChg>
+        <pc:spChg chg="add mod">
+          <ac:chgData name="Jacky Cheung" userId="222a41775e9e4c49" providerId="LiveId" clId="{DC5E1C58-07B7-43CF-A154-390D4E638E6A}" dt="2023-12-05T15:33:42.978" v="298" actId="1076"/>
+          <ac:spMkLst>
+            <pc:docMk/>
+            <pc:sldMk cId="1974522495" sldId="275"/>
+            <ac:spMk id="10" creationId="{B3746BA1-28AB-50C0-58FC-16CC9048540A}"/>
+          </ac:spMkLst>
+        </pc:spChg>
+        <pc:spChg chg="del">
+          <ac:chgData name="Jacky Cheung" userId="222a41775e9e4c49" providerId="LiveId" clId="{DC5E1C58-07B7-43CF-A154-390D4E638E6A}" dt="2023-12-05T15:33:37.742" v="296" actId="478"/>
+          <ac:spMkLst>
+            <pc:docMk/>
+            <pc:sldMk cId="1974522495" sldId="275"/>
+            <ac:spMk id="11" creationId="{00EB287F-DFF4-6F47-E416-4CE17F44EE8B}"/>
+          </ac:spMkLst>
+        </pc:spChg>
+        <pc:spChg chg="add mod">
+          <ac:chgData name="Jacky Cheung" userId="222a41775e9e4c49" providerId="LiveId" clId="{DC5E1C58-07B7-43CF-A154-390D4E638E6A}" dt="2023-12-05T15:33:42.978" v="298" actId="1076"/>
+          <ac:spMkLst>
+            <pc:docMk/>
+            <pc:sldMk cId="1974522495" sldId="275"/>
+            <ac:spMk id="12" creationId="{F06DF1B2-77A8-CB05-CCF7-0C327E2CCEBC}"/>
+          </ac:spMkLst>
+        </pc:spChg>
+        <pc:spChg chg="add mod">
+          <ac:chgData name="Jacky Cheung" userId="222a41775e9e4c49" providerId="LiveId" clId="{DC5E1C58-07B7-43CF-A154-390D4E638E6A}" dt="2023-12-05T15:33:42.978" v="298" actId="1076"/>
+          <ac:spMkLst>
+            <pc:docMk/>
+            <pc:sldMk cId="1974522495" sldId="275"/>
+            <ac:spMk id="18" creationId="{6B17D8AC-299D-6382-180F-59A9555486AB}"/>
+          </ac:spMkLst>
+        </pc:spChg>
+        <pc:spChg chg="add mod">
+          <ac:chgData name="Jacky Cheung" userId="222a41775e9e4c49" providerId="LiveId" clId="{DC5E1C58-07B7-43CF-A154-390D4E638E6A}" dt="2023-12-05T15:33:42.978" v="298" actId="1076"/>
+          <ac:spMkLst>
+            <pc:docMk/>
+            <pc:sldMk cId="1974522495" sldId="275"/>
+            <ac:spMk id="19" creationId="{9575D71D-937D-E06F-47E0-44592BAB9EBA}"/>
+          </ac:spMkLst>
+        </pc:spChg>
+        <pc:spChg chg="add del mod">
+          <ac:chgData name="Jacky Cheung" userId="222a41775e9e4c49" providerId="LiveId" clId="{DC5E1C58-07B7-43CF-A154-390D4E638E6A}" dt="2023-12-05T15:38:51.394" v="475" actId="478"/>
+          <ac:spMkLst>
+            <pc:docMk/>
+            <pc:sldMk cId="1974522495" sldId="275"/>
+            <ac:spMk id="20" creationId="{579F2D8F-6D92-D82D-BD9A-B83356CACA74}"/>
+          </ac:spMkLst>
+        </pc:spChg>
+        <pc:spChg chg="add mod">
+          <ac:chgData name="Jacky Cheung" userId="222a41775e9e4c49" providerId="LiveId" clId="{DC5E1C58-07B7-43CF-A154-390D4E638E6A}" dt="2023-12-05T15:38:56.933" v="477" actId="1076"/>
+          <ac:spMkLst>
+            <pc:docMk/>
+            <pc:sldMk cId="1974522495" sldId="275"/>
+            <ac:spMk id="21" creationId="{55800920-3148-1C65-ACC6-D3EFFAED7E7C}"/>
+          </ac:spMkLst>
+        </pc:spChg>
+      </pc:sldChg>
+      <pc:sldChg chg="addSp delSp modSp mod">
+        <pc:chgData name="Jacky Cheung" userId="222a41775e9e4c49" providerId="LiveId" clId="{DC5E1C58-07B7-43CF-A154-390D4E638E6A}" dt="2023-12-05T15:43:10.737" v="572" actId="14100"/>
+        <pc:sldMkLst>
+          <pc:docMk/>
+          <pc:sldMk cId="3794753471" sldId="276"/>
+        </pc:sldMkLst>
+        <pc:spChg chg="mod">
+          <ac:chgData name="Jacky Cheung" userId="222a41775e9e4c49" providerId="LiveId" clId="{DC5E1C58-07B7-43CF-A154-390D4E638E6A}" dt="2023-12-05T15:42:34.188" v="533" actId="14100"/>
+          <ac:spMkLst>
+            <pc:docMk/>
+            <pc:sldMk cId="3794753471" sldId="276"/>
+            <ac:spMk id="9" creationId="{3689FC0D-3B70-6E90-6415-AC8FFD1E0019}"/>
+          </ac:spMkLst>
+        </pc:spChg>
+        <pc:spChg chg="mod">
+          <ac:chgData name="Jacky Cheung" userId="222a41775e9e4c49" providerId="LiveId" clId="{DC5E1C58-07B7-43CF-A154-390D4E638E6A}" dt="2023-12-05T15:43:06.108" v="570" actId="1076"/>
+          <ac:spMkLst>
+            <pc:docMk/>
+            <pc:sldMk cId="3794753471" sldId="276"/>
+            <ac:spMk id="11" creationId="{2A7C30E3-E945-2A7D-5300-5113B39189F7}"/>
+          </ac:spMkLst>
+        </pc:spChg>
+        <pc:picChg chg="del">
+          <ac:chgData name="Jacky Cheung" userId="222a41775e9e4c49" providerId="LiveId" clId="{DC5E1C58-07B7-43CF-A154-390D4E638E6A}" dt="2023-12-05T15:39:21.339" v="478" actId="478"/>
+          <ac:picMkLst>
+            <pc:docMk/>
+            <pc:sldMk cId="3794753471" sldId="276"/>
+            <ac:picMk id="5" creationId="{AEDFAC36-30EE-6F77-ACE5-176B437028BA}"/>
+          </ac:picMkLst>
+        </pc:picChg>
+        <pc:picChg chg="del">
+          <ac:chgData name="Jacky Cheung" userId="222a41775e9e4c49" providerId="LiveId" clId="{DC5E1C58-07B7-43CF-A154-390D4E638E6A}" dt="2023-12-05T15:39:22.217" v="479" actId="478"/>
+          <ac:picMkLst>
+            <pc:docMk/>
+            <pc:sldMk cId="3794753471" sldId="276"/>
+            <ac:picMk id="7" creationId="{512E7664-A6D7-22B3-8DAC-09A302ABE027}"/>
+          </ac:picMkLst>
+        </pc:picChg>
+        <pc:picChg chg="add mod">
+          <ac:chgData name="Jacky Cheung" userId="222a41775e9e4c49" providerId="LiveId" clId="{DC5E1C58-07B7-43CF-A154-390D4E638E6A}" dt="2023-12-05T15:42:05.874" v="491" actId="14100"/>
+          <ac:picMkLst>
+            <pc:docMk/>
+            <pc:sldMk cId="3794753471" sldId="276"/>
+            <ac:picMk id="10" creationId="{1309B04B-B60F-37F3-7B1C-5028D22C3640}"/>
+          </ac:picMkLst>
+        </pc:picChg>
+        <pc:picChg chg="add mod">
+          <ac:chgData name="Jacky Cheung" userId="222a41775e9e4c49" providerId="LiveId" clId="{DC5E1C58-07B7-43CF-A154-390D4E638E6A}" dt="2023-12-05T15:43:10.737" v="572" actId="14100"/>
+          <ac:picMkLst>
+            <pc:docMk/>
+            <pc:sldMk cId="3794753471" sldId="276"/>
+            <ac:picMk id="13" creationId="{D890722E-2405-F0A7-967C-47D42F68B0F0}"/>
+          </ac:picMkLst>
+        </pc:picChg>
+      </pc:sldChg>
+      <pc:sldChg chg="addSp delSp modSp mod">
+        <pc:chgData name="Jacky Cheung" userId="222a41775e9e4c49" providerId="LiveId" clId="{DC5E1C58-07B7-43CF-A154-390D4E638E6A}" dt="2023-12-05T15:37:53.294" v="435" actId="14100"/>
+        <pc:sldMkLst>
+          <pc:docMk/>
+          <pc:sldMk cId="249892692" sldId="277"/>
+        </pc:sldMkLst>
+        <pc:spChg chg="mod">
+          <ac:chgData name="Jacky Cheung" userId="222a41775e9e4c49" providerId="LiveId" clId="{DC5E1C58-07B7-43CF-A154-390D4E638E6A}" dt="2023-12-05T15:35:43.988" v="368" actId="20577"/>
+          <ac:spMkLst>
+            <pc:docMk/>
+            <pc:sldMk cId="249892692" sldId="277"/>
+            <ac:spMk id="9" creationId="{3689FC0D-3B70-6E90-6415-AC8FFD1E0019}"/>
+          </ac:spMkLst>
+        </pc:spChg>
+        <pc:spChg chg="mod">
+          <ac:chgData name="Jacky Cheung" userId="222a41775e9e4c49" providerId="LiveId" clId="{DC5E1C58-07B7-43CF-A154-390D4E638E6A}" dt="2023-12-05T15:36:10.119" v="428" actId="20577"/>
+          <ac:spMkLst>
+            <pc:docMk/>
+            <pc:sldMk cId="249892692" sldId="277"/>
+            <ac:spMk id="11" creationId="{2A7C30E3-E945-2A7D-5300-5113B39189F7}"/>
+          </ac:spMkLst>
+        </pc:spChg>
+        <pc:picChg chg="del">
+          <ac:chgData name="Jacky Cheung" userId="222a41775e9e4c49" providerId="LiveId" clId="{DC5E1C58-07B7-43CF-A154-390D4E638E6A}" dt="2023-12-05T15:35:22.274" v="315" actId="478"/>
+          <ac:picMkLst>
+            <pc:docMk/>
+            <pc:sldMk cId="249892692" sldId="277"/>
+            <ac:picMk id="5" creationId="{46CAE245-9C06-6AC8-0C8B-D4738E45B6C6}"/>
+          </ac:picMkLst>
+        </pc:picChg>
+        <pc:picChg chg="add mod">
+          <ac:chgData name="Jacky Cheung" userId="222a41775e9e4c49" providerId="LiveId" clId="{DC5E1C58-07B7-43CF-A154-390D4E638E6A}" dt="2023-12-05T15:37:26.746" v="432" actId="1037"/>
+          <ac:picMkLst>
+            <pc:docMk/>
+            <pc:sldMk cId="249892692" sldId="277"/>
+            <ac:picMk id="6" creationId="{D53F4F58-C796-91B9-73DC-4846E2FAB14F}"/>
+          </ac:picMkLst>
+        </pc:picChg>
+        <pc:picChg chg="del">
+          <ac:chgData name="Jacky Cheung" userId="222a41775e9e4c49" providerId="LiveId" clId="{DC5E1C58-07B7-43CF-A154-390D4E638E6A}" dt="2023-12-05T15:35:23.074" v="316" actId="478"/>
+          <ac:picMkLst>
+            <pc:docMk/>
+            <pc:sldMk cId="249892692" sldId="277"/>
+            <ac:picMk id="7" creationId="{D26E3FA5-8402-DECA-BAC3-C42D692725A6}"/>
+          </ac:picMkLst>
+        </pc:picChg>
+        <pc:picChg chg="add mod">
+          <ac:chgData name="Jacky Cheung" userId="222a41775e9e4c49" providerId="LiveId" clId="{DC5E1C58-07B7-43CF-A154-390D4E638E6A}" dt="2023-12-05T15:37:53.294" v="435" actId="14100"/>
+          <ac:picMkLst>
+            <pc:docMk/>
+            <pc:sldMk cId="249892692" sldId="277"/>
+            <ac:picMk id="13" creationId="{12FE90A1-15A0-B3F7-430F-54D1A69B43F3}"/>
+          </ac:picMkLst>
+        </pc:picChg>
+      </pc:sldChg>
+      <pc:sldChg chg="new del">
+        <pc:chgData name="Jacky Cheung" userId="222a41775e9e4c49" providerId="LiveId" clId="{DC5E1C58-07B7-43CF-A154-390D4E638E6A}" dt="2023-12-05T15:18:57.602" v="131" actId="47"/>
+        <pc:sldMkLst>
+          <pc:docMk/>
+          <pc:sldMk cId="3573162338" sldId="284"/>
+        </pc:sldMkLst>
+      </pc:sldChg>
+      <pc:sldChg chg="modSp add mod">
+        <pc:chgData name="Jacky Cheung" userId="222a41775e9e4c49" providerId="LiveId" clId="{DC5E1C58-07B7-43CF-A154-390D4E638E6A}" dt="2023-12-05T15:22:09.341" v="219" actId="20577"/>
+        <pc:sldMkLst>
+          <pc:docMk/>
+          <pc:sldMk cId="76039908" sldId="285"/>
+        </pc:sldMkLst>
+        <pc:spChg chg="mod">
+          <ac:chgData name="Jacky Cheung" userId="222a41775e9e4c49" providerId="LiveId" clId="{DC5E1C58-07B7-43CF-A154-390D4E638E6A}" dt="2023-12-05T15:21:57.590" v="205" actId="2711"/>
+          <ac:spMkLst>
+            <pc:docMk/>
+            <pc:sldMk cId="76039908" sldId="285"/>
+            <ac:spMk id="2" creationId="{6D7DE610-94CD-21B2-096A-04255AC75CFF}"/>
+          </ac:spMkLst>
+        </pc:spChg>
+        <pc:spChg chg="mod">
+          <ac:chgData name="Jacky Cheung" userId="222a41775e9e4c49" providerId="LiveId" clId="{DC5E1C58-07B7-43CF-A154-390D4E638E6A}" dt="2023-12-05T15:22:09.341" v="219" actId="20577"/>
+          <ac:spMkLst>
+            <pc:docMk/>
+            <pc:sldMk cId="76039908" sldId="285"/>
+            <ac:spMk id="4" creationId="{F9A02599-C567-4094-87C3-49FAF32AC0AC}"/>
+          </ac:spMkLst>
+        </pc:spChg>
+        <pc:spChg chg="mod">
+          <ac:chgData name="Jacky Cheung" userId="222a41775e9e4c49" providerId="LiveId" clId="{DC5E1C58-07B7-43CF-A154-390D4E638E6A}" dt="2023-12-05T15:21:42.609" v="204" actId="113"/>
+          <ac:spMkLst>
+            <pc:docMk/>
+            <pc:sldMk cId="76039908" sldId="285"/>
+            <ac:spMk id="9" creationId="{519B31CE-64BA-A346-E53B-C81B53AC9773}"/>
+          </ac:spMkLst>
+        </pc:spChg>
+      </pc:sldChg>
+      <pc:sldChg chg="add del">
+        <pc:chgData name="Jacky Cheung" userId="222a41775e9e4c49" providerId="LiveId" clId="{DC5E1C58-07B7-43CF-A154-390D4E638E6A}" dt="2023-12-05T15:22:56.722" v="233" actId="47"/>
+        <pc:sldMkLst>
+          <pc:docMk/>
+          <pc:sldMk cId="1254234961" sldId="286"/>
+        </pc:sldMkLst>
+      </pc:sldChg>
+      <pc:sldChg chg="addSp delSp modSp add mod">
+        <pc:chgData name="Jacky Cheung" userId="222a41775e9e4c49" providerId="LiveId" clId="{DC5E1C58-07B7-43CF-A154-390D4E638E6A}" dt="2023-12-05T15:44:50.274" v="659" actId="14100"/>
+        <pc:sldMkLst>
+          <pc:docMk/>
+          <pc:sldMk cId="2889971005" sldId="286"/>
+        </pc:sldMkLst>
+        <pc:spChg chg="mod">
+          <ac:chgData name="Jacky Cheung" userId="222a41775e9e4c49" providerId="LiveId" clId="{DC5E1C58-07B7-43CF-A154-390D4E638E6A}" dt="2023-12-05T15:44:24.839" v="648" actId="14100"/>
+          <ac:spMkLst>
+            <pc:docMk/>
+            <pc:sldMk cId="2889971005" sldId="286"/>
+            <ac:spMk id="9" creationId="{3689FC0D-3B70-6E90-6415-AC8FFD1E0019}"/>
+          </ac:spMkLst>
+        </pc:spChg>
+        <pc:spChg chg="mod">
+          <ac:chgData name="Jacky Cheung" userId="222a41775e9e4c49" providerId="LiveId" clId="{DC5E1C58-07B7-43CF-A154-390D4E638E6A}" dt="2023-12-05T15:44:45.928" v="657" actId="14100"/>
+          <ac:spMkLst>
+            <pc:docMk/>
+            <pc:sldMk cId="2889971005" sldId="286"/>
+            <ac:spMk id="11" creationId="{2A7C30E3-E945-2A7D-5300-5113B39189F7}"/>
+          </ac:spMkLst>
+        </pc:spChg>
+        <pc:picChg chg="add mod">
+          <ac:chgData name="Jacky Cheung" userId="222a41775e9e4c49" providerId="LiveId" clId="{DC5E1C58-07B7-43CF-A154-390D4E638E6A}" dt="2023-12-05T15:44:50.274" v="659" actId="14100"/>
+          <ac:picMkLst>
+            <pc:docMk/>
+            <pc:sldMk cId="2889971005" sldId="286"/>
+            <ac:picMk id="7" creationId="{41E15D5C-3F14-22D4-3039-32660DA37A05}"/>
+          </ac:picMkLst>
+        </pc:picChg>
+        <pc:picChg chg="del">
+          <ac:chgData name="Jacky Cheung" userId="222a41775e9e4c49" providerId="LiveId" clId="{DC5E1C58-07B7-43CF-A154-390D4E638E6A}" dt="2023-12-05T15:40:38.139" v="485" actId="478"/>
+          <ac:picMkLst>
+            <pc:docMk/>
+            <pc:sldMk cId="2889971005" sldId="286"/>
+            <ac:picMk id="10" creationId="{1309B04B-B60F-37F3-7B1C-5028D22C3640}"/>
+          </ac:picMkLst>
+        </pc:picChg>
+        <pc:picChg chg="add mod">
+          <ac:chgData name="Jacky Cheung" userId="222a41775e9e4c49" providerId="LiveId" clId="{DC5E1C58-07B7-43CF-A154-390D4E638E6A}" dt="2023-12-05T15:44:31.288" v="651" actId="1076"/>
+          <ac:picMkLst>
+            <pc:docMk/>
+            <pc:sldMk cId="2889971005" sldId="286"/>
+            <ac:picMk id="12" creationId="{0D237E0E-933B-29BA-E674-E45DA17EDFEB}"/>
+          </ac:picMkLst>
+        </pc:picChg>
+        <pc:picChg chg="del">
+          <ac:chgData name="Jacky Cheung" userId="222a41775e9e4c49" providerId="LiveId" clId="{DC5E1C58-07B7-43CF-A154-390D4E638E6A}" dt="2023-12-05T15:40:38.912" v="486" actId="478"/>
+          <ac:picMkLst>
+            <pc:docMk/>
+            <pc:sldMk cId="2889971005" sldId="286"/>
+            <ac:picMk id="13" creationId="{D890722E-2405-F0A7-967C-47D42F68B0F0}"/>
+          </ac:picMkLst>
+        </pc:picChg>
       </pc:sldChg>
     </pc:docChg>
   </pc:docChgLst>
@@ -6523,7 +6523,7 @@
       </p:grpSpPr>
       <p:sp>
         <p:nvSpPr>
-          <p:cNvPr id="2" name="投影片影像版面配置區 1"/>
+          <p:cNvPr id="2" name="Slide Image Placeholder 1"/>
           <p:cNvSpPr>
             <a:spLocks noGrp="1" noRot="1" noChangeAspect="1"/>
           </p:cNvSpPr>
@@ -6535,7 +6535,7 @@
       </p:sp>
       <p:sp>
         <p:nvSpPr>
-          <p:cNvPr id="3" name="備忘稿版面配置區 2"/>
+          <p:cNvPr id="3" name="Notes Placeholder 2"/>
           <p:cNvSpPr>
             <a:spLocks noGrp="1"/>
           </p:cNvSpPr>
@@ -6548,13 +6548,13 @@
           <a:bodyPr/>
           <a:lstStyle/>
           <a:p>
-            <a:endParaRPr lang="en-CA" dirty="0"/>
-          </a:p>
-        </p:txBody>
-      </p:sp>
-      <p:sp>
-        <p:nvSpPr>
-          <p:cNvPr id="4" name="投影片編號版面配置區 3"/>
+            <a:endParaRPr lang="en-HK" dirty="0"/>
+          </a:p>
+        </p:txBody>
+      </p:sp>
+      <p:sp>
+        <p:nvSpPr>
+          <p:cNvPr id="4" name="Slide Number Placeholder 3"/>
           <p:cNvSpPr>
             <a:spLocks noGrp="1"/>
           </p:cNvSpPr>
@@ -6569,7 +6569,7 @@
           <a:p>
             <a:fld id="{8AB36728-3BA8-4FE9-8C82-1D1EFBC9EEC8}" type="slidenum">
               <a:rPr lang="en-CA" smtClean="0"/>
-              <a:t>18</a:t>
+              <a:t>7</a:t>
             </a:fld>
             <a:endParaRPr lang="en-CA"/>
           </a:p>
@@ -6578,7 +6578,7 @@
     </p:spTree>
     <p:extLst>
       <p:ext uri="{BB962C8B-B14F-4D97-AF65-F5344CB8AC3E}">
-        <p14:creationId xmlns:p14="http://schemas.microsoft.com/office/powerpoint/2010/main" val="2304894562"/>
+        <p14:creationId xmlns:p14="http://schemas.microsoft.com/office/powerpoint/2010/main" val="3753163591"/>
       </p:ext>
     </p:extLst>
   </p:cSld>
@@ -6607,7 +6607,7 @@
       </p:grpSpPr>
       <p:sp>
         <p:nvSpPr>
-          <p:cNvPr id="2" name="投影片影像版面配置區 1"/>
+          <p:cNvPr id="2" name="Slide Image Placeholder 1"/>
           <p:cNvSpPr>
             <a:spLocks noGrp="1" noRot="1" noChangeAspect="1"/>
           </p:cNvSpPr>
@@ -6619,7 +6619,7 @@
       </p:sp>
       <p:sp>
         <p:nvSpPr>
-          <p:cNvPr id="3" name="備忘稿版面配置區 2"/>
+          <p:cNvPr id="3" name="Notes Placeholder 2"/>
           <p:cNvSpPr>
             <a:spLocks noGrp="1"/>
           </p:cNvSpPr>
@@ -6632,13 +6632,13 @@
           <a:bodyPr/>
           <a:lstStyle/>
           <a:p>
-            <a:endParaRPr lang="en-CA" dirty="0"/>
-          </a:p>
-        </p:txBody>
-      </p:sp>
-      <p:sp>
-        <p:nvSpPr>
-          <p:cNvPr id="4" name="投影片編號版面配置區 3"/>
+            <a:endParaRPr lang="en-HK" dirty="0"/>
+          </a:p>
+        </p:txBody>
+      </p:sp>
+      <p:sp>
+        <p:nvSpPr>
+          <p:cNvPr id="4" name="Slide Number Placeholder 3"/>
           <p:cNvSpPr>
             <a:spLocks noGrp="1"/>
           </p:cNvSpPr>
@@ -6653,7 +6653,7 @@
           <a:p>
             <a:fld id="{8AB36728-3BA8-4FE9-8C82-1D1EFBC9EEC8}" type="slidenum">
               <a:rPr lang="en-CA" smtClean="0"/>
-              <a:t>19</a:t>
+              <a:t>9</a:t>
             </a:fld>
             <a:endParaRPr lang="en-CA"/>
           </a:p>
@@ -6662,7 +6662,7 @@
     </p:spTree>
     <p:extLst>
       <p:ext uri="{BB962C8B-B14F-4D97-AF65-F5344CB8AC3E}">
-        <p14:creationId xmlns:p14="http://schemas.microsoft.com/office/powerpoint/2010/main" val="227940964"/>
+        <p14:creationId xmlns:p14="http://schemas.microsoft.com/office/powerpoint/2010/main" val="1379197832"/>
       </p:ext>
     </p:extLst>
   </p:cSld>
@@ -6691,6 +6691,258 @@
       </p:grpSpPr>
       <p:sp>
         <p:nvSpPr>
+          <p:cNvPr id="2" name="Slide Image Placeholder 1"/>
+          <p:cNvSpPr>
+            <a:spLocks noGrp="1" noRot="1" noChangeAspect="1"/>
+          </p:cNvSpPr>
+          <p:nvPr>
+            <p:ph type="sldImg"/>
+          </p:nvPr>
+        </p:nvSpPr>
+        <p:spPr/>
+      </p:sp>
+      <p:sp>
+        <p:nvSpPr>
+          <p:cNvPr id="3" name="Notes Placeholder 2"/>
+          <p:cNvSpPr>
+            <a:spLocks noGrp="1"/>
+          </p:cNvSpPr>
+          <p:nvPr>
+            <p:ph type="body" idx="1"/>
+          </p:nvPr>
+        </p:nvSpPr>
+        <p:spPr/>
+        <p:txBody>
+          <a:bodyPr/>
+          <a:lstStyle/>
+          <a:p>
+            <a:endParaRPr lang="en-HK" dirty="0"/>
+          </a:p>
+        </p:txBody>
+      </p:sp>
+      <p:sp>
+        <p:nvSpPr>
+          <p:cNvPr id="4" name="Slide Number Placeholder 3"/>
+          <p:cNvSpPr>
+            <a:spLocks noGrp="1"/>
+          </p:cNvSpPr>
+          <p:nvPr>
+            <p:ph type="sldNum" sz="quarter" idx="5"/>
+          </p:nvPr>
+        </p:nvSpPr>
+        <p:spPr/>
+        <p:txBody>
+          <a:bodyPr/>
+          <a:lstStyle/>
+          <a:p>
+            <a:fld id="{8AB36728-3BA8-4FE9-8C82-1D1EFBC9EEC8}" type="slidenum">
+              <a:rPr lang="en-CA" smtClean="0"/>
+              <a:t>10</a:t>
+            </a:fld>
+            <a:endParaRPr lang="en-CA"/>
+          </a:p>
+        </p:txBody>
+      </p:sp>
+    </p:spTree>
+    <p:extLst>
+      <p:ext uri="{BB962C8B-B14F-4D97-AF65-F5344CB8AC3E}">
+        <p14:creationId xmlns:p14="http://schemas.microsoft.com/office/powerpoint/2010/main" val="1972384813"/>
+      </p:ext>
+    </p:extLst>
+  </p:cSld>
+  <p:clrMapOvr>
+    <a:masterClrMapping/>
+  </p:clrMapOvr>
+</p:notes>
+</file>
+
+<file path=ppt/notesSlides/notesSlide4.xml><?xml version="1.0" encoding="utf-8"?>
+<p:notes xmlns:a="http://schemas.openxmlformats.org/drawingml/2006/main" xmlns:r="http://schemas.openxmlformats.org/officeDocument/2006/relationships" xmlns:p="http://schemas.openxmlformats.org/presentationml/2006/main">
+  <p:cSld>
+    <p:spTree>
+      <p:nvGrpSpPr>
+        <p:cNvPr id="1" name=""/>
+        <p:cNvGrpSpPr/>
+        <p:nvPr/>
+      </p:nvGrpSpPr>
+      <p:grpSpPr>
+        <a:xfrm>
+          <a:off x="0" y="0"/>
+          <a:ext cx="0" cy="0"/>
+          <a:chOff x="0" y="0"/>
+          <a:chExt cx="0" cy="0"/>
+        </a:xfrm>
+      </p:grpSpPr>
+      <p:sp>
+        <p:nvSpPr>
+          <p:cNvPr id="2" name="投影片影像版面配置區 1"/>
+          <p:cNvSpPr>
+            <a:spLocks noGrp="1" noRot="1" noChangeAspect="1"/>
+          </p:cNvSpPr>
+          <p:nvPr>
+            <p:ph type="sldImg"/>
+          </p:nvPr>
+        </p:nvSpPr>
+        <p:spPr/>
+      </p:sp>
+      <p:sp>
+        <p:nvSpPr>
+          <p:cNvPr id="3" name="備忘稿版面配置區 2"/>
+          <p:cNvSpPr>
+            <a:spLocks noGrp="1"/>
+          </p:cNvSpPr>
+          <p:nvPr>
+            <p:ph type="body" idx="1"/>
+          </p:nvPr>
+        </p:nvSpPr>
+        <p:spPr/>
+        <p:txBody>
+          <a:bodyPr/>
+          <a:lstStyle/>
+          <a:p>
+            <a:endParaRPr lang="en-CA" dirty="0"/>
+          </a:p>
+        </p:txBody>
+      </p:sp>
+      <p:sp>
+        <p:nvSpPr>
+          <p:cNvPr id="4" name="投影片編號版面配置區 3"/>
+          <p:cNvSpPr>
+            <a:spLocks noGrp="1"/>
+          </p:cNvSpPr>
+          <p:nvPr>
+            <p:ph type="sldNum" sz="quarter" idx="5"/>
+          </p:nvPr>
+        </p:nvSpPr>
+        <p:spPr/>
+        <p:txBody>
+          <a:bodyPr/>
+          <a:lstStyle/>
+          <a:p>
+            <a:fld id="{8AB36728-3BA8-4FE9-8C82-1D1EFBC9EEC8}" type="slidenum">
+              <a:rPr lang="en-CA" smtClean="0"/>
+              <a:t>18</a:t>
+            </a:fld>
+            <a:endParaRPr lang="en-CA"/>
+          </a:p>
+        </p:txBody>
+      </p:sp>
+    </p:spTree>
+    <p:extLst>
+      <p:ext uri="{BB962C8B-B14F-4D97-AF65-F5344CB8AC3E}">
+        <p14:creationId xmlns:p14="http://schemas.microsoft.com/office/powerpoint/2010/main" val="2304894562"/>
+      </p:ext>
+    </p:extLst>
+  </p:cSld>
+  <p:clrMapOvr>
+    <a:masterClrMapping/>
+  </p:clrMapOvr>
+</p:notes>
+</file>
+
+<file path=ppt/notesSlides/notesSlide5.xml><?xml version="1.0" encoding="utf-8"?>
+<p:notes xmlns:a="http://schemas.openxmlformats.org/drawingml/2006/main" xmlns:r="http://schemas.openxmlformats.org/officeDocument/2006/relationships" xmlns:p="http://schemas.openxmlformats.org/presentationml/2006/main">
+  <p:cSld>
+    <p:spTree>
+      <p:nvGrpSpPr>
+        <p:cNvPr id="1" name=""/>
+        <p:cNvGrpSpPr/>
+        <p:nvPr/>
+      </p:nvGrpSpPr>
+      <p:grpSpPr>
+        <a:xfrm>
+          <a:off x="0" y="0"/>
+          <a:ext cx="0" cy="0"/>
+          <a:chOff x="0" y="0"/>
+          <a:chExt cx="0" cy="0"/>
+        </a:xfrm>
+      </p:grpSpPr>
+      <p:sp>
+        <p:nvSpPr>
+          <p:cNvPr id="2" name="投影片影像版面配置區 1"/>
+          <p:cNvSpPr>
+            <a:spLocks noGrp="1" noRot="1" noChangeAspect="1"/>
+          </p:cNvSpPr>
+          <p:nvPr>
+            <p:ph type="sldImg"/>
+          </p:nvPr>
+        </p:nvSpPr>
+        <p:spPr/>
+      </p:sp>
+      <p:sp>
+        <p:nvSpPr>
+          <p:cNvPr id="3" name="備忘稿版面配置區 2"/>
+          <p:cNvSpPr>
+            <a:spLocks noGrp="1"/>
+          </p:cNvSpPr>
+          <p:nvPr>
+            <p:ph type="body" idx="1"/>
+          </p:nvPr>
+        </p:nvSpPr>
+        <p:spPr/>
+        <p:txBody>
+          <a:bodyPr/>
+          <a:lstStyle/>
+          <a:p>
+            <a:endParaRPr lang="en-CA" dirty="0"/>
+          </a:p>
+        </p:txBody>
+      </p:sp>
+      <p:sp>
+        <p:nvSpPr>
+          <p:cNvPr id="4" name="投影片編號版面配置區 3"/>
+          <p:cNvSpPr>
+            <a:spLocks noGrp="1"/>
+          </p:cNvSpPr>
+          <p:nvPr>
+            <p:ph type="sldNum" sz="quarter" idx="5"/>
+          </p:nvPr>
+        </p:nvSpPr>
+        <p:spPr/>
+        <p:txBody>
+          <a:bodyPr/>
+          <a:lstStyle/>
+          <a:p>
+            <a:fld id="{8AB36728-3BA8-4FE9-8C82-1D1EFBC9EEC8}" type="slidenum">
+              <a:rPr lang="en-CA" smtClean="0"/>
+              <a:t>19</a:t>
+            </a:fld>
+            <a:endParaRPr lang="en-CA"/>
+          </a:p>
+        </p:txBody>
+      </p:sp>
+    </p:spTree>
+    <p:extLst>
+      <p:ext uri="{BB962C8B-B14F-4D97-AF65-F5344CB8AC3E}">
+        <p14:creationId xmlns:p14="http://schemas.microsoft.com/office/powerpoint/2010/main" val="227940964"/>
+      </p:ext>
+    </p:extLst>
+  </p:cSld>
+  <p:clrMapOvr>
+    <a:masterClrMapping/>
+  </p:clrMapOvr>
+</p:notes>
+</file>
+
+<file path=ppt/notesSlides/notesSlide6.xml><?xml version="1.0" encoding="utf-8"?>
+<p:notes xmlns:a="http://schemas.openxmlformats.org/drawingml/2006/main" xmlns:r="http://schemas.openxmlformats.org/officeDocument/2006/relationships" xmlns:p="http://schemas.openxmlformats.org/presentationml/2006/main">
+  <p:cSld>
+    <p:spTree>
+      <p:nvGrpSpPr>
+        <p:cNvPr id="1" name=""/>
+        <p:cNvGrpSpPr/>
+        <p:nvPr/>
+      </p:nvGrpSpPr>
+      <p:grpSpPr>
+        <a:xfrm>
+          <a:off x="0" y="0"/>
+          <a:ext cx="0" cy="0"/>
+          <a:chOff x="0" y="0"/>
+          <a:chExt cx="0" cy="0"/>
+        </a:xfrm>
+      </p:grpSpPr>
+      <p:sp>
+        <p:nvSpPr>
           <p:cNvPr id="2" name="投影片影像版面配置區 1"/>
           <p:cNvSpPr>
             <a:spLocks noGrp="1" noRot="1" noChangeAspect="1"/>
@@ -6756,7 +7008,7 @@
 </p:notes>
 </file>
 
-<file path=ppt/notesSlides/notesSlide4.xml><?xml version="1.0" encoding="utf-8"?>
+<file path=ppt/notesSlides/notesSlide7.xml><?xml version="1.0" encoding="utf-8"?>
 <p:notes xmlns:a="http://schemas.openxmlformats.org/drawingml/2006/main" xmlns:r="http://schemas.openxmlformats.org/officeDocument/2006/relationships" xmlns:p="http://schemas.openxmlformats.org/presentationml/2006/main">
   <p:cSld>
     <p:spTree>
@@ -10770,8 +11022,8 @@
         </p:nvSpPr>
         <p:spPr>
           <a:xfrm>
-            <a:off x="3575554" y="1938291"/>
-            <a:ext cx="2331995" cy="1754326"/>
+            <a:off x="3047387" y="1842829"/>
+            <a:ext cx="2129148" cy="1231106"/>
           </a:xfrm>
           <a:prstGeom prst="rect">
             <a:avLst/>
@@ -10784,63 +11036,33 @@
           </a:bodyPr>
           <a:lstStyle/>
           <a:p>
+            <a:r>
+              <a:rPr lang="en-CA" sz="2000" dirty="0">
+                <a:solidFill>
+                  <a:schemeClr val="tx1"/>
+                </a:solidFill>
+                <a:latin typeface="Georgia Pro" panose="02040502050405020303" pitchFamily="18" charset="0"/>
+              </a:rPr>
+              <a:t>#</a:t>
+            </a:r>
+            <a:r>
+              <a:rPr lang="en-CA" sz="1800" dirty="0">
+                <a:solidFill>
+                  <a:schemeClr val="tx1"/>
+                </a:solidFill>
+                <a:latin typeface="Georgia Pro" panose="02040502050405020303" pitchFamily="18" charset="0"/>
+              </a:rPr>
+              <a:t>efe2d2</a:t>
+            </a:r>
+          </a:p>
+          <a:p>
             <a:pPr marL="285750" indent="-285750">
               <a:buFont typeface="Arial" panose="020B0604020202020204" pitchFamily="34" charset="0"/>
               <a:buChar char="•"/>
             </a:pPr>
             <a:r>
               <a:rPr lang="en-CA" dirty="0"/>
-              <a:t>Header</a:t>
-            </a:r>
-          </a:p>
-          <a:p>
-            <a:pPr marL="285750" indent="-285750">
-              <a:buFont typeface="Arial" panose="020B0604020202020204" pitchFamily="34" charset="0"/>
-              <a:buChar char="•"/>
-            </a:pPr>
-            <a:r>
-              <a:rPr lang="en-CA" dirty="0"/>
-              <a:t>Footer </a:t>
-            </a:r>
-          </a:p>
-          <a:p>
-            <a:pPr marL="285750" indent="-285750">
-              <a:buFont typeface="Arial" panose="020B0604020202020204" pitchFamily="34" charset="0"/>
-              <a:buChar char="•"/>
-            </a:pPr>
-            <a:r>
-              <a:rPr lang="en-CA" dirty="0"/>
-              <a:t>Bittersweet</a:t>
-            </a:r>
-          </a:p>
-          <a:p>
-            <a:pPr marL="285750" indent="-285750">
-              <a:buFont typeface="Arial" panose="020B0604020202020204" pitchFamily="34" charset="0"/>
-              <a:buChar char="•"/>
-            </a:pPr>
-            <a:r>
-              <a:rPr lang="en-CA" dirty="0"/>
-              <a:t>Form title color</a:t>
-            </a:r>
-          </a:p>
-          <a:p>
-            <a:pPr marL="285750" indent="-285750">
-              <a:buFont typeface="Arial" panose="020B0604020202020204" pitchFamily="34" charset="0"/>
-              <a:buChar char="•"/>
-            </a:pPr>
-            <a:r>
-              <a:rPr lang="en-CA" dirty="0"/>
-              <a:t>Menu table color</a:t>
-            </a:r>
-          </a:p>
-          <a:p>
-            <a:pPr marL="285750" indent="-285750">
-              <a:buFont typeface="Arial" panose="020B0604020202020204" pitchFamily="34" charset="0"/>
-              <a:buChar char="•"/>
-            </a:pPr>
-            <a:r>
-              <a:rPr lang="en-CA" dirty="0"/>
-              <a:t>Contact font color</a:t>
+              <a:t>Dog advice container background color</a:t>
             </a:r>
           </a:p>
         </p:txBody>
@@ -10859,8 +11081,8 @@
         </p:nvSpPr>
         <p:spPr>
           <a:xfrm>
-            <a:off x="7319057" y="1926568"/>
-            <a:ext cx="1905880" cy="1477328"/>
+            <a:off x="6321933" y="1841093"/>
+            <a:ext cx="1589049" cy="1477328"/>
           </a:xfrm>
           <a:prstGeom prst="rect">
             <a:avLst/>
@@ -10873,23 +11095,21 @@
           </a:bodyPr>
           <a:lstStyle/>
           <a:p>
+            <a:r>
+              <a:rPr lang="en-CA" dirty="0">
+                <a:latin typeface="Georgia Pro" panose="02040502050405020303" pitchFamily="18" charset="0"/>
+              </a:rPr>
+              <a:t>#f1f2be</a:t>
+            </a:r>
+          </a:p>
+          <a:p>
             <a:pPr marL="285750" indent="-285750">
               <a:buFont typeface="Arial" panose="020B0604020202020204" pitchFamily="34" charset="0"/>
               <a:buChar char="•"/>
             </a:pPr>
             <a:r>
               <a:rPr lang="en-CA" dirty="0"/>
-              <a:t>Content</a:t>
-            </a:r>
-          </a:p>
-          <a:p>
-            <a:pPr marL="285750" indent="-285750">
-              <a:buFont typeface="Arial" panose="020B0604020202020204" pitchFamily="34" charset="0"/>
-              <a:buChar char="•"/>
-            </a:pPr>
-            <a:r>
-              <a:rPr lang="en-CA" dirty="0"/>
-              <a:t>Carousel slide background color</a:t>
+              <a:t>Dog cards’ background color</a:t>
             </a:r>
           </a:p>
           <a:p>
@@ -10915,8 +11135,8 @@
         </p:nvSpPr>
         <p:spPr>
           <a:xfrm>
-            <a:off x="8867872" y="1926568"/>
-            <a:ext cx="2129148" cy="2585323"/>
+            <a:off x="7893511" y="1848607"/>
+            <a:ext cx="2129148" cy="923330"/>
           </a:xfrm>
           <a:prstGeom prst="rect">
             <a:avLst/>
@@ -10929,51 +11149,25 @@
           </a:bodyPr>
           <a:lstStyle/>
           <a:p>
+            <a:r>
+              <a:rPr lang="en-CA" sz="1800" dirty="0">
+                <a:solidFill>
+                  <a:schemeClr val="tx1"/>
+                </a:solidFill>
+                <a:latin typeface="Georgia Pro" panose="02040502050405020303" pitchFamily="18" charset="0"/>
+              </a:rPr>
+              <a:t>#f6f6f2</a:t>
+            </a:r>
+          </a:p>
+          <a:p>
             <a:pPr marL="285750" indent="-285750">
               <a:buFont typeface="Arial" panose="020B0604020202020204" pitchFamily="34" charset="0"/>
               <a:buChar char="•"/>
             </a:pPr>
             <a:r>
               <a:rPr lang="en-CA" dirty="0"/>
-              <a:t>Form Background Color</a:t>
-            </a:r>
-          </a:p>
-          <a:p>
-            <a:pPr marL="285750" indent="-285750">
-              <a:buFont typeface="Arial" panose="020B0604020202020204" pitchFamily="34" charset="0"/>
-              <a:buChar char="•"/>
-            </a:pPr>
-            <a:r>
-              <a:rPr lang="en-CA" dirty="0"/>
-              <a:t>Menu table Background Color</a:t>
-            </a:r>
-          </a:p>
-          <a:p>
-            <a:pPr marL="285750" indent="-285750">
-              <a:buFont typeface="Arial" panose="020B0604020202020204" pitchFamily="34" charset="0"/>
-              <a:buChar char="•"/>
-            </a:pPr>
-            <a:r>
-              <a:rPr lang="en-CA" dirty="0"/>
-              <a:t>Menu table head Color</a:t>
-            </a:r>
-          </a:p>
-          <a:p>
-            <a:pPr marL="285750" indent="-285750">
-              <a:buFont typeface="Arial" panose="020B0604020202020204" pitchFamily="34" charset="0"/>
-              <a:buChar char="•"/>
-            </a:pPr>
-            <a:r>
-              <a:rPr lang="en-CA" dirty="0"/>
-              <a:t>Coffee and cake background color</a:t>
-            </a:r>
-          </a:p>
-          <a:p>
-            <a:pPr marL="285750" indent="-285750">
-              <a:buFont typeface="Arial" panose="020B0604020202020204" pitchFamily="34" charset="0"/>
-              <a:buChar char="•"/>
-            </a:pPr>
-            <a:endParaRPr lang="en-CA" dirty="0"/>
+              <a:t>Section div background color</a:t>
+            </a:r>
           </a:p>
         </p:txBody>
       </p:sp>
@@ -10991,8 +11185,8 @@
         </p:nvSpPr>
         <p:spPr>
           <a:xfrm>
-            <a:off x="1254370" y="1926568"/>
-            <a:ext cx="2502569" cy="1200329"/>
+            <a:off x="1097281" y="1842829"/>
+            <a:ext cx="2059388" cy="2585323"/>
           </a:xfrm>
           <a:prstGeom prst="rect">
             <a:avLst/>
@@ -11005,13 +11199,29 @@
           </a:bodyPr>
           <a:lstStyle/>
           <a:p>
+            <a:r>
+              <a:rPr lang="en-HK" sz="1200" b="0" dirty="0">
+                <a:effectLst/>
+                <a:latin typeface="Consolas" panose="020B0609020204030204" pitchFamily="49" charset="0"/>
+              </a:rPr>
+              <a:t>#</a:t>
+            </a:r>
+            <a:r>
+              <a:rPr lang="en-HK" sz="1800" b="0" dirty="0">
+                <a:effectLst/>
+                <a:latin typeface="Georgia Pro" panose="02040502050405020303" pitchFamily="18" charset="0"/>
+              </a:rPr>
+              <a:t>6c584c</a:t>
+            </a:r>
+          </a:p>
+          <a:p>
             <a:pPr marL="285750" indent="-285750">
               <a:buFont typeface="Arial" panose="020B0604020202020204" pitchFamily="34" charset="0"/>
               <a:buChar char="•"/>
             </a:pPr>
             <a:r>
               <a:rPr lang="en-CA" dirty="0"/>
-              <a:t>Form content color</a:t>
+              <a:t>Pagination hover status</a:t>
             </a:r>
           </a:p>
           <a:p>
@@ -11021,15 +11231,41 @@
             </a:pPr>
             <a:r>
               <a:rPr lang="en-CA" dirty="0"/>
-              <a:t>Menu table head Background Color</a:t>
-            </a:r>
+              <a:t>Pagination active status</a:t>
+            </a:r>
+            <a:endParaRPr lang="en-HK" dirty="0">
+              <a:latin typeface="Georgia Pro" panose="02040502050405020303" pitchFamily="18" charset="0"/>
+            </a:endParaRPr>
+          </a:p>
+          <a:p>
+            <a:r>
+              <a:rPr lang="en-HK" sz="1800" b="0" dirty="0">
+                <a:effectLst/>
+                <a:latin typeface="Georgia Pro" panose="02040502050405020303" pitchFamily="18" charset="0"/>
+              </a:rPr>
+              <a:t>#8a817c</a:t>
+            </a:r>
+            <a:endParaRPr lang="en-CA" dirty="0"/>
           </a:p>
           <a:p>
             <a:pPr marL="285750" indent="-285750">
               <a:buFont typeface="Arial" panose="020B0604020202020204" pitchFamily="34" charset="0"/>
               <a:buChar char="•"/>
             </a:pPr>
-            <a:endParaRPr lang="en-CA" dirty="0"/>
+            <a:r>
+              <a:rPr lang="en-CA" dirty="0"/>
+              <a:t>Dog card text</a:t>
+            </a:r>
+          </a:p>
+          <a:p>
+            <a:pPr marL="285750" indent="-285750">
+              <a:buFont typeface="Arial" panose="020B0604020202020204" pitchFamily="34" charset="0"/>
+              <a:buChar char="•"/>
+            </a:pPr>
+            <a:r>
+              <a:rPr lang="en-CA" dirty="0"/>
+              <a:t>Pagination static status</a:t>
+            </a:r>
           </a:p>
         </p:txBody>
       </p:sp>
@@ -11047,8 +11283,8 @@
         </p:nvSpPr>
         <p:spPr>
           <a:xfrm>
-            <a:off x="5479661" y="1894699"/>
-            <a:ext cx="1905880" cy="923330"/>
+            <a:off x="4866189" y="1841093"/>
+            <a:ext cx="1589049" cy="1200329"/>
           </a:xfrm>
           <a:prstGeom prst="rect">
             <a:avLst/>
@@ -11061,13 +11297,25 @@
           </a:bodyPr>
           <a:lstStyle/>
           <a:p>
+            <a:r>
+              <a:rPr lang="en-CA" sz="1800" dirty="0">
+                <a:solidFill>
+                  <a:schemeClr val="tx1"/>
+                </a:solidFill>
+                <a:latin typeface="Georgia Pro" panose="02040502050405020303" pitchFamily="18" charset="0"/>
+              </a:rPr>
+              <a:t>#f3eee8</a:t>
+            </a:r>
+            <a:endParaRPr lang="en-CA" dirty="0"/>
+          </a:p>
+          <a:p>
             <a:pPr marL="285750" indent="-285750">
               <a:buFont typeface="Arial" panose="020B0604020202020204" pitchFamily="34" charset="0"/>
               <a:buChar char="•"/>
             </a:pPr>
             <a:r>
               <a:rPr lang="en-CA" dirty="0"/>
-              <a:t>Carousel slide background color</a:t>
+              <a:t>Body background color</a:t>
             </a:r>
           </a:p>
         </p:txBody>
@@ -11131,26 +11379,28 @@
       </p:sp>
       <p:sp>
         <p:nvSpPr>
-          <p:cNvPr id="10" name="橢圓 2">
+          <p:cNvPr id="25" name="橢圓 8">
             <a:extLst>
               <a:ext uri="{FF2B5EF4-FFF2-40B4-BE49-F238E27FC236}">
-                <a16:creationId xmlns:a16="http://schemas.microsoft.com/office/drawing/2014/main" id="{B3746BA1-28AB-50C0-58FC-16CC9048540A}"/>
+                <a16:creationId xmlns:a16="http://schemas.microsoft.com/office/drawing/2014/main" id="{AE68DC1B-D1FB-62DE-912B-82397A364AB3}"/>
               </a:ext>
             </a:extLst>
           </p:cNvPr>
-          <p:cNvSpPr/>
+          <p:cNvSpPr>
+            <a:spLocks noChangeAspect="1"/>
+          </p:cNvSpPr>
           <p:nvPr/>
         </p:nvSpPr>
         <p:spPr>
           <a:xfrm>
-            <a:off x="1293265" y="3617423"/>
-            <a:ext cx="2502569" cy="2502568"/>
+            <a:off x="134806" y="4390934"/>
+            <a:ext cx="1909046" cy="1856200"/>
           </a:xfrm>
           <a:prstGeom prst="ellipse">
             <a:avLst/>
           </a:prstGeom>
           <a:solidFill>
-            <a:srgbClr val="716358"/>
+            <a:srgbClr val="6C584C"/>
           </a:solidFill>
           <a:ln>
             <a:noFill/>
@@ -11178,36 +11428,52 @@
           <a:p>
             <a:pPr algn="ctr"/>
             <a:r>
-              <a:rPr lang="en-CA" sz="3000" dirty="0">
-                <a:latin typeface="Georgia Pro" panose="02040502050405020303" pitchFamily="18" charset="0"/>
-              </a:rPr>
-              <a:t>#716358</a:t>
-            </a:r>
-          </a:p>
-        </p:txBody>
-      </p:sp>
-      <p:sp>
-        <p:nvSpPr>
-          <p:cNvPr id="12" name="橢圓 4">
+              <a:rPr lang="en-HK" sz="1600" b="0" dirty="0">
+                <a:solidFill>
+                  <a:schemeClr val="bg1"/>
+                </a:solidFill>
+                <a:effectLst/>
+                <a:latin typeface="Consolas" panose="020B0609020204030204" pitchFamily="49" charset="0"/>
+              </a:rPr>
+              <a:t>#</a:t>
+            </a:r>
+            <a:r>
+              <a:rPr lang="en-HK" sz="2400" b="0" dirty="0">
+                <a:solidFill>
+                  <a:schemeClr val="bg1"/>
+                </a:solidFill>
+                <a:effectLst/>
+                <a:latin typeface="Georgia Pro" panose="02040502050405020303" pitchFamily="18" charset="0"/>
+              </a:rPr>
+              <a:t>6c584c</a:t>
+            </a:r>
+          </a:p>
+        </p:txBody>
+      </p:sp>
+      <p:sp>
+        <p:nvSpPr>
+          <p:cNvPr id="26" name="橢圓 8">
             <a:extLst>
               <a:ext uri="{FF2B5EF4-FFF2-40B4-BE49-F238E27FC236}">
-                <a16:creationId xmlns:a16="http://schemas.microsoft.com/office/drawing/2014/main" id="{F06DF1B2-77A8-CB05-CCF7-0C327E2CCEBC}"/>
+                <a16:creationId xmlns:a16="http://schemas.microsoft.com/office/drawing/2014/main" id="{441F51E7-79E6-0268-2ABC-D743EC20BA9C}"/>
               </a:ext>
             </a:extLst>
           </p:cNvPr>
-          <p:cNvSpPr/>
+          <p:cNvSpPr>
+            <a:spLocks noChangeAspect="1"/>
+          </p:cNvSpPr>
           <p:nvPr/>
         </p:nvSpPr>
         <p:spPr>
           <a:xfrm>
-            <a:off x="3462960" y="3787996"/>
-            <a:ext cx="2331995" cy="2331995"/>
+            <a:off x="1734603" y="4461122"/>
+            <a:ext cx="1811480" cy="1715824"/>
           </a:xfrm>
           <a:prstGeom prst="ellipse">
             <a:avLst/>
           </a:prstGeom>
           <a:solidFill>
-            <a:srgbClr val="C49368"/>
+            <a:srgbClr val="8A817C"/>
           </a:solidFill>
           <a:ln>
             <a:noFill/>
@@ -11235,33 +11501,46 @@
           <a:p>
             <a:pPr algn="ctr"/>
             <a:r>
-              <a:rPr lang="en-CA" sz="2800" dirty="0">
+              <a:rPr lang="en-HK" sz="1600" b="0" dirty="0">
                 <a:solidFill>
                   <a:schemeClr val="bg1"/>
                 </a:solidFill>
-                <a:latin typeface="Georgia Pro" panose="02040502050405020303" pitchFamily="18" charset="0"/>
-              </a:rPr>
-              <a:t>#C49368</a:t>
-            </a:r>
-          </a:p>
-        </p:txBody>
-      </p:sp>
-      <p:sp>
-        <p:nvSpPr>
-          <p:cNvPr id="18" name="橢圓 5">
+                <a:effectLst/>
+                <a:latin typeface="Consolas" panose="020B0609020204030204" pitchFamily="49" charset="0"/>
+              </a:rPr>
+              <a:t>#</a:t>
+            </a:r>
+            <a:r>
+              <a:rPr lang="en-HK" sz="2400" b="0" dirty="0">
+                <a:solidFill>
+                  <a:schemeClr val="bg1"/>
+                </a:solidFill>
+                <a:effectLst/>
+                <a:latin typeface="Georgia Pro" panose="02040502050405020303" pitchFamily="18" charset="0"/>
+              </a:rPr>
+              <a:t>8a817c</a:t>
+            </a:r>
+          </a:p>
+        </p:txBody>
+      </p:sp>
+      <p:sp>
+        <p:nvSpPr>
+          <p:cNvPr id="27" name="橢圓 5">
             <a:extLst>
               <a:ext uri="{FF2B5EF4-FFF2-40B4-BE49-F238E27FC236}">
-                <a16:creationId xmlns:a16="http://schemas.microsoft.com/office/drawing/2014/main" id="{6B17D8AC-299D-6382-180F-59A9555486AB}"/>
+                <a16:creationId xmlns:a16="http://schemas.microsoft.com/office/drawing/2014/main" id="{113E3383-679F-D8F3-4F1B-2C89C9023183}"/>
               </a:ext>
             </a:extLst>
           </p:cNvPr>
-          <p:cNvSpPr/>
+          <p:cNvSpPr>
+            <a:spLocks noChangeAspect="1"/>
+          </p:cNvSpPr>
           <p:nvPr/>
         </p:nvSpPr>
         <p:spPr>
           <a:xfrm>
-            <a:off x="5428782" y="4079962"/>
-            <a:ext cx="2040029" cy="2040029"/>
+            <a:off x="3228961" y="4500420"/>
+            <a:ext cx="1637228" cy="1637227"/>
           </a:xfrm>
           <a:prstGeom prst="ellipse">
             <a:avLst/>
@@ -11301,27 +11580,38 @@
                 </a:solidFill>
                 <a:latin typeface="Georgia Pro" panose="02040502050405020303" pitchFamily="18" charset="0"/>
               </a:rPr>
-              <a:t>#efe2d2</a:t>
-            </a:r>
-          </a:p>
-        </p:txBody>
-      </p:sp>
-      <p:sp>
-        <p:nvSpPr>
-          <p:cNvPr id="19" name="橢圓 6">
+              <a:t>#</a:t>
+            </a:r>
+            <a:r>
+              <a:rPr lang="en-CA" sz="2000" dirty="0">
+                <a:solidFill>
+                  <a:schemeClr val="tx1"/>
+                </a:solidFill>
+                <a:latin typeface="Georgia Pro" panose="02040502050405020303" pitchFamily="18" charset="0"/>
+              </a:rPr>
+              <a:t>efe2d2</a:t>
+            </a:r>
+          </a:p>
+        </p:txBody>
+      </p:sp>
+      <p:sp>
+        <p:nvSpPr>
+          <p:cNvPr id="28" name="橢圓 6">
             <a:extLst>
               <a:ext uri="{FF2B5EF4-FFF2-40B4-BE49-F238E27FC236}">
-                <a16:creationId xmlns:a16="http://schemas.microsoft.com/office/drawing/2014/main" id="{9575D71D-937D-E06F-47E0-44592BAB9EBA}"/>
+                <a16:creationId xmlns:a16="http://schemas.microsoft.com/office/drawing/2014/main" id="{5393F88D-9BC8-C2E9-D5C6-BCD3DBBA2848}"/>
               </a:ext>
             </a:extLst>
           </p:cNvPr>
-          <p:cNvSpPr/>
+          <p:cNvSpPr>
+            <a:spLocks noChangeAspect="1"/>
+          </p:cNvSpPr>
           <p:nvPr/>
         </p:nvSpPr>
         <p:spPr>
           <a:xfrm>
-            <a:off x="7137266" y="4386102"/>
-            <a:ext cx="1733889" cy="1733889"/>
+            <a:off x="4561879" y="4545052"/>
+            <a:ext cx="1533315" cy="1547961"/>
           </a:xfrm>
           <a:prstGeom prst="ellipse">
             <a:avLst/>
@@ -11368,20 +11658,85 @@
       </p:sp>
       <p:sp>
         <p:nvSpPr>
-          <p:cNvPr id="21" name="橢圓 8">
+          <p:cNvPr id="29" name="橢圓 8">
             <a:extLst>
               <a:ext uri="{FF2B5EF4-FFF2-40B4-BE49-F238E27FC236}">
-                <a16:creationId xmlns:a16="http://schemas.microsoft.com/office/drawing/2014/main" id="{55800920-3148-1C65-ACC6-D3EFFAED7E7C}"/>
+                <a16:creationId xmlns:a16="http://schemas.microsoft.com/office/drawing/2014/main" id="{5247E454-684B-8AE4-9D4E-979C20CBCD54}"/>
               </a:ext>
             </a:extLst>
           </p:cNvPr>
-          <p:cNvSpPr/>
+          <p:cNvSpPr>
+            <a:spLocks noChangeAspect="1"/>
+          </p:cNvSpPr>
           <p:nvPr/>
         </p:nvSpPr>
         <p:spPr>
           <a:xfrm>
-            <a:off x="8622062" y="4837677"/>
-            <a:ext cx="1312025" cy="1282314"/>
+            <a:off x="5776768" y="4593653"/>
+            <a:ext cx="1461189" cy="1450757"/>
+          </a:xfrm>
+          <a:prstGeom prst="ellipse">
+            <a:avLst/>
+          </a:prstGeom>
+          <a:solidFill>
+            <a:srgbClr val="F1F2EB"/>
+          </a:solidFill>
+          <a:ln>
+            <a:noFill/>
+          </a:ln>
+        </p:spPr>
+        <p:style>
+          <a:lnRef idx="2">
+            <a:schemeClr val="accent1">
+              <a:shade val="15000"/>
+            </a:schemeClr>
+          </a:lnRef>
+          <a:fillRef idx="1">
+            <a:schemeClr val="accent1"/>
+          </a:fillRef>
+          <a:effectRef idx="0">
+            <a:schemeClr val="accent1"/>
+          </a:effectRef>
+          <a:fontRef idx="minor">
+            <a:schemeClr val="lt1"/>
+          </a:fontRef>
+        </p:style>
+        <p:txBody>
+          <a:bodyPr rtlCol="0" anchor="ctr"/>
+          <a:lstStyle/>
+          <a:p>
+            <a:pPr algn="ctr"/>
+            <a:r>
+              <a:rPr lang="en-HK" sz="1600" b="0" dirty="0">
+                <a:solidFill>
+                  <a:schemeClr val="tx1"/>
+                </a:solidFill>
+                <a:effectLst/>
+                <a:latin typeface="Georgia Pro" panose="02040502050405020303" pitchFamily="18" charset="0"/>
+              </a:rPr>
+              <a:t>#f1f2eb</a:t>
+            </a:r>
+          </a:p>
+        </p:txBody>
+      </p:sp>
+      <p:sp>
+        <p:nvSpPr>
+          <p:cNvPr id="30" name="橢圓 8">
+            <a:extLst>
+              <a:ext uri="{FF2B5EF4-FFF2-40B4-BE49-F238E27FC236}">
+                <a16:creationId xmlns:a16="http://schemas.microsoft.com/office/drawing/2014/main" id="{D9578406-68F9-0F77-C371-882F171AE6D9}"/>
+              </a:ext>
+            </a:extLst>
+          </p:cNvPr>
+          <p:cNvSpPr>
+            <a:spLocks/>
+          </p:cNvSpPr>
+          <p:nvPr/>
+        </p:nvSpPr>
+        <p:spPr>
+          <a:xfrm>
+            <a:off x="6844288" y="4593652"/>
+            <a:ext cx="1454305" cy="1450757"/>
           </a:xfrm>
           <a:prstGeom prst="ellipse">
             <a:avLst/>
@@ -11422,6 +11777,432 @@
                 <a:latin typeface="Georgia Pro" panose="02040502050405020303" pitchFamily="18" charset="0"/>
               </a:rPr>
               <a:t>#f6f6f2</a:t>
+            </a:r>
+          </a:p>
+        </p:txBody>
+      </p:sp>
+      <p:sp>
+        <p:nvSpPr>
+          <p:cNvPr id="31" name="橢圓 8">
+            <a:extLst>
+              <a:ext uri="{FF2B5EF4-FFF2-40B4-BE49-F238E27FC236}">
+                <a16:creationId xmlns:a16="http://schemas.microsoft.com/office/drawing/2014/main" id="{649F3CFF-40EB-1BF5-D831-17DFEB70AECA}"/>
+              </a:ext>
+            </a:extLst>
+          </p:cNvPr>
+          <p:cNvSpPr>
+            <a:spLocks noChangeAspect="1"/>
+          </p:cNvSpPr>
+          <p:nvPr/>
+        </p:nvSpPr>
+        <p:spPr>
+          <a:xfrm>
+            <a:off x="7947932" y="4672388"/>
+            <a:ext cx="1296446" cy="1293283"/>
+          </a:xfrm>
+          <a:prstGeom prst="ellipse">
+            <a:avLst/>
+          </a:prstGeom>
+          <a:solidFill>
+            <a:srgbClr val="13348E"/>
+          </a:solidFill>
+          <a:ln>
+            <a:noFill/>
+          </a:ln>
+        </p:spPr>
+        <p:style>
+          <a:lnRef idx="2">
+            <a:schemeClr val="accent1">
+              <a:shade val="15000"/>
+            </a:schemeClr>
+          </a:lnRef>
+          <a:fillRef idx="1">
+            <a:schemeClr val="accent1"/>
+          </a:fillRef>
+          <a:effectRef idx="0">
+            <a:schemeClr val="accent1"/>
+          </a:effectRef>
+          <a:fontRef idx="minor">
+            <a:schemeClr val="lt1"/>
+          </a:fontRef>
+        </p:style>
+        <p:txBody>
+          <a:bodyPr rtlCol="0" anchor="ctr"/>
+          <a:lstStyle/>
+          <a:p>
+            <a:r>
+              <a:rPr lang="en-HK" sz="1600" b="0" dirty="0">
+                <a:solidFill>
+                  <a:schemeClr val="bg1"/>
+                </a:solidFill>
+                <a:effectLst/>
+                <a:latin typeface="Georgia Pro" panose="02040502050405020303" pitchFamily="18" charset="0"/>
+              </a:rPr>
+              <a:t>#</a:t>
+            </a:r>
+            <a:r>
+              <a:rPr lang="en-HK" sz="1400" b="0" dirty="0">
+                <a:solidFill>
+                  <a:schemeClr val="bg1"/>
+                </a:solidFill>
+                <a:effectLst/>
+                <a:latin typeface="Georgia Pro" panose="02040502050405020303" pitchFamily="18" charset="0"/>
+              </a:rPr>
+              <a:t>13348e</a:t>
+            </a:r>
+          </a:p>
+        </p:txBody>
+      </p:sp>
+      <p:sp>
+        <p:nvSpPr>
+          <p:cNvPr id="32" name="橢圓 8">
+            <a:extLst>
+              <a:ext uri="{FF2B5EF4-FFF2-40B4-BE49-F238E27FC236}">
+                <a16:creationId xmlns:a16="http://schemas.microsoft.com/office/drawing/2014/main" id="{90AD7A0D-70DE-8297-F502-54CA5B4984E5}"/>
+              </a:ext>
+            </a:extLst>
+          </p:cNvPr>
+          <p:cNvSpPr/>
+          <p:nvPr/>
+        </p:nvSpPr>
+        <p:spPr>
+          <a:xfrm>
+            <a:off x="8958085" y="4743644"/>
+            <a:ext cx="1183660" cy="1150769"/>
+          </a:xfrm>
+          <a:prstGeom prst="ellipse">
+            <a:avLst/>
+          </a:prstGeom>
+          <a:solidFill>
+            <a:srgbClr val="3273F6"/>
+          </a:solidFill>
+          <a:ln>
+            <a:noFill/>
+          </a:ln>
+        </p:spPr>
+        <p:style>
+          <a:lnRef idx="2">
+            <a:schemeClr val="accent1">
+              <a:shade val="15000"/>
+            </a:schemeClr>
+          </a:lnRef>
+          <a:fillRef idx="1">
+            <a:schemeClr val="accent1"/>
+          </a:fillRef>
+          <a:effectRef idx="0">
+            <a:schemeClr val="accent1"/>
+          </a:effectRef>
+          <a:fontRef idx="minor">
+            <a:schemeClr val="lt1"/>
+          </a:fontRef>
+        </p:style>
+        <p:txBody>
+          <a:bodyPr rtlCol="0" anchor="ctr"/>
+          <a:lstStyle/>
+          <a:p>
+            <a:pPr algn="ctr"/>
+            <a:r>
+              <a:rPr lang="en-HK" sz="1200" b="0" dirty="0">
+                <a:solidFill>
+                  <a:schemeClr val="bg1"/>
+                </a:solidFill>
+                <a:effectLst/>
+                <a:latin typeface="Georgia Pro" panose="02040502050405020303" pitchFamily="18" charset="0"/>
+              </a:rPr>
+              <a:t>#3273F6</a:t>
+            </a:r>
+          </a:p>
+        </p:txBody>
+      </p:sp>
+      <p:sp>
+        <p:nvSpPr>
+          <p:cNvPr id="33" name="橢圓 8">
+            <a:extLst>
+              <a:ext uri="{FF2B5EF4-FFF2-40B4-BE49-F238E27FC236}">
+                <a16:creationId xmlns:a16="http://schemas.microsoft.com/office/drawing/2014/main" id="{9F5077AB-3E15-78F8-1200-85CC57E866B4}"/>
+              </a:ext>
+            </a:extLst>
+          </p:cNvPr>
+          <p:cNvSpPr/>
+          <p:nvPr/>
+        </p:nvSpPr>
+        <p:spPr>
+          <a:xfrm>
+            <a:off x="9903870" y="4751514"/>
+            <a:ext cx="1183660" cy="1150769"/>
+          </a:xfrm>
+          <a:prstGeom prst="ellipse">
+            <a:avLst/>
+          </a:prstGeom>
+          <a:solidFill>
+            <a:srgbClr val="F64C72"/>
+          </a:solidFill>
+          <a:ln>
+            <a:noFill/>
+          </a:ln>
+        </p:spPr>
+        <p:style>
+          <a:lnRef idx="2">
+            <a:schemeClr val="accent1">
+              <a:shade val="15000"/>
+            </a:schemeClr>
+          </a:lnRef>
+          <a:fillRef idx="1">
+            <a:schemeClr val="accent1"/>
+          </a:fillRef>
+          <a:effectRef idx="0">
+            <a:schemeClr val="accent1"/>
+          </a:effectRef>
+          <a:fontRef idx="minor">
+            <a:schemeClr val="lt1"/>
+          </a:fontRef>
+        </p:style>
+        <p:txBody>
+          <a:bodyPr rtlCol="0" anchor="ctr"/>
+          <a:lstStyle/>
+          <a:p>
+            <a:r>
+              <a:rPr lang="en-HK" sz="1200" b="0" dirty="0">
+                <a:solidFill>
+                  <a:schemeClr val="bg1"/>
+                </a:solidFill>
+                <a:effectLst/>
+                <a:latin typeface="Georgia Pro" panose="02040502050405020303" pitchFamily="18" charset="0"/>
+              </a:rPr>
+              <a:t>#F64C72</a:t>
+            </a:r>
+          </a:p>
+        </p:txBody>
+      </p:sp>
+      <p:sp>
+        <p:nvSpPr>
+          <p:cNvPr id="34" name="橢圓 8">
+            <a:extLst>
+              <a:ext uri="{FF2B5EF4-FFF2-40B4-BE49-F238E27FC236}">
+                <a16:creationId xmlns:a16="http://schemas.microsoft.com/office/drawing/2014/main" id="{5C0364A4-E31F-C60B-3956-79E6DB8E732A}"/>
+              </a:ext>
+            </a:extLst>
+          </p:cNvPr>
+          <p:cNvSpPr/>
+          <p:nvPr/>
+        </p:nvSpPr>
+        <p:spPr>
+          <a:xfrm>
+            <a:off x="10867657" y="4743643"/>
+            <a:ext cx="1183660" cy="1150769"/>
+          </a:xfrm>
+          <a:prstGeom prst="ellipse">
+            <a:avLst/>
+          </a:prstGeom>
+          <a:solidFill>
+            <a:srgbClr val="FFD700"/>
+          </a:solidFill>
+          <a:ln>
+            <a:noFill/>
+          </a:ln>
+        </p:spPr>
+        <p:style>
+          <a:lnRef idx="2">
+            <a:schemeClr val="accent1">
+              <a:shade val="15000"/>
+            </a:schemeClr>
+          </a:lnRef>
+          <a:fillRef idx="1">
+            <a:schemeClr val="accent1"/>
+          </a:fillRef>
+          <a:effectRef idx="0">
+            <a:schemeClr val="accent1"/>
+          </a:effectRef>
+          <a:fontRef idx="minor">
+            <a:schemeClr val="lt1"/>
+          </a:fontRef>
+        </p:style>
+        <p:txBody>
+          <a:bodyPr rtlCol="0" anchor="ctr"/>
+          <a:lstStyle/>
+          <a:p>
+            <a:r>
+              <a:rPr lang="en-HK" sz="1200" b="0" dirty="0">
+                <a:solidFill>
+                  <a:schemeClr val="tx1"/>
+                </a:solidFill>
+                <a:effectLst/>
+                <a:latin typeface="Georgia Pro" panose="02040502050405020303" pitchFamily="18" charset="0"/>
+              </a:rPr>
+              <a:t>#ffd700</a:t>
+            </a:r>
+          </a:p>
+        </p:txBody>
+      </p:sp>
+      <p:sp>
+        <p:nvSpPr>
+          <p:cNvPr id="35" name="文字方塊 12">
+            <a:extLst>
+              <a:ext uri="{FF2B5EF4-FFF2-40B4-BE49-F238E27FC236}">
+                <a16:creationId xmlns:a16="http://schemas.microsoft.com/office/drawing/2014/main" id="{C83F9FC0-EB54-140C-1C92-2396FA15B190}"/>
+              </a:ext>
+            </a:extLst>
+          </p:cNvPr>
+          <p:cNvSpPr txBox="1"/>
+          <p:nvPr/>
+        </p:nvSpPr>
+        <p:spPr>
+          <a:xfrm>
+            <a:off x="9900458" y="1848607"/>
+            <a:ext cx="2018731" cy="1785104"/>
+          </a:xfrm>
+          <a:prstGeom prst="rect">
+            <a:avLst/>
+          </a:prstGeom>
+          <a:noFill/>
+        </p:spPr>
+        <p:txBody>
+          <a:bodyPr wrap="square" rtlCol="0">
+            <a:spAutoFit/>
+          </a:bodyPr>
+          <a:lstStyle/>
+          <a:p>
+            <a:r>
+              <a:rPr lang="en-HK" sz="2000" b="0" dirty="0">
+                <a:effectLst/>
+                <a:latin typeface="Georgia Pro" panose="02040502050405020303" pitchFamily="18" charset="0"/>
+              </a:rPr>
+              <a:t>#</a:t>
+            </a:r>
+            <a:r>
+              <a:rPr lang="en-HK" sz="1800" b="0" dirty="0">
+                <a:effectLst/>
+                <a:latin typeface="Georgia Pro" panose="02040502050405020303" pitchFamily="18" charset="0"/>
+              </a:rPr>
+              <a:t>13348e</a:t>
+            </a:r>
+          </a:p>
+          <a:p>
+            <a:pPr marL="285750" indent="-285750">
+              <a:buFont typeface="Arial" panose="020B0604020202020204" pitchFamily="34" charset="0"/>
+              <a:buChar char="•"/>
+            </a:pPr>
+            <a:r>
+              <a:rPr lang="en-CA" dirty="0"/>
+              <a:t>Nav items color</a:t>
+            </a:r>
+          </a:p>
+          <a:p>
+            <a:r>
+              <a:rPr lang="en-HK" sz="1800" b="0" dirty="0">
+                <a:effectLst/>
+                <a:latin typeface="Georgia Pro" panose="02040502050405020303" pitchFamily="18" charset="0"/>
+              </a:rPr>
+              <a:t>#F64C72</a:t>
+            </a:r>
+          </a:p>
+          <a:p>
+            <a:pPr marL="285750" indent="-285750">
+              <a:buFont typeface="Arial" panose="020B0604020202020204" pitchFamily="34" charset="0"/>
+              <a:buChar char="•"/>
+            </a:pPr>
+            <a:r>
+              <a:rPr lang="en-CA" dirty="0"/>
+              <a:t>Nav items and dog cards’ hover status color</a:t>
+            </a:r>
+          </a:p>
+        </p:txBody>
+      </p:sp>
+      <p:sp>
+        <p:nvSpPr>
+          <p:cNvPr id="36" name="文字方塊 12">
+            <a:extLst>
+              <a:ext uri="{FF2B5EF4-FFF2-40B4-BE49-F238E27FC236}">
+                <a16:creationId xmlns:a16="http://schemas.microsoft.com/office/drawing/2014/main" id="{D06FDA00-5479-00BD-FDF0-E83D764A14CF}"/>
+              </a:ext>
+            </a:extLst>
+          </p:cNvPr>
+          <p:cNvSpPr txBox="1"/>
+          <p:nvPr/>
+        </p:nvSpPr>
+        <p:spPr>
+          <a:xfrm>
+            <a:off x="3047387" y="3178894"/>
+            <a:ext cx="2129148" cy="923330"/>
+          </a:xfrm>
+          <a:prstGeom prst="rect">
+            <a:avLst/>
+          </a:prstGeom>
+          <a:noFill/>
+        </p:spPr>
+        <p:txBody>
+          <a:bodyPr wrap="square" rtlCol="0">
+            <a:spAutoFit/>
+          </a:bodyPr>
+          <a:lstStyle/>
+          <a:p>
+            <a:r>
+              <a:rPr lang="en-HK" sz="1800" b="0" dirty="0">
+                <a:effectLst/>
+                <a:latin typeface="Georgia Pro" panose="02040502050405020303" pitchFamily="18" charset="0"/>
+              </a:rPr>
+              <a:t>#3273F6</a:t>
+            </a:r>
+          </a:p>
+          <a:p>
+            <a:pPr marL="285750" indent="-285750">
+              <a:buFont typeface="Arial" panose="020B0604020202020204" pitchFamily="34" charset="0"/>
+              <a:buChar char="•"/>
+            </a:pPr>
+            <a:r>
+              <a:rPr lang="en-CA" dirty="0"/>
+              <a:t>Form slider and buttons color</a:t>
+            </a:r>
+          </a:p>
+        </p:txBody>
+      </p:sp>
+      <p:sp>
+        <p:nvSpPr>
+          <p:cNvPr id="37" name="文字方塊 12">
+            <a:extLst>
+              <a:ext uri="{FF2B5EF4-FFF2-40B4-BE49-F238E27FC236}">
+                <a16:creationId xmlns:a16="http://schemas.microsoft.com/office/drawing/2014/main" id="{A461AE5F-A998-B103-3A99-B3C6234F3972}"/>
+              </a:ext>
+            </a:extLst>
+          </p:cNvPr>
+          <p:cNvSpPr txBox="1"/>
+          <p:nvPr/>
+        </p:nvSpPr>
+        <p:spPr>
+          <a:xfrm>
+            <a:off x="4957121" y="3183995"/>
+            <a:ext cx="2129148" cy="923330"/>
+          </a:xfrm>
+          <a:prstGeom prst="rect">
+            <a:avLst/>
+          </a:prstGeom>
+          <a:noFill/>
+        </p:spPr>
+        <p:txBody>
+          <a:bodyPr wrap="square" rtlCol="0">
+            <a:spAutoFit/>
+          </a:bodyPr>
+          <a:lstStyle/>
+          <a:p>
+            <a:r>
+              <a:rPr lang="en-HK" sz="1800" b="0" dirty="0">
+                <a:solidFill>
+                  <a:schemeClr val="tx1"/>
+                </a:solidFill>
+                <a:effectLst/>
+                <a:latin typeface="Georgia Pro" panose="02040502050405020303" pitchFamily="18" charset="0"/>
+              </a:rPr>
+              <a:t>#ffd700</a:t>
+            </a:r>
+          </a:p>
+          <a:p>
+            <a:pPr marL="285750" indent="-285750">
+              <a:buFont typeface="Arial" panose="020B0604020202020204" pitchFamily="34" charset="0"/>
+              <a:buChar char="•"/>
+            </a:pPr>
+            <a:r>
+              <a:rPr lang="en-CA" dirty="0"/>
+              <a:t>Dog parameter stars colors</a:t>
             </a:r>
           </a:p>
         </p:txBody>
@@ -12081,7 +12862,7 @@
         </p:nvSpPr>
         <p:spPr>
           <a:xfrm>
-            <a:off x="479502" y="2720230"/>
+            <a:off x="1036320" y="2239785"/>
             <a:ext cx="3876142" cy="646331"/>
           </a:xfrm>
           <a:prstGeom prst="rect">
@@ -12226,7 +13007,7 @@
         </p:blipFill>
         <p:spPr>
           <a:xfrm>
-            <a:off x="370711" y="3476807"/>
+            <a:off x="1097280" y="2967274"/>
             <a:ext cx="3381848" cy="3228128"/>
           </a:xfrm>
           <a:prstGeom prst="rect">
@@ -16046,16 +16827,18 @@
               <a:t>Frontend UI designer: </a:t>
             </a:r>
             <a:r>
-              <a:rPr lang="en-US" b="0" dirty="0" err="1">
-                <a:effectLst/>
+              <a:rPr lang="en-US" dirty="0">
                 <a:latin typeface="Consolas" panose="020B0609020204030204" pitchFamily="49" charset="0"/>
               </a:rPr>
-              <a:t>lynn</a:t>
-            </a:r>
-            <a:endParaRPr lang="en-US" b="0" dirty="0">
-              <a:effectLst/>
-              <a:latin typeface="Consolas" panose="020B0609020204030204" pitchFamily="49" charset="0"/>
-            </a:endParaRPr>
+              <a:t>L</a:t>
+            </a:r>
+            <a:r>
+              <a:rPr lang="en-US" b="0" dirty="0">
+                <a:effectLst/>
+                <a:latin typeface="Consolas" panose="020B0609020204030204" pitchFamily="49" charset="0"/>
+              </a:rPr>
+              <a:t>ynn</a:t>
+            </a:r>
           </a:p>
           <a:p>
             <a:r>
@@ -17825,35 +18608,41 @@
               <a:rPr lang="en-CA" sz="2800" dirty="0">
                 <a:latin typeface="Georgia Pro" panose="02040502050405020303" pitchFamily="18" charset="0"/>
               </a:rPr>
-              <a:t>The target customer is </a:t>
-            </a:r>
-          </a:p>
-          <a:p>
-            <a:pPr marL="514350" indent="-514350">
+              <a:t>The target customer is:</a:t>
+            </a:r>
+          </a:p>
+          <a:p>
+            <a:r>
+              <a:rPr lang="en-CA" sz="2800" dirty="0">
+                <a:latin typeface="Georgia Pro" panose="02040502050405020303" pitchFamily="18" charset="0"/>
+              </a:rPr>
+              <a:t>Dog lovers</a:t>
+            </a:r>
+          </a:p>
+          <a:p>
+            <a:pPr marL="0" indent="0">
               <a:buClr>
                 <a:schemeClr val="accent5"/>
               </a:buClr>
-              <a:buFont typeface="+mj-lt"/>
-              <a:buAutoNum type="arabicPeriod"/>
-            </a:pPr>
-            <a:r>
-              <a:rPr lang="en-CA" sz="2800" dirty="0">
-                <a:latin typeface="Georgia Pro" panose="02040502050405020303" pitchFamily="18" charset="0"/>
-              </a:rPr>
-              <a:t>Dog lovers, </a:t>
-            </a:r>
-          </a:p>
-          <a:p>
-            <a:pPr marL="514350" indent="-514350">
-              <a:buClr>
-                <a:schemeClr val="accent5"/>
-              </a:buClr>
-              <a:buFont typeface="+mj-lt"/>
-              <a:buAutoNum type="arabicPeriod"/>
+              <a:buNone/>
             </a:pPr>
             <a:endParaRPr lang="en-CA" sz="2800" dirty="0">
               <a:latin typeface="Georgia Pro" panose="02040502050405020303" pitchFamily="18" charset="0"/>
             </a:endParaRPr>
+          </a:p>
+          <a:p>
+            <a:pPr marL="0" indent="0">
+              <a:buClr>
+                <a:schemeClr val="accent5"/>
+              </a:buClr>
+              <a:buNone/>
+            </a:pPr>
+            <a:r>
+              <a:rPr lang="en-CA" sz="2800" dirty="0">
+                <a:latin typeface="Georgia Pro" panose="02040502050405020303" pitchFamily="18" charset="0"/>
+              </a:rPr>
+              <a:t>Our slogan:</a:t>
+            </a:r>
           </a:p>
           <a:p>
             <a:r>
@@ -18007,9 +18796,19 @@
               <a:rPr lang="en-US" dirty="0">
                 <a:latin typeface="Georgia Pro" panose="02040502050405020303" pitchFamily="18" charset="0"/>
               </a:rPr>
-              <a:t>Describe the kind of feeling or story that your design is meant to convey to the visitor</a:t>
-            </a:r>
-            <a:endParaRPr lang="en-CA" dirty="0">
+              <a:t>Our website is inspired by Wikipedia but is designed specifically for dog enthusiasts. As our slogan states, we aim to assist people considering getting a dog by providing information about various dog breeds. Users can also find breed-specific advice on our site.</a:t>
+            </a:r>
+          </a:p>
+          <a:p>
+            <a:r>
+              <a:rPr lang="en-US" dirty="0">
+                <a:latin typeface="Georgia Pro" panose="02040502050405020303" pitchFamily="18" charset="0"/>
+              </a:rPr>
+              <a:t>We chose colors that closely resemble the fur colors of dogs as the theme for our site. Contract are created with different colors applied between sections.</a:t>
+            </a:r>
+          </a:p>
+          <a:p>
+            <a:endParaRPr lang="en-US" dirty="0">
               <a:latin typeface="Georgia Pro" panose="02040502050405020303" pitchFamily="18" charset="0"/>
             </a:endParaRPr>
           </a:p>
@@ -18167,40 +18966,63 @@
               <a:rPr lang="en-CA" sz="3200" dirty="0">
                 <a:latin typeface="Bree Serif" panose="02000503040000020004" pitchFamily="2" charset="0"/>
               </a:rPr>
-              <a:t>Font size: </a:t>
-            </a:r>
-            <a:r>
-              <a:rPr lang="en-CA" sz="3200" dirty="0" err="1">
-                <a:latin typeface="Bree Serif" panose="02000503040000020004" pitchFamily="2" charset="0"/>
-              </a:rPr>
-              <a:t>px</a:t>
-            </a:r>
-            <a:endParaRPr lang="en-CA" sz="3200" dirty="0">
-              <a:latin typeface="Bree Serif" panose="02000503040000020004" pitchFamily="2" charset="0"/>
-            </a:endParaRPr>
+              <a:t>Font size: 34px (&lt;h1&gt; tag)</a:t>
+            </a:r>
           </a:p>
           <a:p>
             <a:r>
               <a:rPr lang="en-CA" sz="3200" dirty="0">
                 <a:latin typeface="Bree Serif" panose="02000503040000020004" pitchFamily="2" charset="0"/>
               </a:rPr>
-              <a:t>Font Weight: </a:t>
+              <a:t>Font weight: bold</a:t>
             </a:r>
           </a:p>
           <a:p>
             <a:r>
               <a:rPr lang="en-CA" sz="3200" dirty="0">
-                <a:solidFill>
-                  <a:srgbClr val="775A0E"/>
-                </a:solidFill>
                 <a:latin typeface="Bree Serif" panose="02000503040000020004" pitchFamily="2" charset="0"/>
               </a:rPr>
-              <a:t>Color: #</a:t>
-            </a:r>
-            <a:endParaRPr lang="en-CA" sz="2800" b="0" dirty="0">
+              <a:t>Color:</a:t>
+            </a:r>
+            <a:endParaRPr lang="en-CA" sz="3200" dirty="0">
               <a:solidFill>
                 <a:srgbClr val="775A0E"/>
               </a:solidFill>
+              <a:latin typeface="Bree Serif" panose="02000503040000020004" pitchFamily="2" charset="0"/>
+            </a:endParaRPr>
+          </a:p>
+          <a:p>
+            <a:r>
+              <a:rPr lang="en-CA" sz="3200" dirty="0">
+                <a:solidFill>
+                  <a:srgbClr val="775A0E"/>
+                </a:solidFill>
+                <a:latin typeface="Bree Serif" panose="02000503040000020004" pitchFamily="2" charset="0"/>
+              </a:rPr>
+              <a:t>     </a:t>
+            </a:r>
+            <a:r>
+              <a:rPr lang="en-CA" sz="3200" dirty="0">
+                <a:latin typeface="Bree Serif" panose="02000503040000020004" pitchFamily="2" charset="0"/>
+              </a:rPr>
+              <a:t>#13348E (nav text)</a:t>
+            </a:r>
+          </a:p>
+          <a:p>
+            <a:r>
+              <a:rPr lang="en-CA" sz="3200" dirty="0">
+                <a:latin typeface="Bree Serif" panose="02000503040000020004" pitchFamily="2" charset="0"/>
+              </a:rPr>
+              <a:t>     </a:t>
+            </a:r>
+            <a:r>
+              <a:rPr lang="en-CA" sz="3200" b="0" dirty="0">
+                <a:effectLst/>
+                <a:latin typeface="Bree Serif" panose="02000503040000020004" pitchFamily="2" charset="0"/>
+              </a:rPr>
+              <a:t>#000000  (section header)</a:t>
+            </a:r>
+            <a:endParaRPr lang="en-CA" sz="2800" b="0" dirty="0">
               <a:effectLst/>
               <a:latin typeface="Bree Serif" panose="02000503040000020004" pitchFamily="2" charset="0"/>
             </a:endParaRPr>
@@ -18216,58 +19038,6 @@
             </a:pPr>
             <a:endParaRPr lang="en-CA" sz="3200" dirty="0">
               <a:latin typeface="Marck Script" panose="02000000000000000000" pitchFamily="2" charset="0"/>
-            </a:endParaRPr>
-          </a:p>
-        </p:txBody>
-      </p:sp>
-      <p:sp>
-        <p:nvSpPr>
-          <p:cNvPr id="2" name="文字方塊 1">
-            <a:extLst>
-              <a:ext uri="{FF2B5EF4-FFF2-40B4-BE49-F238E27FC236}">
-                <a16:creationId xmlns:a16="http://schemas.microsoft.com/office/drawing/2014/main" id="{6D7DE610-94CD-21B2-096A-04255AC75CFF}"/>
-              </a:ext>
-            </a:extLst>
-          </p:cNvPr>
-          <p:cNvSpPr txBox="1"/>
-          <p:nvPr/>
-        </p:nvSpPr>
-        <p:spPr>
-          <a:xfrm>
-            <a:off x="5598695" y="3577391"/>
-            <a:ext cx="2896947" cy="861774"/>
-          </a:xfrm>
-          <a:prstGeom prst="rect">
-            <a:avLst/>
-          </a:prstGeom>
-          <a:noFill/>
-          <a:ln>
-            <a:solidFill>
-              <a:schemeClr val="tx1"/>
-            </a:solidFill>
-            <a:prstDash val="lgDashDot"/>
-          </a:ln>
-        </p:spPr>
-        <p:txBody>
-          <a:bodyPr wrap="none" rtlCol="0">
-            <a:spAutoFit/>
-          </a:bodyPr>
-          <a:lstStyle/>
-          <a:p>
-            <a:r>
-              <a:rPr lang="en-CA" sz="5000" dirty="0" err="1">
-                <a:solidFill>
-                  <a:srgbClr val="775A0E"/>
-                </a:solidFill>
-                <a:latin typeface="Bree Serif" panose="02000503040000020004" pitchFamily="2" charset="0"/>
-              </a:rPr>
-              <a:t>Puppedia</a:t>
-            </a:r>
-            <a:endParaRPr lang="en-CA" sz="5000" dirty="0">
-              <a:solidFill>
-                <a:srgbClr val="775A0E"/>
-              </a:solidFill>
-              <a:latin typeface="Bree Serif" panose="02000503040000020004" pitchFamily="2" charset="0"/>
             </a:endParaRPr>
           </a:p>
         </p:txBody>
@@ -18329,6 +19099,168 @@
           </a:p>
         </p:txBody>
       </p:sp>
+      <p:pic>
+        <p:nvPicPr>
+          <p:cNvPr id="7" name="Picture 6" descr="A blue square with white lines&#10;&#10;Description automatically generated">
+            <a:extLst>
+              <a:ext uri="{FF2B5EF4-FFF2-40B4-BE49-F238E27FC236}">
+                <a16:creationId xmlns:a16="http://schemas.microsoft.com/office/drawing/2014/main" id="{C794C70F-0F73-445E-E927-082D2248A689}"/>
+              </a:ext>
+            </a:extLst>
+          </p:cNvPr>
+          <p:cNvPicPr>
+            <a:picLocks noChangeAspect="1"/>
+          </p:cNvPicPr>
+          <p:nvPr/>
+        </p:nvPicPr>
+        <p:blipFill>
+          <a:blip r:embed="rId2">
+            <a:extLst>
+              <a:ext uri="{28A0092B-C50C-407E-A947-70E740481C1C}">
+                <a14:useLocalDpi xmlns:a14="http://schemas.microsoft.com/office/drawing/2010/main" val="0"/>
+              </a:ext>
+            </a:extLst>
+          </a:blip>
+          <a:stretch>
+            <a:fillRect/>
+          </a:stretch>
+        </p:blipFill>
+        <p:spPr>
+          <a:xfrm>
+            <a:off x="1196340" y="4455888"/>
+            <a:ext cx="358425" cy="201614"/>
+          </a:xfrm>
+          <a:prstGeom prst="rect">
+            <a:avLst/>
+          </a:prstGeom>
+        </p:spPr>
+      </p:pic>
+      <p:sp>
+        <p:nvSpPr>
+          <p:cNvPr id="8" name="AutoShape 2">
+            <a:extLst>
+              <a:ext uri="{FF2B5EF4-FFF2-40B4-BE49-F238E27FC236}">
+                <a16:creationId xmlns:a16="http://schemas.microsoft.com/office/drawing/2014/main" id="{166848B4-F2F8-F990-F0E0-FF971A9C0BA8}"/>
+              </a:ext>
+            </a:extLst>
+          </p:cNvPr>
+          <p:cNvSpPr>
+            <a:spLocks noChangeAspect="1" noChangeArrowheads="1"/>
+          </p:cNvSpPr>
+          <p:nvPr/>
+        </p:nvSpPr>
+        <p:spPr bwMode="auto">
+          <a:xfrm>
+            <a:off x="4264537" y="4073312"/>
+            <a:ext cx="304800" cy="304800"/>
+          </a:xfrm>
+          <a:prstGeom prst="rect">
+            <a:avLst/>
+          </a:prstGeom>
+          <a:noFill/>
+          <a:extLst>
+            <a:ext uri="{909E8E84-426E-40DD-AFC4-6F175D3DCCD1}">
+              <a14:hiddenFill xmlns:a14="http://schemas.microsoft.com/office/drawing/2010/main">
+                <a:solidFill>
+                  <a:srgbClr val="FFFFFF"/>
+                </a:solidFill>
+              </a14:hiddenFill>
+            </a:ext>
+          </a:extLst>
+        </p:spPr>
+        <p:txBody>
+          <a:bodyPr vert="horz" wrap="square" lIns="91440" tIns="45720" rIns="91440" bIns="45720" numCol="1" anchor="t" anchorCtr="0" compatLnSpc="1">
+            <a:prstTxWarp prst="textNoShape">
+              <a:avLst/>
+            </a:prstTxWarp>
+          </a:bodyPr>
+          <a:lstStyle/>
+          <a:p>
+            <a:endParaRPr lang="en-HK"/>
+          </a:p>
+        </p:txBody>
+      </p:sp>
+      <p:sp>
+        <p:nvSpPr>
+          <p:cNvPr id="10" name="AutoShape 4">
+            <a:extLst>
+              <a:ext uri="{FF2B5EF4-FFF2-40B4-BE49-F238E27FC236}">
+                <a16:creationId xmlns:a16="http://schemas.microsoft.com/office/drawing/2014/main" id="{43E68E01-87C3-DDAF-9A8A-CE4599F09EC0}"/>
+              </a:ext>
+            </a:extLst>
+          </p:cNvPr>
+          <p:cNvSpPr>
+            <a:spLocks noChangeAspect="1" noChangeArrowheads="1"/>
+          </p:cNvSpPr>
+          <p:nvPr/>
+        </p:nvSpPr>
+        <p:spPr bwMode="auto">
+          <a:xfrm>
+            <a:off x="6096000" y="3429000"/>
+            <a:ext cx="304800" cy="304800"/>
+          </a:xfrm>
+          <a:prstGeom prst="rect">
+            <a:avLst/>
+          </a:prstGeom>
+          <a:noFill/>
+          <a:extLst>
+            <a:ext uri="{909E8E84-426E-40DD-AFC4-6F175D3DCCD1}">
+              <a14:hiddenFill xmlns:a14="http://schemas.microsoft.com/office/drawing/2010/main">
+                <a:solidFill>
+                  <a:srgbClr val="FFFFFF"/>
+                </a:solidFill>
+              </a14:hiddenFill>
+            </a:ext>
+          </a:extLst>
+        </p:spPr>
+        <p:txBody>
+          <a:bodyPr vert="horz" wrap="square" lIns="91440" tIns="45720" rIns="91440" bIns="45720" numCol="1" anchor="t" anchorCtr="0" compatLnSpc="1">
+            <a:prstTxWarp prst="textNoShape">
+              <a:avLst/>
+            </a:prstTxWarp>
+          </a:bodyPr>
+          <a:lstStyle/>
+          <a:p>
+            <a:endParaRPr lang="en-HK"/>
+          </a:p>
+        </p:txBody>
+      </p:sp>
+      <p:pic>
+        <p:nvPicPr>
+          <p:cNvPr id="12" name="Picture 11" descr="A black background with a black square&#10;&#10;Description automatically generated with medium confidence">
+            <a:extLst>
+              <a:ext uri="{FF2B5EF4-FFF2-40B4-BE49-F238E27FC236}">
+                <a16:creationId xmlns:a16="http://schemas.microsoft.com/office/drawing/2014/main" id="{6C219F88-3590-D069-14A3-939ADB71CEC7}"/>
+              </a:ext>
+            </a:extLst>
+          </p:cNvPr>
+          <p:cNvPicPr>
+            <a:picLocks noChangeAspect="1"/>
+          </p:cNvPicPr>
+          <p:nvPr/>
+        </p:nvPicPr>
+        <p:blipFill>
+          <a:blip r:embed="rId3">
+            <a:extLst>
+              <a:ext uri="{28A0092B-C50C-407E-A947-70E740481C1C}">
+                <a14:useLocalDpi xmlns:a14="http://schemas.microsoft.com/office/drawing/2010/main" val="0"/>
+              </a:ext>
+            </a:extLst>
+          </a:blip>
+          <a:stretch>
+            <a:fillRect/>
+          </a:stretch>
+        </p:blipFill>
+        <p:spPr>
+          <a:xfrm>
+            <a:off x="1196340" y="5051173"/>
+            <a:ext cx="358425" cy="201614"/>
+          </a:xfrm>
+          <a:prstGeom prst="rect">
+            <a:avLst/>
+          </a:prstGeom>
+        </p:spPr>
+      </p:pic>
     </p:spTree>
     <p:extLst>
       <p:ext uri="{BB962C8B-B14F-4D97-AF65-F5344CB8AC3E}">
@@ -18416,7 +19348,7 @@
               <a:rPr lang="en-CA" sz="3200" dirty="0">
                 <a:latin typeface="PT Sans" panose="020B0503020203020204" pitchFamily="34" charset="0"/>
               </a:rPr>
-              <a:t>Font: “PT San”</a:t>
+              <a:t>Font: “PT Sans”</a:t>
             </a:r>
           </a:p>
           <a:p>
@@ -18424,24 +19356,15 @@
               <a:rPr lang="en-CA" sz="3200" dirty="0">
                 <a:latin typeface="PT Sans" panose="020B0503020203020204" pitchFamily="34" charset="0"/>
               </a:rPr>
-              <a:t>Font size: </a:t>
-            </a:r>
-            <a:r>
-              <a:rPr lang="en-CA" sz="3200" dirty="0" err="1">
-                <a:latin typeface="PT Sans" panose="020B0503020203020204" pitchFamily="34" charset="0"/>
-              </a:rPr>
-              <a:t>px</a:t>
-            </a:r>
-            <a:endParaRPr lang="en-CA" sz="3200" dirty="0">
-              <a:latin typeface="PT Sans" panose="020B0503020203020204" pitchFamily="34" charset="0"/>
-            </a:endParaRPr>
+              <a:t>Font size: 16px (&lt;p&gt; tag)</a:t>
+            </a:r>
           </a:p>
           <a:p>
             <a:r>
               <a:rPr lang="en-CA" sz="3200" dirty="0">
                 <a:latin typeface="PT Sans" panose="020B0503020203020204" pitchFamily="34" charset="0"/>
               </a:rPr>
-              <a:t>Font Weight: </a:t>
+              <a:t>Font weight: regular</a:t>
             </a:r>
           </a:p>
           <a:p>
@@ -18673,7 +19596,19 @@
               <a:rPr lang="en-CA" sz="3200" dirty="0">
                 <a:latin typeface="Georgia Pro" panose="02040502050405020303" pitchFamily="18" charset="0"/>
               </a:rPr>
-              <a:t>Size: </a:t>
+              <a:t>Size: (1200 x 1200 </a:t>
+            </a:r>
+            <a:r>
+              <a:rPr lang="en-CA" sz="3200" dirty="0" err="1">
+                <a:latin typeface="Georgia Pro" panose="02040502050405020303" pitchFamily="18" charset="0"/>
+              </a:rPr>
+              <a:t>px</a:t>
+            </a:r>
+            <a:r>
+              <a:rPr lang="en-CA" sz="3200" dirty="0">
+                <a:latin typeface="Georgia Pro" panose="02040502050405020303" pitchFamily="18" charset="0"/>
+              </a:rPr>
+              <a:t>)</a:t>
             </a:r>
           </a:p>
           <a:p>
@@ -18743,6 +19678,42 @@
           </a:p>
         </p:txBody>
       </p:sp>
+      <p:pic>
+        <p:nvPicPr>
+          <p:cNvPr id="6" name="Picture 5" descr="A blue text on a black background&#10;&#10;Description automatically generated">
+            <a:extLst>
+              <a:ext uri="{FF2B5EF4-FFF2-40B4-BE49-F238E27FC236}">
+                <a16:creationId xmlns:a16="http://schemas.microsoft.com/office/drawing/2014/main" id="{2EA0DA99-845F-5392-D3FC-CB586F201B06}"/>
+              </a:ext>
+            </a:extLst>
+          </p:cNvPr>
+          <p:cNvPicPr>
+            <a:picLocks noChangeAspect="1"/>
+          </p:cNvPicPr>
+          <p:nvPr/>
+        </p:nvPicPr>
+        <p:blipFill>
+          <a:blip r:embed="rId3">
+            <a:extLst>
+              <a:ext uri="{28A0092B-C50C-407E-A947-70E740481C1C}">
+                <a14:useLocalDpi xmlns:a14="http://schemas.microsoft.com/office/drawing/2010/main" val="0"/>
+              </a:ext>
+            </a:extLst>
+          </a:blip>
+          <a:stretch>
+            <a:fillRect/>
+          </a:stretch>
+        </p:blipFill>
+        <p:spPr>
+          <a:xfrm>
+            <a:off x="2667000" y="-111319"/>
+            <a:ext cx="6858000" cy="6858000"/>
+          </a:xfrm>
+          <a:prstGeom prst="rect">
+            <a:avLst/>
+          </a:prstGeom>
+        </p:spPr>
+      </p:pic>
     </p:spTree>
     <p:extLst>
       <p:ext uri="{BB962C8B-B14F-4D97-AF65-F5344CB8AC3E}">
@@ -18958,26 +19929,85 @@
       </p:sp>
       <p:sp>
         <p:nvSpPr>
-          <p:cNvPr id="3" name="橢圓 2">
+          <p:cNvPr id="10" name="投影片編號版面配置區 9">
             <a:extLst>
               <a:ext uri="{FF2B5EF4-FFF2-40B4-BE49-F238E27FC236}">
-                <a16:creationId xmlns:a16="http://schemas.microsoft.com/office/drawing/2014/main" id="{4BDC3303-1CCF-2776-575D-61DCD2BABC91}"/>
+                <a16:creationId xmlns:a16="http://schemas.microsoft.com/office/drawing/2014/main" id="{0BC59249-64FD-3B9B-4146-EA9E31471297}"/>
               </a:ext>
             </a:extLst>
           </p:cNvPr>
-          <p:cNvSpPr/>
+          <p:cNvSpPr>
+            <a:spLocks noGrp="1"/>
+          </p:cNvSpPr>
+          <p:nvPr>
+            <p:ph type="sldNum" sz="quarter" idx="12"/>
+          </p:nvPr>
+        </p:nvSpPr>
+        <p:spPr/>
+        <p:txBody>
+          <a:bodyPr/>
+          <a:lstStyle/>
+          <a:p>
+            <a:fld id="{D2CFFE97-0B85-43BE-A4CC-E66052ADB6F2}" type="slidenum">
+              <a:rPr lang="en-CA" smtClean="0"/>
+              <a:t>9</a:t>
+            </a:fld>
+            <a:endParaRPr lang="en-CA" dirty="0"/>
+          </a:p>
+        </p:txBody>
+      </p:sp>
+      <p:sp>
+        <p:nvSpPr>
+          <p:cNvPr id="11" name="頁尾版面配置區 10">
+            <a:extLst>
+              <a:ext uri="{FF2B5EF4-FFF2-40B4-BE49-F238E27FC236}">
+                <a16:creationId xmlns:a16="http://schemas.microsoft.com/office/drawing/2014/main" id="{ACB82C96-AAAE-D653-39B6-222B7ED1356A}"/>
+              </a:ext>
+            </a:extLst>
+          </p:cNvPr>
+          <p:cNvSpPr>
+            <a:spLocks noGrp="1"/>
+          </p:cNvSpPr>
+          <p:nvPr>
+            <p:ph type="ftr" sz="quarter" idx="11"/>
+          </p:nvPr>
+        </p:nvSpPr>
+        <p:spPr/>
+        <p:txBody>
+          <a:bodyPr/>
+          <a:lstStyle/>
+          <a:p>
+            <a:r>
+              <a:rPr lang="en-CA" dirty="0"/>
+              <a:t>Group project</a:t>
+            </a:r>
+          </a:p>
+        </p:txBody>
+      </p:sp>
+      <p:sp>
+        <p:nvSpPr>
+          <p:cNvPr id="18" name="橢圓 8">
+            <a:extLst>
+              <a:ext uri="{FF2B5EF4-FFF2-40B4-BE49-F238E27FC236}">
+                <a16:creationId xmlns:a16="http://schemas.microsoft.com/office/drawing/2014/main" id="{A6200D21-B309-921E-7C6A-2D4569DAFA3A}"/>
+              </a:ext>
+            </a:extLst>
+          </p:cNvPr>
+          <p:cNvSpPr>
+            <a:spLocks noChangeAspect="1"/>
+          </p:cNvSpPr>
           <p:nvPr/>
         </p:nvSpPr>
         <p:spPr>
           <a:xfrm>
-            <a:off x="1443788" y="2854441"/>
-            <a:ext cx="2502569" cy="2502568"/>
+            <a:off x="142757" y="2817811"/>
+            <a:ext cx="1909046" cy="1856200"/>
           </a:xfrm>
           <a:prstGeom prst="ellipse">
             <a:avLst/>
           </a:prstGeom>
           <a:solidFill>
-            <a:srgbClr val="716358"/>
+            <a:srgbClr val="6C584C"/>
           </a:solidFill>
           <a:ln>
             <a:noFill/>
@@ -19005,36 +20035,52 @@
           <a:p>
             <a:pPr algn="ctr"/>
             <a:r>
-              <a:rPr lang="en-CA" sz="3000" dirty="0">
-                <a:latin typeface="Georgia Pro" panose="02040502050405020303" pitchFamily="18" charset="0"/>
-              </a:rPr>
-              <a:t>#716358</a:t>
-            </a:r>
-          </a:p>
-        </p:txBody>
-      </p:sp>
-      <p:sp>
-        <p:nvSpPr>
-          <p:cNvPr id="5" name="橢圓 4">
+              <a:rPr lang="en-HK" sz="1600" b="0" dirty="0">
+                <a:solidFill>
+                  <a:schemeClr val="bg1"/>
+                </a:solidFill>
+                <a:effectLst/>
+                <a:latin typeface="Consolas" panose="020B0609020204030204" pitchFamily="49" charset="0"/>
+              </a:rPr>
+              <a:t>#</a:t>
+            </a:r>
+            <a:r>
+              <a:rPr lang="en-HK" sz="2400" b="0" dirty="0">
+                <a:solidFill>
+                  <a:schemeClr val="bg1"/>
+                </a:solidFill>
+                <a:effectLst/>
+                <a:latin typeface="Georgia Pro" panose="02040502050405020303" pitchFamily="18" charset="0"/>
+              </a:rPr>
+              <a:t>6c584c</a:t>
+            </a:r>
+          </a:p>
+        </p:txBody>
+      </p:sp>
+      <p:sp>
+        <p:nvSpPr>
+          <p:cNvPr id="17" name="橢圓 8">
             <a:extLst>
               <a:ext uri="{FF2B5EF4-FFF2-40B4-BE49-F238E27FC236}">
-                <a16:creationId xmlns:a16="http://schemas.microsoft.com/office/drawing/2014/main" id="{1C7518E9-1DFE-797F-BD54-2C5944C50AFE}"/>
+                <a16:creationId xmlns:a16="http://schemas.microsoft.com/office/drawing/2014/main" id="{98B607BD-F5C1-9F9B-E076-F3B98157DD1E}"/>
               </a:ext>
             </a:extLst>
           </p:cNvPr>
-          <p:cNvSpPr/>
+          <p:cNvSpPr>
+            <a:spLocks noChangeAspect="1"/>
+          </p:cNvSpPr>
           <p:nvPr/>
         </p:nvSpPr>
         <p:spPr>
           <a:xfrm>
-            <a:off x="3613483" y="3025014"/>
-            <a:ext cx="2331995" cy="2331995"/>
+            <a:off x="1742554" y="2887999"/>
+            <a:ext cx="1811480" cy="1715824"/>
           </a:xfrm>
           <a:prstGeom prst="ellipse">
             <a:avLst/>
           </a:prstGeom>
           <a:solidFill>
-            <a:srgbClr val="C49368"/>
+            <a:srgbClr val="8A817C"/>
           </a:solidFill>
           <a:ln>
             <a:noFill/>
@@ -19062,13 +20108,24 @@
           <a:p>
             <a:pPr algn="ctr"/>
             <a:r>
-              <a:rPr lang="en-CA" sz="2800" dirty="0">
+              <a:rPr lang="en-HK" sz="1600" b="0" dirty="0">
                 <a:solidFill>
                   <a:schemeClr val="bg1"/>
                 </a:solidFill>
-                <a:latin typeface="Georgia Pro" panose="02040502050405020303" pitchFamily="18" charset="0"/>
-              </a:rPr>
-              <a:t>#C49368</a:t>
+                <a:effectLst/>
+                <a:latin typeface="Consolas" panose="020B0609020204030204" pitchFamily="49" charset="0"/>
+              </a:rPr>
+              <a:t>#</a:t>
+            </a:r>
+            <a:r>
+              <a:rPr lang="en-HK" sz="2400" b="0" dirty="0">
+                <a:solidFill>
+                  <a:schemeClr val="bg1"/>
+                </a:solidFill>
+                <a:effectLst/>
+                <a:latin typeface="Georgia Pro" panose="02040502050405020303" pitchFamily="18" charset="0"/>
+              </a:rPr>
+              <a:t>8a817c</a:t>
             </a:r>
           </a:p>
         </p:txBody>
@@ -19082,13 +20139,15 @@
               </a:ext>
             </a:extLst>
           </p:cNvPr>
-          <p:cNvSpPr/>
+          <p:cNvSpPr>
+            <a:spLocks noChangeAspect="1"/>
+          </p:cNvSpPr>
           <p:nvPr/>
         </p:nvSpPr>
         <p:spPr>
           <a:xfrm>
-            <a:off x="5579305" y="3316980"/>
-            <a:ext cx="2040029" cy="2040029"/>
+            <a:off x="3236912" y="2927297"/>
+            <a:ext cx="1637228" cy="1637227"/>
           </a:xfrm>
           <a:prstGeom prst="ellipse">
             <a:avLst/>
@@ -19128,7 +20187,16 @@
                 </a:solidFill>
                 <a:latin typeface="Georgia Pro" panose="02040502050405020303" pitchFamily="18" charset="0"/>
               </a:rPr>
-              <a:t>#efe2d2</a:t>
+              <a:t>#</a:t>
+            </a:r>
+            <a:r>
+              <a:rPr lang="en-CA" sz="2000" dirty="0">
+                <a:solidFill>
+                  <a:schemeClr val="tx1"/>
+                </a:solidFill>
+                <a:latin typeface="Georgia Pro" panose="02040502050405020303" pitchFamily="18" charset="0"/>
+              </a:rPr>
+              <a:t>efe2d2</a:t>
             </a:r>
           </a:p>
         </p:txBody>
@@ -19142,13 +20210,15 @@
               </a:ext>
             </a:extLst>
           </p:cNvPr>
-          <p:cNvSpPr/>
+          <p:cNvSpPr>
+            <a:spLocks noChangeAspect="1"/>
+          </p:cNvSpPr>
           <p:nvPr/>
         </p:nvSpPr>
         <p:spPr>
           <a:xfrm>
-            <a:off x="7287789" y="3623120"/>
-            <a:ext cx="1733889" cy="1733889"/>
+            <a:off x="4569830" y="2971929"/>
+            <a:ext cx="1533315" cy="1547961"/>
           </a:xfrm>
           <a:prstGeom prst="ellipse">
             <a:avLst/>
@@ -19195,6 +20265,69 @@
       </p:sp>
       <p:sp>
         <p:nvSpPr>
+          <p:cNvPr id="16" name="橢圓 8">
+            <a:extLst>
+              <a:ext uri="{FF2B5EF4-FFF2-40B4-BE49-F238E27FC236}">
+                <a16:creationId xmlns:a16="http://schemas.microsoft.com/office/drawing/2014/main" id="{221CF804-B9CA-05F6-B642-075E8DB49719}"/>
+              </a:ext>
+            </a:extLst>
+          </p:cNvPr>
+          <p:cNvSpPr>
+            <a:spLocks noChangeAspect="1"/>
+          </p:cNvSpPr>
+          <p:nvPr/>
+        </p:nvSpPr>
+        <p:spPr>
+          <a:xfrm>
+            <a:off x="5784719" y="3020530"/>
+            <a:ext cx="1461189" cy="1450757"/>
+          </a:xfrm>
+          <a:prstGeom prst="ellipse">
+            <a:avLst/>
+          </a:prstGeom>
+          <a:solidFill>
+            <a:srgbClr val="F1F2EB"/>
+          </a:solidFill>
+          <a:ln>
+            <a:noFill/>
+          </a:ln>
+        </p:spPr>
+        <p:style>
+          <a:lnRef idx="2">
+            <a:schemeClr val="accent1">
+              <a:shade val="15000"/>
+            </a:schemeClr>
+          </a:lnRef>
+          <a:fillRef idx="1">
+            <a:schemeClr val="accent1"/>
+          </a:fillRef>
+          <a:effectRef idx="0">
+            <a:schemeClr val="accent1"/>
+          </a:effectRef>
+          <a:fontRef idx="minor">
+            <a:schemeClr val="lt1"/>
+          </a:fontRef>
+        </p:style>
+        <p:txBody>
+          <a:bodyPr rtlCol="0" anchor="ctr"/>
+          <a:lstStyle/>
+          <a:p>
+            <a:pPr algn="ctr"/>
+            <a:r>
+              <a:rPr lang="en-HK" sz="1600" b="0" dirty="0">
+                <a:solidFill>
+                  <a:schemeClr val="tx1"/>
+                </a:solidFill>
+                <a:effectLst/>
+                <a:latin typeface="Georgia Pro" panose="02040502050405020303" pitchFamily="18" charset="0"/>
+              </a:rPr>
+              <a:t>#f1f2eb</a:t>
+            </a:r>
+          </a:p>
+        </p:txBody>
+      </p:sp>
+      <p:sp>
+        <p:nvSpPr>
           <p:cNvPr id="9" name="橢圓 8">
             <a:extLst>
               <a:ext uri="{FF2B5EF4-FFF2-40B4-BE49-F238E27FC236}">
@@ -19202,13 +20335,15 @@
               </a:ext>
             </a:extLst>
           </p:cNvPr>
-          <p:cNvSpPr/>
+          <p:cNvSpPr>
+            <a:spLocks/>
+          </p:cNvSpPr>
           <p:nvPr/>
         </p:nvSpPr>
         <p:spPr>
           <a:xfrm>
-            <a:off x="8793508" y="4074696"/>
-            <a:ext cx="1312025" cy="1282314"/>
+            <a:off x="6852239" y="3020529"/>
+            <a:ext cx="1454305" cy="1450757"/>
           </a:xfrm>
           <a:prstGeom prst="ellipse">
             <a:avLst/>
@@ -19255,57 +20390,253 @@
       </p:sp>
       <p:sp>
         <p:nvSpPr>
-          <p:cNvPr id="10" name="投影片編號版面配置區 9">
+          <p:cNvPr id="4" name="橢圓 8">
             <a:extLst>
               <a:ext uri="{FF2B5EF4-FFF2-40B4-BE49-F238E27FC236}">
-                <a16:creationId xmlns:a16="http://schemas.microsoft.com/office/drawing/2014/main" id="{0BC59249-64FD-3B9B-4146-EA9E31471297}"/>
+                <a16:creationId xmlns:a16="http://schemas.microsoft.com/office/drawing/2014/main" id="{D02EB9BF-7763-43C9-5B5E-0E05943AEA51}"/>
               </a:ext>
             </a:extLst>
           </p:cNvPr>
           <p:cNvSpPr>
-            <a:spLocks noGrp="1"/>
+            <a:spLocks noChangeAspect="1"/>
           </p:cNvSpPr>
-          <p:nvPr>
-            <p:ph type="sldNum" sz="quarter" idx="12"/>
-          </p:nvPr>
-        </p:nvSpPr>
-        <p:spPr/>
-        <p:txBody>
-          <a:bodyPr/>
+          <p:nvPr/>
+        </p:nvSpPr>
+        <p:spPr>
+          <a:xfrm>
+            <a:off x="7955883" y="3099265"/>
+            <a:ext cx="1296446" cy="1293283"/>
+          </a:xfrm>
+          <a:prstGeom prst="ellipse">
+            <a:avLst/>
+          </a:prstGeom>
+          <a:solidFill>
+            <a:srgbClr val="13348E"/>
+          </a:solidFill>
+          <a:ln>
+            <a:noFill/>
+          </a:ln>
+        </p:spPr>
+        <p:style>
+          <a:lnRef idx="2">
+            <a:schemeClr val="accent1">
+              <a:shade val="15000"/>
+            </a:schemeClr>
+          </a:lnRef>
+          <a:fillRef idx="1">
+            <a:schemeClr val="accent1"/>
+          </a:fillRef>
+          <a:effectRef idx="0">
+            <a:schemeClr val="accent1"/>
+          </a:effectRef>
+          <a:fontRef idx="minor">
+            <a:schemeClr val="lt1"/>
+          </a:fontRef>
+        </p:style>
+        <p:txBody>
+          <a:bodyPr rtlCol="0" anchor="ctr"/>
           <a:lstStyle/>
           <a:p>
-            <a:fld id="{D2CFFE97-0B85-43BE-A4CC-E66052ADB6F2}" type="slidenum">
-              <a:rPr lang="en-CA" smtClean="0"/>
-              <a:t>9</a:t>
-            </a:fld>
-            <a:endParaRPr lang="en-CA"/>
-          </a:p>
-        </p:txBody>
-      </p:sp>
-      <p:sp>
-        <p:nvSpPr>
-          <p:cNvPr id="11" name="頁尾版面配置區 10">
+            <a:r>
+              <a:rPr lang="en-HK" sz="1600" b="0" dirty="0">
+                <a:solidFill>
+                  <a:schemeClr val="bg1"/>
+                </a:solidFill>
+                <a:effectLst/>
+                <a:latin typeface="Georgia Pro" panose="02040502050405020303" pitchFamily="18" charset="0"/>
+              </a:rPr>
+              <a:t>#</a:t>
+            </a:r>
+            <a:r>
+              <a:rPr lang="en-HK" sz="1400" b="0" dirty="0">
+                <a:solidFill>
+                  <a:schemeClr val="bg1"/>
+                </a:solidFill>
+                <a:effectLst/>
+                <a:latin typeface="Georgia Pro" panose="02040502050405020303" pitchFamily="18" charset="0"/>
+              </a:rPr>
+              <a:t>13348e</a:t>
+            </a:r>
+          </a:p>
+        </p:txBody>
+      </p:sp>
+      <p:sp>
+        <p:nvSpPr>
+          <p:cNvPr id="15" name="橢圓 8">
             <a:extLst>
               <a:ext uri="{FF2B5EF4-FFF2-40B4-BE49-F238E27FC236}">
-                <a16:creationId xmlns:a16="http://schemas.microsoft.com/office/drawing/2014/main" id="{ACB82C96-AAAE-D653-39B6-222B7ED1356A}"/>
+                <a16:creationId xmlns:a16="http://schemas.microsoft.com/office/drawing/2014/main" id="{58269473-43B2-B394-E12F-99A65212DA74}"/>
               </a:ext>
             </a:extLst>
           </p:cNvPr>
-          <p:cNvSpPr>
-            <a:spLocks noGrp="1"/>
-          </p:cNvSpPr>
-          <p:nvPr>
-            <p:ph type="ftr" sz="quarter" idx="11"/>
-          </p:nvPr>
-        </p:nvSpPr>
-        <p:spPr/>
-        <p:txBody>
-          <a:bodyPr/>
+          <p:cNvSpPr/>
+          <p:nvPr/>
+        </p:nvSpPr>
+        <p:spPr>
+          <a:xfrm>
+            <a:off x="8966036" y="3170521"/>
+            <a:ext cx="1183660" cy="1150769"/>
+          </a:xfrm>
+          <a:prstGeom prst="ellipse">
+            <a:avLst/>
+          </a:prstGeom>
+          <a:solidFill>
+            <a:srgbClr val="3273F6"/>
+          </a:solidFill>
+          <a:ln>
+            <a:noFill/>
+          </a:ln>
+        </p:spPr>
+        <p:style>
+          <a:lnRef idx="2">
+            <a:schemeClr val="accent1">
+              <a:shade val="15000"/>
+            </a:schemeClr>
+          </a:lnRef>
+          <a:fillRef idx="1">
+            <a:schemeClr val="accent1"/>
+          </a:fillRef>
+          <a:effectRef idx="0">
+            <a:schemeClr val="accent1"/>
+          </a:effectRef>
+          <a:fontRef idx="minor">
+            <a:schemeClr val="lt1"/>
+          </a:fontRef>
+        </p:style>
+        <p:txBody>
+          <a:bodyPr rtlCol="0" anchor="ctr"/>
           <a:lstStyle/>
           <a:p>
-            <a:r>
-              <a:rPr lang="en-CA"/>
-              <a:t>Group project</a:t>
+            <a:pPr algn="ctr"/>
+            <a:r>
+              <a:rPr lang="en-HK" sz="1200" b="0" dirty="0">
+                <a:solidFill>
+                  <a:schemeClr val="bg1"/>
+                </a:solidFill>
+                <a:effectLst/>
+                <a:latin typeface="Georgia Pro" panose="02040502050405020303" pitchFamily="18" charset="0"/>
+              </a:rPr>
+              <a:t>#3273F6</a:t>
+            </a:r>
+          </a:p>
+        </p:txBody>
+      </p:sp>
+      <p:sp>
+        <p:nvSpPr>
+          <p:cNvPr id="14" name="橢圓 8">
+            <a:extLst>
+              <a:ext uri="{FF2B5EF4-FFF2-40B4-BE49-F238E27FC236}">
+                <a16:creationId xmlns:a16="http://schemas.microsoft.com/office/drawing/2014/main" id="{C6D46A2F-B0B6-77E6-4C34-01E1DE7A4EBF}"/>
+              </a:ext>
+            </a:extLst>
+          </p:cNvPr>
+          <p:cNvSpPr/>
+          <p:nvPr/>
+        </p:nvSpPr>
+        <p:spPr>
+          <a:xfrm>
+            <a:off x="9911821" y="3178391"/>
+            <a:ext cx="1183660" cy="1150769"/>
+          </a:xfrm>
+          <a:prstGeom prst="ellipse">
+            <a:avLst/>
+          </a:prstGeom>
+          <a:solidFill>
+            <a:srgbClr val="F64C72"/>
+          </a:solidFill>
+          <a:ln>
+            <a:noFill/>
+          </a:ln>
+        </p:spPr>
+        <p:style>
+          <a:lnRef idx="2">
+            <a:schemeClr val="accent1">
+              <a:shade val="15000"/>
+            </a:schemeClr>
+          </a:lnRef>
+          <a:fillRef idx="1">
+            <a:schemeClr val="accent1"/>
+          </a:fillRef>
+          <a:effectRef idx="0">
+            <a:schemeClr val="accent1"/>
+          </a:effectRef>
+          <a:fontRef idx="minor">
+            <a:schemeClr val="lt1"/>
+          </a:fontRef>
+        </p:style>
+        <p:txBody>
+          <a:bodyPr rtlCol="0" anchor="ctr"/>
+          <a:lstStyle/>
+          <a:p>
+            <a:r>
+              <a:rPr lang="en-HK" sz="1200" b="0" dirty="0">
+                <a:solidFill>
+                  <a:schemeClr val="bg1"/>
+                </a:solidFill>
+                <a:effectLst/>
+                <a:latin typeface="Georgia Pro" panose="02040502050405020303" pitchFamily="18" charset="0"/>
+              </a:rPr>
+              <a:t>#F64C72</a:t>
+            </a:r>
+          </a:p>
+        </p:txBody>
+      </p:sp>
+      <p:sp>
+        <p:nvSpPr>
+          <p:cNvPr id="19" name="橢圓 8">
+            <a:extLst>
+              <a:ext uri="{FF2B5EF4-FFF2-40B4-BE49-F238E27FC236}">
+                <a16:creationId xmlns:a16="http://schemas.microsoft.com/office/drawing/2014/main" id="{85E6FCD2-CD98-3653-FEA4-1814240677B8}"/>
+              </a:ext>
+            </a:extLst>
+          </p:cNvPr>
+          <p:cNvSpPr/>
+          <p:nvPr/>
+        </p:nvSpPr>
+        <p:spPr>
+          <a:xfrm>
+            <a:off x="10875608" y="3170520"/>
+            <a:ext cx="1183660" cy="1150769"/>
+          </a:xfrm>
+          <a:prstGeom prst="ellipse">
+            <a:avLst/>
+          </a:prstGeom>
+          <a:solidFill>
+            <a:srgbClr val="FFD700"/>
+          </a:solidFill>
+          <a:ln>
+            <a:noFill/>
+          </a:ln>
+        </p:spPr>
+        <p:style>
+          <a:lnRef idx="2">
+            <a:schemeClr val="accent1">
+              <a:shade val="15000"/>
+            </a:schemeClr>
+          </a:lnRef>
+          <a:fillRef idx="1">
+            <a:schemeClr val="accent1"/>
+          </a:fillRef>
+          <a:effectRef idx="0">
+            <a:schemeClr val="accent1"/>
+          </a:effectRef>
+          <a:fontRef idx="minor">
+            <a:schemeClr val="lt1"/>
+          </a:fontRef>
+        </p:style>
+        <p:txBody>
+          <a:bodyPr rtlCol="0" anchor="ctr"/>
+          <a:lstStyle/>
+          <a:p>
+            <a:r>
+              <a:rPr lang="en-HK" sz="1200" b="0" dirty="0">
+                <a:solidFill>
+                  <a:schemeClr val="tx1"/>
+                </a:solidFill>
+                <a:effectLst/>
+                <a:latin typeface="Georgia Pro" panose="02040502050405020303" pitchFamily="18" charset="0"/>
+              </a:rPr>
+              <a:t>#ffd700</a:t>
             </a:r>
           </a:p>
         </p:txBody>

</xml_diff>